<commit_message>
first version of presentation
</commit_message>
<xml_diff>
--- a/reports/paper/word_version/Jakovlev_Presentation_TELECCON_2019.pptx
+++ b/reports/paper/word_version/Jakovlev_Presentation_TELECCON_2019.pptx
@@ -4,6 +4,9 @@
   <p:sldMasterIdLst>
     <p:sldMasterId id="2147483648" r:id="rId1"/>
   </p:sldMasterIdLst>
+  <p:notesMasterIdLst>
+    <p:notesMasterId r:id="rId15"/>
+  </p:notesMasterIdLst>
   <p:sldIdLst>
     <p:sldId id="256" r:id="rId2"/>
     <p:sldId id="257" r:id="rId3"/>
@@ -118,10 +121,1741 @@
   </p:defaultTextStyle>
   <p:extLst>
     <p:ext uri="{EFAFB233-063F-42B5-8137-9DF3F51BA10A}">
-      <p15:sldGuideLst xmlns:p15="http://schemas.microsoft.com/office/powerpoint/2012/main" xmlns=""/>
+      <p15:sldGuideLst xmlns:p15="http://schemas.microsoft.com/office/powerpoint/2012/main">
+        <p15:guide id="1" orient="horz" pos="2160">
+          <p15:clr>
+            <a:srgbClr val="A4A3A4"/>
+          </p15:clr>
+        </p15:guide>
+        <p15:guide id="2" pos="3840">
+          <p15:clr>
+            <a:srgbClr val="A4A3A4"/>
+          </p15:clr>
+        </p15:guide>
+      </p15:sldGuideLst>
     </p:ext>
   </p:extLst>
 </p:presentation>
+</file>
+
+<file path=ppt/notesMasters/notesMaster1.xml><?xml version="1.0" encoding="utf-8"?>
+<p:notesMaster xmlns:a="http://schemas.openxmlformats.org/drawingml/2006/main" xmlns:r="http://schemas.openxmlformats.org/officeDocument/2006/relationships" xmlns:p="http://schemas.openxmlformats.org/presentationml/2006/main">
+  <p:cSld>
+    <p:bg>
+      <p:bgRef idx="1001">
+        <a:schemeClr val="bg1"/>
+      </p:bgRef>
+    </p:bg>
+    <p:spTree>
+      <p:nvGrpSpPr>
+        <p:cNvPr id="1" name=""/>
+        <p:cNvGrpSpPr/>
+        <p:nvPr/>
+      </p:nvGrpSpPr>
+      <p:grpSpPr>
+        <a:xfrm>
+          <a:off x="0" y="0"/>
+          <a:ext cx="0" cy="0"/>
+          <a:chOff x="0" y="0"/>
+          <a:chExt cx="0" cy="0"/>
+        </a:xfrm>
+      </p:grpSpPr>
+      <p:sp>
+        <p:nvSpPr>
+          <p:cNvPr id="2" name="Header Placeholder 1"/>
+          <p:cNvSpPr>
+            <a:spLocks noGrp="1"/>
+          </p:cNvSpPr>
+          <p:nvPr>
+            <p:ph type="hdr" sz="quarter"/>
+          </p:nvPr>
+        </p:nvSpPr>
+        <p:spPr>
+          <a:xfrm>
+            <a:off x="0" y="0"/>
+            <a:ext cx="2971800" cy="458788"/>
+          </a:xfrm>
+          <a:prstGeom prst="rect">
+            <a:avLst/>
+          </a:prstGeom>
+        </p:spPr>
+        <p:txBody>
+          <a:bodyPr vert="horz" lIns="91440" tIns="45720" rIns="91440" bIns="45720" rtlCol="0"/>
+          <a:lstStyle>
+            <a:lvl1pPr algn="l">
+              <a:defRPr sz="1200"/>
+            </a:lvl1pPr>
+          </a:lstStyle>
+          <a:p>
+            <a:endParaRPr lang="en-US"/>
+          </a:p>
+        </p:txBody>
+      </p:sp>
+      <p:sp>
+        <p:nvSpPr>
+          <p:cNvPr id="3" name="Date Placeholder 2"/>
+          <p:cNvSpPr>
+            <a:spLocks noGrp="1"/>
+          </p:cNvSpPr>
+          <p:nvPr>
+            <p:ph type="dt" idx="1"/>
+          </p:nvPr>
+        </p:nvSpPr>
+        <p:spPr>
+          <a:xfrm>
+            <a:off x="3884613" y="0"/>
+            <a:ext cx="2971800" cy="458788"/>
+          </a:xfrm>
+          <a:prstGeom prst="rect">
+            <a:avLst/>
+          </a:prstGeom>
+        </p:spPr>
+        <p:txBody>
+          <a:bodyPr vert="horz" lIns="91440" tIns="45720" rIns="91440" bIns="45720" rtlCol="0"/>
+          <a:lstStyle>
+            <a:lvl1pPr algn="r">
+              <a:defRPr sz="1200"/>
+            </a:lvl1pPr>
+          </a:lstStyle>
+          <a:p>
+            <a:fld id="{60CFFF46-31C8-4451-8663-B190ACB66019}" type="datetimeFigureOut">
+              <a:rPr lang="en-US" smtClean="0"/>
+              <a:t>11/17/2019</a:t>
+            </a:fld>
+            <a:endParaRPr lang="en-US"/>
+          </a:p>
+        </p:txBody>
+      </p:sp>
+      <p:sp>
+        <p:nvSpPr>
+          <p:cNvPr id="4" name="Slide Image Placeholder 3"/>
+          <p:cNvSpPr>
+            <a:spLocks noGrp="1" noRot="1" noChangeAspect="1"/>
+          </p:cNvSpPr>
+          <p:nvPr>
+            <p:ph type="sldImg" idx="2"/>
+          </p:nvPr>
+        </p:nvSpPr>
+        <p:spPr>
+          <a:xfrm>
+            <a:off x="685800" y="1143000"/>
+            <a:ext cx="5486400" cy="3086100"/>
+          </a:xfrm>
+          <a:prstGeom prst="rect">
+            <a:avLst/>
+          </a:prstGeom>
+          <a:noFill/>
+          <a:ln w="12700">
+            <a:solidFill>
+              <a:prstClr val="black"/>
+            </a:solidFill>
+          </a:ln>
+        </p:spPr>
+        <p:txBody>
+          <a:bodyPr vert="horz" lIns="91440" tIns="45720" rIns="91440" bIns="45720" rtlCol="0" anchor="ctr"/>
+          <a:lstStyle/>
+          <a:p>
+            <a:endParaRPr lang="en-US"/>
+          </a:p>
+        </p:txBody>
+      </p:sp>
+      <p:sp>
+        <p:nvSpPr>
+          <p:cNvPr id="5" name="Notes Placeholder 4"/>
+          <p:cNvSpPr>
+            <a:spLocks noGrp="1"/>
+          </p:cNvSpPr>
+          <p:nvPr>
+            <p:ph type="body" sz="quarter" idx="3"/>
+          </p:nvPr>
+        </p:nvSpPr>
+        <p:spPr>
+          <a:xfrm>
+            <a:off x="685800" y="4400550"/>
+            <a:ext cx="5486400" cy="3600450"/>
+          </a:xfrm>
+          <a:prstGeom prst="rect">
+            <a:avLst/>
+          </a:prstGeom>
+        </p:spPr>
+        <p:txBody>
+          <a:bodyPr vert="horz" lIns="91440" tIns="45720" rIns="91440" bIns="45720" rtlCol="0"/>
+          <a:lstStyle/>
+          <a:p>
+            <a:pPr lvl="0"/>
+            <a:r>
+              <a:rPr lang="en-US"/>
+              <a:t>Click to edit Master text styles</a:t>
+            </a:r>
+          </a:p>
+          <a:p>
+            <a:pPr lvl="1"/>
+            <a:r>
+              <a:rPr lang="en-US"/>
+              <a:t>Second level</a:t>
+            </a:r>
+          </a:p>
+          <a:p>
+            <a:pPr lvl="2"/>
+            <a:r>
+              <a:rPr lang="en-US"/>
+              <a:t>Third level</a:t>
+            </a:r>
+          </a:p>
+          <a:p>
+            <a:pPr lvl="3"/>
+            <a:r>
+              <a:rPr lang="en-US"/>
+              <a:t>Fourth level</a:t>
+            </a:r>
+          </a:p>
+          <a:p>
+            <a:pPr lvl="4"/>
+            <a:r>
+              <a:rPr lang="en-US"/>
+              <a:t>Fifth level</a:t>
+            </a:r>
+          </a:p>
+        </p:txBody>
+      </p:sp>
+      <p:sp>
+        <p:nvSpPr>
+          <p:cNvPr id="6" name="Footer Placeholder 5"/>
+          <p:cNvSpPr>
+            <a:spLocks noGrp="1"/>
+          </p:cNvSpPr>
+          <p:nvPr>
+            <p:ph type="ftr" sz="quarter" idx="4"/>
+          </p:nvPr>
+        </p:nvSpPr>
+        <p:spPr>
+          <a:xfrm>
+            <a:off x="0" y="8685213"/>
+            <a:ext cx="2971800" cy="458787"/>
+          </a:xfrm>
+          <a:prstGeom prst="rect">
+            <a:avLst/>
+          </a:prstGeom>
+        </p:spPr>
+        <p:txBody>
+          <a:bodyPr vert="horz" lIns="91440" tIns="45720" rIns="91440" bIns="45720" rtlCol="0" anchor="b"/>
+          <a:lstStyle>
+            <a:lvl1pPr algn="l">
+              <a:defRPr sz="1200"/>
+            </a:lvl1pPr>
+          </a:lstStyle>
+          <a:p>
+            <a:endParaRPr lang="en-US"/>
+          </a:p>
+        </p:txBody>
+      </p:sp>
+      <p:sp>
+        <p:nvSpPr>
+          <p:cNvPr id="7" name="Slide Number Placeholder 6"/>
+          <p:cNvSpPr>
+            <a:spLocks noGrp="1"/>
+          </p:cNvSpPr>
+          <p:nvPr>
+            <p:ph type="sldNum" sz="quarter" idx="5"/>
+          </p:nvPr>
+        </p:nvSpPr>
+        <p:spPr>
+          <a:xfrm>
+            <a:off x="3884613" y="8685213"/>
+            <a:ext cx="2971800" cy="458787"/>
+          </a:xfrm>
+          <a:prstGeom prst="rect">
+            <a:avLst/>
+          </a:prstGeom>
+        </p:spPr>
+        <p:txBody>
+          <a:bodyPr vert="horz" lIns="91440" tIns="45720" rIns="91440" bIns="45720" rtlCol="0" anchor="b"/>
+          <a:lstStyle>
+            <a:lvl1pPr algn="r">
+              <a:defRPr sz="1200"/>
+            </a:lvl1pPr>
+          </a:lstStyle>
+          <a:p>
+            <a:fld id="{740B04E9-EE27-490B-B120-9E5E749DAD50}" type="slidenum">
+              <a:rPr lang="en-US" smtClean="0"/>
+              <a:t>‹#›</a:t>
+            </a:fld>
+            <a:endParaRPr lang="en-US"/>
+          </a:p>
+        </p:txBody>
+      </p:sp>
+    </p:spTree>
+    <p:extLst>
+      <p:ext uri="{BB962C8B-B14F-4D97-AF65-F5344CB8AC3E}">
+        <p14:creationId xmlns:p14="http://schemas.microsoft.com/office/powerpoint/2010/main" val="1248914360"/>
+      </p:ext>
+    </p:extLst>
+  </p:cSld>
+  <p:clrMap bg1="lt1" tx1="dk1" bg2="lt2" tx2="dk2" accent1="accent1" accent2="accent2" accent3="accent3" accent4="accent4" accent5="accent5" accent6="accent6" hlink="hlink" folHlink="folHlink"/>
+  <p:notesStyle>
+    <a:lvl1pPr marL="0" algn="l" defTabSz="914400" rtl="0" eaLnBrk="1" latinLnBrk="0" hangingPunct="1">
+      <a:defRPr sz="1200" kern="1200">
+        <a:solidFill>
+          <a:schemeClr val="tx1"/>
+        </a:solidFill>
+        <a:latin typeface="+mn-lt"/>
+        <a:ea typeface="+mn-ea"/>
+        <a:cs typeface="+mn-cs"/>
+      </a:defRPr>
+    </a:lvl1pPr>
+    <a:lvl2pPr marL="457200" algn="l" defTabSz="914400" rtl="0" eaLnBrk="1" latinLnBrk="0" hangingPunct="1">
+      <a:defRPr sz="1200" kern="1200">
+        <a:solidFill>
+          <a:schemeClr val="tx1"/>
+        </a:solidFill>
+        <a:latin typeface="+mn-lt"/>
+        <a:ea typeface="+mn-ea"/>
+        <a:cs typeface="+mn-cs"/>
+      </a:defRPr>
+    </a:lvl2pPr>
+    <a:lvl3pPr marL="914400" algn="l" defTabSz="914400" rtl="0" eaLnBrk="1" latinLnBrk="0" hangingPunct="1">
+      <a:defRPr sz="1200" kern="1200">
+        <a:solidFill>
+          <a:schemeClr val="tx1"/>
+        </a:solidFill>
+        <a:latin typeface="+mn-lt"/>
+        <a:ea typeface="+mn-ea"/>
+        <a:cs typeface="+mn-cs"/>
+      </a:defRPr>
+    </a:lvl3pPr>
+    <a:lvl4pPr marL="1371600" algn="l" defTabSz="914400" rtl="0" eaLnBrk="1" latinLnBrk="0" hangingPunct="1">
+      <a:defRPr sz="1200" kern="1200">
+        <a:solidFill>
+          <a:schemeClr val="tx1"/>
+        </a:solidFill>
+        <a:latin typeface="+mn-lt"/>
+        <a:ea typeface="+mn-ea"/>
+        <a:cs typeface="+mn-cs"/>
+      </a:defRPr>
+    </a:lvl4pPr>
+    <a:lvl5pPr marL="1828800" algn="l" defTabSz="914400" rtl="0" eaLnBrk="1" latinLnBrk="0" hangingPunct="1">
+      <a:defRPr sz="1200" kern="1200">
+        <a:solidFill>
+          <a:schemeClr val="tx1"/>
+        </a:solidFill>
+        <a:latin typeface="+mn-lt"/>
+        <a:ea typeface="+mn-ea"/>
+        <a:cs typeface="+mn-cs"/>
+      </a:defRPr>
+    </a:lvl5pPr>
+    <a:lvl6pPr marL="2286000" algn="l" defTabSz="914400" rtl="0" eaLnBrk="1" latinLnBrk="0" hangingPunct="1">
+      <a:defRPr sz="1200" kern="1200">
+        <a:solidFill>
+          <a:schemeClr val="tx1"/>
+        </a:solidFill>
+        <a:latin typeface="+mn-lt"/>
+        <a:ea typeface="+mn-ea"/>
+        <a:cs typeface="+mn-cs"/>
+      </a:defRPr>
+    </a:lvl6pPr>
+    <a:lvl7pPr marL="2743200" algn="l" defTabSz="914400" rtl="0" eaLnBrk="1" latinLnBrk="0" hangingPunct="1">
+      <a:defRPr sz="1200" kern="1200">
+        <a:solidFill>
+          <a:schemeClr val="tx1"/>
+        </a:solidFill>
+        <a:latin typeface="+mn-lt"/>
+        <a:ea typeface="+mn-ea"/>
+        <a:cs typeface="+mn-cs"/>
+      </a:defRPr>
+    </a:lvl7pPr>
+    <a:lvl8pPr marL="3200400" algn="l" defTabSz="914400" rtl="0" eaLnBrk="1" latinLnBrk="0" hangingPunct="1">
+      <a:defRPr sz="1200" kern="1200">
+        <a:solidFill>
+          <a:schemeClr val="tx1"/>
+        </a:solidFill>
+        <a:latin typeface="+mn-lt"/>
+        <a:ea typeface="+mn-ea"/>
+        <a:cs typeface="+mn-cs"/>
+      </a:defRPr>
+    </a:lvl8pPr>
+    <a:lvl9pPr marL="3657600" algn="l" defTabSz="914400" rtl="0" eaLnBrk="1" latinLnBrk="0" hangingPunct="1">
+      <a:defRPr sz="1200" kern="1200">
+        <a:solidFill>
+          <a:schemeClr val="tx1"/>
+        </a:solidFill>
+        <a:latin typeface="+mn-lt"/>
+        <a:ea typeface="+mn-ea"/>
+        <a:cs typeface="+mn-cs"/>
+      </a:defRPr>
+    </a:lvl9pPr>
+  </p:notesStyle>
+</p:notesMaster>
+</file>
+
+<file path=ppt/notesSlides/notesSlide1.xml><?xml version="1.0" encoding="utf-8"?>
+<p:notes xmlns:a="http://schemas.openxmlformats.org/drawingml/2006/main" xmlns:r="http://schemas.openxmlformats.org/officeDocument/2006/relationships" xmlns:p="http://schemas.openxmlformats.org/presentationml/2006/main">
+  <p:cSld>
+    <p:spTree>
+      <p:nvGrpSpPr>
+        <p:cNvPr id="1" name=""/>
+        <p:cNvGrpSpPr/>
+        <p:nvPr/>
+      </p:nvGrpSpPr>
+      <p:grpSpPr>
+        <a:xfrm>
+          <a:off x="0" y="0"/>
+          <a:ext cx="0" cy="0"/>
+          <a:chOff x="0" y="0"/>
+          <a:chExt cx="0" cy="0"/>
+        </a:xfrm>
+      </p:grpSpPr>
+      <p:sp>
+        <p:nvSpPr>
+          <p:cNvPr id="2" name="Slide Image Placeholder 1"/>
+          <p:cNvSpPr>
+            <a:spLocks noGrp="1" noRot="1" noChangeAspect="1"/>
+          </p:cNvSpPr>
+          <p:nvPr>
+            <p:ph type="sldImg"/>
+          </p:nvPr>
+        </p:nvSpPr>
+        <p:spPr/>
+      </p:sp>
+      <p:sp>
+        <p:nvSpPr>
+          <p:cNvPr id="3" name="Notes Placeholder 2"/>
+          <p:cNvSpPr>
+            <a:spLocks noGrp="1"/>
+          </p:cNvSpPr>
+          <p:nvPr>
+            <p:ph type="body" idx="1"/>
+          </p:nvPr>
+        </p:nvSpPr>
+        <p:spPr/>
+        <p:txBody>
+          <a:bodyPr/>
+          <a:lstStyle/>
+          <a:p>
+            <a:r>
+              <a:rPr lang="ru-RU" dirty="0"/>
+              <a:t>Добрый день, уважаемая аудитория.</a:t>
+            </a:r>
+            <a:br>
+              <a:rPr lang="ru-RU" dirty="0"/>
+            </a:br>
+            <a:r>
+              <a:rPr lang="ru-RU" dirty="0"/>
+              <a:t>Представляю вашему вниманию доклад на тему классификации саженцов растений.</a:t>
+            </a:r>
+            <a:endParaRPr lang="en-US" dirty="0"/>
+          </a:p>
+        </p:txBody>
+      </p:sp>
+      <p:sp>
+        <p:nvSpPr>
+          <p:cNvPr id="4" name="Slide Number Placeholder 3"/>
+          <p:cNvSpPr>
+            <a:spLocks noGrp="1"/>
+          </p:cNvSpPr>
+          <p:nvPr>
+            <p:ph type="sldNum" sz="quarter" idx="5"/>
+          </p:nvPr>
+        </p:nvSpPr>
+        <p:spPr/>
+        <p:txBody>
+          <a:bodyPr/>
+          <a:lstStyle/>
+          <a:p>
+            <a:fld id="{740B04E9-EE27-490B-B120-9E5E749DAD50}" type="slidenum">
+              <a:rPr lang="en-US" smtClean="0"/>
+              <a:t>1</a:t>
+            </a:fld>
+            <a:endParaRPr lang="en-US"/>
+          </a:p>
+        </p:txBody>
+      </p:sp>
+    </p:spTree>
+    <p:extLst>
+      <p:ext uri="{BB962C8B-B14F-4D97-AF65-F5344CB8AC3E}">
+        <p14:creationId xmlns:p14="http://schemas.microsoft.com/office/powerpoint/2010/main" val="2969563968"/>
+      </p:ext>
+    </p:extLst>
+  </p:cSld>
+  <p:clrMapOvr>
+    <a:masterClrMapping/>
+  </p:clrMapOvr>
+</p:notes>
+</file>
+
+<file path=ppt/notesSlides/notesSlide10.xml><?xml version="1.0" encoding="utf-8"?>
+<p:notes xmlns:a="http://schemas.openxmlformats.org/drawingml/2006/main" xmlns:r="http://schemas.openxmlformats.org/officeDocument/2006/relationships" xmlns:p="http://schemas.openxmlformats.org/presentationml/2006/main">
+  <p:cSld>
+    <p:spTree>
+      <p:nvGrpSpPr>
+        <p:cNvPr id="1" name=""/>
+        <p:cNvGrpSpPr/>
+        <p:nvPr/>
+      </p:nvGrpSpPr>
+      <p:grpSpPr>
+        <a:xfrm>
+          <a:off x="0" y="0"/>
+          <a:ext cx="0" cy="0"/>
+          <a:chOff x="0" y="0"/>
+          <a:chExt cx="0" cy="0"/>
+        </a:xfrm>
+      </p:grpSpPr>
+      <p:sp>
+        <p:nvSpPr>
+          <p:cNvPr id="2" name="Slide Image Placeholder 1"/>
+          <p:cNvSpPr>
+            <a:spLocks noGrp="1" noRot="1" noChangeAspect="1"/>
+          </p:cNvSpPr>
+          <p:nvPr>
+            <p:ph type="sldImg"/>
+          </p:nvPr>
+        </p:nvSpPr>
+        <p:spPr/>
+      </p:sp>
+      <p:sp>
+        <p:nvSpPr>
+          <p:cNvPr id="3" name="Notes Placeholder 2"/>
+          <p:cNvSpPr>
+            <a:spLocks noGrp="1"/>
+          </p:cNvSpPr>
+          <p:nvPr>
+            <p:ph type="body" idx="1"/>
+          </p:nvPr>
+        </p:nvSpPr>
+        <p:spPr/>
+        <p:txBody>
+          <a:bodyPr/>
+          <a:lstStyle/>
+          <a:p>
+            <a:r>
+              <a:rPr lang="ru-RU" dirty="0"/>
+              <a:t>Для классификации мы выбрали 4 подход (представлены на слайде), а именно свм, к ближайших соседей, наивный байесовский классификатор и дерево решений. </a:t>
+            </a:r>
+          </a:p>
+          <a:p>
+            <a:r>
+              <a:rPr lang="ru-RU" dirty="0"/>
+              <a:t>Так как СВМ чувствиетелен к неотмасштабированным данным при выборе в качестве ядра </a:t>
+            </a:r>
+            <a:r>
+              <a:rPr lang="ru-RU" sz="1200" b="0" i="0" kern="1200" dirty="0">
+                <a:solidFill>
+                  <a:schemeClr val="tx1"/>
+                </a:solidFill>
+                <a:effectLst/>
+                <a:latin typeface="+mn-lt"/>
+                <a:ea typeface="+mn-ea"/>
+                <a:cs typeface="+mn-cs"/>
+              </a:rPr>
+              <a:t>радиальная базисная функция Гаусса</a:t>
+            </a:r>
+            <a:r>
+              <a:rPr lang="ru-RU" dirty="0"/>
+              <a:t>, то мы отнормализовали данные.</a:t>
+            </a:r>
+            <a:endParaRPr lang="en-US" dirty="0"/>
+          </a:p>
+        </p:txBody>
+      </p:sp>
+      <p:sp>
+        <p:nvSpPr>
+          <p:cNvPr id="4" name="Slide Number Placeholder 3"/>
+          <p:cNvSpPr>
+            <a:spLocks noGrp="1"/>
+          </p:cNvSpPr>
+          <p:nvPr>
+            <p:ph type="sldNum" sz="quarter" idx="5"/>
+          </p:nvPr>
+        </p:nvSpPr>
+        <p:spPr/>
+        <p:txBody>
+          <a:bodyPr/>
+          <a:lstStyle/>
+          <a:p>
+            <a:fld id="{740B04E9-EE27-490B-B120-9E5E749DAD50}" type="slidenum">
+              <a:rPr lang="en-US" smtClean="0"/>
+              <a:t>10</a:t>
+            </a:fld>
+            <a:endParaRPr lang="en-US"/>
+          </a:p>
+        </p:txBody>
+      </p:sp>
+    </p:spTree>
+    <p:extLst>
+      <p:ext uri="{BB962C8B-B14F-4D97-AF65-F5344CB8AC3E}">
+        <p14:creationId xmlns:p14="http://schemas.microsoft.com/office/powerpoint/2010/main" val="2019018453"/>
+      </p:ext>
+    </p:extLst>
+  </p:cSld>
+  <p:clrMapOvr>
+    <a:masterClrMapping/>
+  </p:clrMapOvr>
+</p:notes>
+</file>
+
+<file path=ppt/notesSlides/notesSlide11.xml><?xml version="1.0" encoding="utf-8"?>
+<p:notes xmlns:a="http://schemas.openxmlformats.org/drawingml/2006/main" xmlns:r="http://schemas.openxmlformats.org/officeDocument/2006/relationships" xmlns:p="http://schemas.openxmlformats.org/presentationml/2006/main">
+  <p:cSld>
+    <p:spTree>
+      <p:nvGrpSpPr>
+        <p:cNvPr id="1" name=""/>
+        <p:cNvGrpSpPr/>
+        <p:nvPr/>
+      </p:nvGrpSpPr>
+      <p:grpSpPr>
+        <a:xfrm>
+          <a:off x="0" y="0"/>
+          <a:ext cx="0" cy="0"/>
+          <a:chOff x="0" y="0"/>
+          <a:chExt cx="0" cy="0"/>
+        </a:xfrm>
+      </p:grpSpPr>
+      <p:sp>
+        <p:nvSpPr>
+          <p:cNvPr id="2" name="Slide Image Placeholder 1"/>
+          <p:cNvSpPr>
+            <a:spLocks noGrp="1" noRot="1" noChangeAspect="1"/>
+          </p:cNvSpPr>
+          <p:nvPr>
+            <p:ph type="sldImg"/>
+          </p:nvPr>
+        </p:nvSpPr>
+        <p:spPr/>
+      </p:sp>
+      <p:sp>
+        <p:nvSpPr>
+          <p:cNvPr id="3" name="Notes Placeholder 2"/>
+          <p:cNvSpPr>
+            <a:spLocks noGrp="1"/>
+          </p:cNvSpPr>
+          <p:nvPr>
+            <p:ph type="body" idx="1"/>
+          </p:nvPr>
+        </p:nvSpPr>
+        <p:spPr/>
+        <p:txBody>
+          <a:bodyPr/>
+          <a:lstStyle/>
+          <a:p>
+            <a:r>
+              <a:rPr lang="ru-RU" dirty="0"/>
+              <a:t>Оценку мы проводили на тестовом датасете из 960 растений с помощью </a:t>
+            </a:r>
+            <a:r>
+              <a:rPr lang="en-US" dirty="0"/>
+              <a:t>F </a:t>
+            </a:r>
+            <a:r>
+              <a:rPr lang="ru-RU" dirty="0"/>
+              <a:t>меры (формулы представлены на слайде). </a:t>
+            </a:r>
+          </a:p>
+          <a:p>
+            <a:r>
+              <a:rPr lang="ru-RU" dirty="0"/>
+              <a:t>На слайде прдесталвены результаты для СВМ, так как он показал наилучшие результаты.</a:t>
+            </a:r>
+            <a:endParaRPr lang="en-US" dirty="0"/>
+          </a:p>
+        </p:txBody>
+      </p:sp>
+      <p:sp>
+        <p:nvSpPr>
+          <p:cNvPr id="4" name="Slide Number Placeholder 3"/>
+          <p:cNvSpPr>
+            <a:spLocks noGrp="1"/>
+          </p:cNvSpPr>
+          <p:nvPr>
+            <p:ph type="sldNum" sz="quarter" idx="5"/>
+          </p:nvPr>
+        </p:nvSpPr>
+        <p:spPr/>
+        <p:txBody>
+          <a:bodyPr/>
+          <a:lstStyle/>
+          <a:p>
+            <a:fld id="{740B04E9-EE27-490B-B120-9E5E749DAD50}" type="slidenum">
+              <a:rPr lang="en-US" smtClean="0"/>
+              <a:t>11</a:t>
+            </a:fld>
+            <a:endParaRPr lang="en-US"/>
+          </a:p>
+        </p:txBody>
+      </p:sp>
+    </p:spTree>
+    <p:extLst>
+      <p:ext uri="{BB962C8B-B14F-4D97-AF65-F5344CB8AC3E}">
+        <p14:creationId xmlns:p14="http://schemas.microsoft.com/office/powerpoint/2010/main" val="1735647970"/>
+      </p:ext>
+    </p:extLst>
+  </p:cSld>
+  <p:clrMapOvr>
+    <a:masterClrMapping/>
+  </p:clrMapOvr>
+</p:notes>
+</file>
+
+<file path=ppt/notesSlides/notesSlide12.xml><?xml version="1.0" encoding="utf-8"?>
+<p:notes xmlns:a="http://schemas.openxmlformats.org/drawingml/2006/main" xmlns:r="http://schemas.openxmlformats.org/officeDocument/2006/relationships" xmlns:p="http://schemas.openxmlformats.org/presentationml/2006/main">
+  <p:cSld>
+    <p:spTree>
+      <p:nvGrpSpPr>
+        <p:cNvPr id="1" name=""/>
+        <p:cNvGrpSpPr/>
+        <p:nvPr/>
+      </p:nvGrpSpPr>
+      <p:grpSpPr>
+        <a:xfrm>
+          <a:off x="0" y="0"/>
+          <a:ext cx="0" cy="0"/>
+          <a:chOff x="0" y="0"/>
+          <a:chExt cx="0" cy="0"/>
+        </a:xfrm>
+      </p:grpSpPr>
+      <p:sp>
+        <p:nvSpPr>
+          <p:cNvPr id="2" name="Slide Image Placeholder 1"/>
+          <p:cNvSpPr>
+            <a:spLocks noGrp="1" noRot="1" noChangeAspect="1"/>
+          </p:cNvSpPr>
+          <p:nvPr>
+            <p:ph type="sldImg"/>
+          </p:nvPr>
+        </p:nvSpPr>
+        <p:spPr/>
+      </p:sp>
+      <p:sp>
+        <p:nvSpPr>
+          <p:cNvPr id="3" name="Notes Placeholder 2"/>
+          <p:cNvSpPr>
+            <a:spLocks noGrp="1"/>
+          </p:cNvSpPr>
+          <p:nvPr>
+            <p:ph type="body" idx="1"/>
+          </p:nvPr>
+        </p:nvSpPr>
+        <p:spPr/>
+        <p:txBody>
+          <a:bodyPr/>
+          <a:lstStyle/>
+          <a:p>
+            <a:r>
+              <a:rPr lang="ru-RU" dirty="0"/>
+              <a:t>На слайде представлены результаты по каждому из классификаторов. СВМ и метод к ближайших соседий показали наилучшие результаты, так как </a:t>
+            </a:r>
+            <a:r>
+              <a:rPr lang="en-US" dirty="0" err="1"/>
+              <a:t>knn</a:t>
+            </a:r>
+            <a:r>
+              <a:rPr lang="ru-RU" dirty="0"/>
+              <a:t> нечувствителен к нелинейным данным, а в случае СВМ мы использовали в качестве ядра </a:t>
+            </a:r>
+            <a:r>
+              <a:rPr lang="ru-RU" sz="1200" b="0" i="0" kern="1200" dirty="0">
+                <a:solidFill>
+                  <a:schemeClr val="tx1"/>
+                </a:solidFill>
+                <a:effectLst/>
+                <a:latin typeface="+mn-lt"/>
+                <a:ea typeface="+mn-ea"/>
+                <a:cs typeface="+mn-cs"/>
+              </a:rPr>
+              <a:t>радиальная базисная функция Гаусса. Дерево решения чувствительны к нелинейным данным, поэтому имеют значительно хуже результат чем СВМ. </a:t>
+            </a:r>
+          </a:p>
+          <a:p>
+            <a:r>
+              <a:rPr lang="ru-RU" sz="1200" b="0" i="0" kern="1200" dirty="0">
+                <a:solidFill>
+                  <a:schemeClr val="tx1"/>
+                </a:solidFill>
+                <a:effectLst/>
+                <a:latin typeface="+mn-lt"/>
+                <a:ea typeface="+mn-ea"/>
+                <a:cs typeface="+mn-cs"/>
+              </a:rPr>
+              <a:t>Плохие результаты наивного байесовского классификатора мы объясняем тем, что мы не подтверждали независимость признаков между собой.</a:t>
+            </a:r>
+          </a:p>
+          <a:p>
+            <a:endParaRPr lang="en-US" dirty="0"/>
+          </a:p>
+        </p:txBody>
+      </p:sp>
+      <p:sp>
+        <p:nvSpPr>
+          <p:cNvPr id="4" name="Slide Number Placeholder 3"/>
+          <p:cNvSpPr>
+            <a:spLocks noGrp="1"/>
+          </p:cNvSpPr>
+          <p:nvPr>
+            <p:ph type="sldNum" sz="quarter" idx="5"/>
+          </p:nvPr>
+        </p:nvSpPr>
+        <p:spPr/>
+        <p:txBody>
+          <a:bodyPr/>
+          <a:lstStyle/>
+          <a:p>
+            <a:fld id="{740B04E9-EE27-490B-B120-9E5E749DAD50}" type="slidenum">
+              <a:rPr lang="en-US" smtClean="0"/>
+              <a:t>12</a:t>
+            </a:fld>
+            <a:endParaRPr lang="en-US"/>
+          </a:p>
+        </p:txBody>
+      </p:sp>
+    </p:spTree>
+    <p:extLst>
+      <p:ext uri="{BB962C8B-B14F-4D97-AF65-F5344CB8AC3E}">
+        <p14:creationId xmlns:p14="http://schemas.microsoft.com/office/powerpoint/2010/main" val="2097594540"/>
+      </p:ext>
+    </p:extLst>
+  </p:cSld>
+  <p:clrMapOvr>
+    <a:masterClrMapping/>
+  </p:clrMapOvr>
+</p:notes>
+</file>
+
+<file path=ppt/notesSlides/notesSlide13.xml><?xml version="1.0" encoding="utf-8"?>
+<p:notes xmlns:a="http://schemas.openxmlformats.org/drawingml/2006/main" xmlns:r="http://schemas.openxmlformats.org/officeDocument/2006/relationships" xmlns:p="http://schemas.openxmlformats.org/presentationml/2006/main">
+  <p:cSld>
+    <p:spTree>
+      <p:nvGrpSpPr>
+        <p:cNvPr id="1" name=""/>
+        <p:cNvGrpSpPr/>
+        <p:nvPr/>
+      </p:nvGrpSpPr>
+      <p:grpSpPr>
+        <a:xfrm>
+          <a:off x="0" y="0"/>
+          <a:ext cx="0" cy="0"/>
+          <a:chOff x="0" y="0"/>
+          <a:chExt cx="0" cy="0"/>
+        </a:xfrm>
+      </p:grpSpPr>
+      <p:sp>
+        <p:nvSpPr>
+          <p:cNvPr id="2" name="Slide Image Placeholder 1"/>
+          <p:cNvSpPr>
+            <a:spLocks noGrp="1" noRot="1" noChangeAspect="1"/>
+          </p:cNvSpPr>
+          <p:nvPr>
+            <p:ph type="sldImg"/>
+          </p:nvPr>
+        </p:nvSpPr>
+        <p:spPr/>
+      </p:sp>
+      <p:sp>
+        <p:nvSpPr>
+          <p:cNvPr id="3" name="Notes Placeholder 2"/>
+          <p:cNvSpPr>
+            <a:spLocks noGrp="1"/>
+          </p:cNvSpPr>
+          <p:nvPr>
+            <p:ph type="body" idx="1"/>
+          </p:nvPr>
+        </p:nvSpPr>
+        <p:spPr/>
+        <p:txBody>
+          <a:bodyPr/>
+          <a:lstStyle/>
+          <a:p>
+            <a:r>
+              <a:rPr lang="ru-RU" dirty="0"/>
+              <a:t>В работе предложен и реализоан набор шагов для предобработки данных, а именно нормализации масштаба, сегментация и удаление шума.</a:t>
+            </a:r>
+          </a:p>
+          <a:p>
+            <a:r>
+              <a:rPr lang="ru-RU" dirty="0"/>
+              <a:t>Так же представлены и реализоаны построения признаков с помощью которых можно классифицировать саженцы расстений</a:t>
+            </a:r>
+          </a:p>
+          <a:p>
+            <a:r>
+              <a:rPr lang="ru-RU" dirty="0"/>
+              <a:t>В работе использованы 4 базовых алгоритма классификации, которые позволяют получить хорошие результаты на тестовой выборке.</a:t>
+            </a:r>
+            <a:endParaRPr lang="en-US" dirty="0"/>
+          </a:p>
+        </p:txBody>
+      </p:sp>
+      <p:sp>
+        <p:nvSpPr>
+          <p:cNvPr id="4" name="Slide Number Placeholder 3"/>
+          <p:cNvSpPr>
+            <a:spLocks noGrp="1"/>
+          </p:cNvSpPr>
+          <p:nvPr>
+            <p:ph type="sldNum" sz="quarter" idx="5"/>
+          </p:nvPr>
+        </p:nvSpPr>
+        <p:spPr/>
+        <p:txBody>
+          <a:bodyPr/>
+          <a:lstStyle/>
+          <a:p>
+            <a:fld id="{740B04E9-EE27-490B-B120-9E5E749DAD50}" type="slidenum">
+              <a:rPr lang="en-US" smtClean="0"/>
+              <a:t>13</a:t>
+            </a:fld>
+            <a:endParaRPr lang="en-US"/>
+          </a:p>
+        </p:txBody>
+      </p:sp>
+    </p:spTree>
+    <p:extLst>
+      <p:ext uri="{BB962C8B-B14F-4D97-AF65-F5344CB8AC3E}">
+        <p14:creationId xmlns:p14="http://schemas.microsoft.com/office/powerpoint/2010/main" val="2223106889"/>
+      </p:ext>
+    </p:extLst>
+  </p:cSld>
+  <p:clrMapOvr>
+    <a:masterClrMapping/>
+  </p:clrMapOvr>
+</p:notes>
+</file>
+
+<file path=ppt/notesSlides/notesSlide2.xml><?xml version="1.0" encoding="utf-8"?>
+<p:notes xmlns:a="http://schemas.openxmlformats.org/drawingml/2006/main" xmlns:r="http://schemas.openxmlformats.org/officeDocument/2006/relationships" xmlns:p="http://schemas.openxmlformats.org/presentationml/2006/main">
+  <p:cSld>
+    <p:spTree>
+      <p:nvGrpSpPr>
+        <p:cNvPr id="1" name=""/>
+        <p:cNvGrpSpPr/>
+        <p:nvPr/>
+      </p:nvGrpSpPr>
+      <p:grpSpPr>
+        <a:xfrm>
+          <a:off x="0" y="0"/>
+          <a:ext cx="0" cy="0"/>
+          <a:chOff x="0" y="0"/>
+          <a:chExt cx="0" cy="0"/>
+        </a:xfrm>
+      </p:grpSpPr>
+      <p:sp>
+        <p:nvSpPr>
+          <p:cNvPr id="2" name="Slide Image Placeholder 1"/>
+          <p:cNvSpPr>
+            <a:spLocks noGrp="1" noRot="1" noChangeAspect="1"/>
+          </p:cNvSpPr>
+          <p:nvPr>
+            <p:ph type="sldImg"/>
+          </p:nvPr>
+        </p:nvSpPr>
+        <p:spPr/>
+      </p:sp>
+      <p:sp>
+        <p:nvSpPr>
+          <p:cNvPr id="3" name="Notes Placeholder 2"/>
+          <p:cNvSpPr>
+            <a:spLocks noGrp="1"/>
+          </p:cNvSpPr>
+          <p:nvPr>
+            <p:ph type="body" idx="1"/>
+          </p:nvPr>
+        </p:nvSpPr>
+        <p:spPr/>
+        <p:txBody>
+          <a:bodyPr/>
+          <a:lstStyle/>
+          <a:p>
+            <a:r>
+              <a:rPr lang="ru-RU" dirty="0"/>
+              <a:t>Задача заключается в автоматизации классификации растений, а именно научиться отличать сорняки от рассады.</a:t>
+            </a:r>
+          </a:p>
+          <a:p>
+            <a:r>
+              <a:rPr lang="ru-RU" dirty="0"/>
+              <a:t>На слайде представлены примеры саженцов по 6 классам.</a:t>
+            </a:r>
+            <a:endParaRPr lang="en-US" dirty="0"/>
+          </a:p>
+        </p:txBody>
+      </p:sp>
+      <p:sp>
+        <p:nvSpPr>
+          <p:cNvPr id="4" name="Slide Number Placeholder 3"/>
+          <p:cNvSpPr>
+            <a:spLocks noGrp="1"/>
+          </p:cNvSpPr>
+          <p:nvPr>
+            <p:ph type="sldNum" sz="quarter" idx="5"/>
+          </p:nvPr>
+        </p:nvSpPr>
+        <p:spPr/>
+        <p:txBody>
+          <a:bodyPr/>
+          <a:lstStyle/>
+          <a:p>
+            <a:fld id="{740B04E9-EE27-490B-B120-9E5E749DAD50}" type="slidenum">
+              <a:rPr lang="en-US" smtClean="0"/>
+              <a:t>2</a:t>
+            </a:fld>
+            <a:endParaRPr lang="en-US"/>
+          </a:p>
+        </p:txBody>
+      </p:sp>
+    </p:spTree>
+    <p:extLst>
+      <p:ext uri="{BB962C8B-B14F-4D97-AF65-F5344CB8AC3E}">
+        <p14:creationId xmlns:p14="http://schemas.microsoft.com/office/powerpoint/2010/main" val="2903399552"/>
+      </p:ext>
+    </p:extLst>
+  </p:cSld>
+  <p:clrMapOvr>
+    <a:masterClrMapping/>
+  </p:clrMapOvr>
+</p:notes>
+</file>
+
+<file path=ppt/notesSlides/notesSlide3.xml><?xml version="1.0" encoding="utf-8"?>
+<p:notes xmlns:a="http://schemas.openxmlformats.org/drawingml/2006/main" xmlns:r="http://schemas.openxmlformats.org/officeDocument/2006/relationships" xmlns:p="http://schemas.openxmlformats.org/presentationml/2006/main">
+  <p:cSld>
+    <p:spTree>
+      <p:nvGrpSpPr>
+        <p:cNvPr id="1" name=""/>
+        <p:cNvGrpSpPr/>
+        <p:nvPr/>
+      </p:nvGrpSpPr>
+      <p:grpSpPr>
+        <a:xfrm>
+          <a:off x="0" y="0"/>
+          <a:ext cx="0" cy="0"/>
+          <a:chOff x="0" y="0"/>
+          <a:chExt cx="0" cy="0"/>
+        </a:xfrm>
+      </p:grpSpPr>
+      <p:sp>
+        <p:nvSpPr>
+          <p:cNvPr id="2" name="Slide Image Placeholder 1"/>
+          <p:cNvSpPr>
+            <a:spLocks noGrp="1" noRot="1" noChangeAspect="1"/>
+          </p:cNvSpPr>
+          <p:nvPr>
+            <p:ph type="sldImg"/>
+          </p:nvPr>
+        </p:nvSpPr>
+        <p:spPr/>
+      </p:sp>
+      <p:sp>
+        <p:nvSpPr>
+          <p:cNvPr id="3" name="Notes Placeholder 2"/>
+          <p:cNvSpPr>
+            <a:spLocks noGrp="1"/>
+          </p:cNvSpPr>
+          <p:nvPr>
+            <p:ph type="body" idx="1"/>
+          </p:nvPr>
+        </p:nvSpPr>
+        <p:spPr/>
+        <p:txBody>
+          <a:bodyPr/>
+          <a:lstStyle/>
+          <a:p>
+            <a:r>
+              <a:rPr lang="ru-RU" dirty="0"/>
+              <a:t>Набор данных содержит приблизительно 960 уникальных изображений растений 12 видов, находящихся на разных стадиях роста. Особенностью данных было наличие вариативности в масштабе от 50 на 50 пикселей до 2000 на 2000 пикселей. Исходные изображения уже кадрированы и не требуют дополнительной обрезки.</a:t>
+            </a:r>
+          </a:p>
+          <a:p>
+            <a:r>
+              <a:rPr lang="ru-RU" dirty="0"/>
+              <a:t>Для решения задачи мы сделали три шага предобработки изображений. </a:t>
+            </a:r>
+          </a:p>
+          <a:p>
+            <a:r>
+              <a:rPr lang="ru-RU" dirty="0"/>
+              <a:t>Первоначально мы привели к одному масштабу 200 на 200 пикселей с помощью билинейной интерполяции (в случае уменьшения размера новый пиксель изображения представляет собой взвешен-</a:t>
+            </a:r>
+          </a:p>
+          <a:p>
+            <a:r>
+              <a:rPr lang="ru-RU" dirty="0"/>
+              <a:t>ную сумму соседних пикселей исходного и наоборот в случае увеличения разрешения).</a:t>
+            </a:r>
+          </a:p>
+          <a:p>
+            <a:r>
+              <a:rPr lang="ru-RU" dirty="0"/>
+              <a:t>Далее, так как фон на снимках различен, то изображения мы будем сегментировать.</a:t>
+            </a:r>
+          </a:p>
+          <a:p>
+            <a:r>
+              <a:rPr lang="ru-RU" dirty="0"/>
+              <a:t>В конце мы попробуем убрать возникающий шум в результате сегментации изображения.</a:t>
+            </a:r>
+            <a:endParaRPr lang="en-US" dirty="0"/>
+          </a:p>
+        </p:txBody>
+      </p:sp>
+      <p:sp>
+        <p:nvSpPr>
+          <p:cNvPr id="4" name="Slide Number Placeholder 3"/>
+          <p:cNvSpPr>
+            <a:spLocks noGrp="1"/>
+          </p:cNvSpPr>
+          <p:nvPr>
+            <p:ph type="sldNum" sz="quarter" idx="5"/>
+          </p:nvPr>
+        </p:nvSpPr>
+        <p:spPr/>
+        <p:txBody>
+          <a:bodyPr/>
+          <a:lstStyle/>
+          <a:p>
+            <a:fld id="{740B04E9-EE27-490B-B120-9E5E749DAD50}" type="slidenum">
+              <a:rPr lang="en-US" smtClean="0"/>
+              <a:t>3</a:t>
+            </a:fld>
+            <a:endParaRPr lang="en-US"/>
+          </a:p>
+        </p:txBody>
+      </p:sp>
+    </p:spTree>
+    <p:extLst>
+      <p:ext uri="{BB962C8B-B14F-4D97-AF65-F5344CB8AC3E}">
+        <p14:creationId xmlns:p14="http://schemas.microsoft.com/office/powerpoint/2010/main" val="1404964041"/>
+      </p:ext>
+    </p:extLst>
+  </p:cSld>
+  <p:clrMapOvr>
+    <a:masterClrMapping/>
+  </p:clrMapOvr>
+</p:notes>
+</file>
+
+<file path=ppt/notesSlides/notesSlide4.xml><?xml version="1.0" encoding="utf-8"?>
+<p:notes xmlns:a="http://schemas.openxmlformats.org/drawingml/2006/main" xmlns:r="http://schemas.openxmlformats.org/officeDocument/2006/relationships" xmlns:p="http://schemas.openxmlformats.org/presentationml/2006/main">
+  <p:cSld>
+    <p:spTree>
+      <p:nvGrpSpPr>
+        <p:cNvPr id="1" name=""/>
+        <p:cNvGrpSpPr/>
+        <p:nvPr/>
+      </p:nvGrpSpPr>
+      <p:grpSpPr>
+        <a:xfrm>
+          <a:off x="0" y="0"/>
+          <a:ext cx="0" cy="0"/>
+          <a:chOff x="0" y="0"/>
+          <a:chExt cx="0" cy="0"/>
+        </a:xfrm>
+      </p:grpSpPr>
+      <p:sp>
+        <p:nvSpPr>
+          <p:cNvPr id="2" name="Slide Image Placeholder 1"/>
+          <p:cNvSpPr>
+            <a:spLocks noGrp="1" noRot="1" noChangeAspect="1"/>
+          </p:cNvSpPr>
+          <p:nvPr>
+            <p:ph type="sldImg"/>
+          </p:nvPr>
+        </p:nvSpPr>
+        <p:spPr/>
+      </p:sp>
+      <p:sp>
+        <p:nvSpPr>
+          <p:cNvPr id="3" name="Notes Placeholder 2"/>
+          <p:cNvSpPr>
+            <a:spLocks noGrp="1"/>
+          </p:cNvSpPr>
+          <p:nvPr>
+            <p:ph type="body" idx="1"/>
+          </p:nvPr>
+        </p:nvSpPr>
+        <p:spPr/>
+        <p:txBody>
+          <a:bodyPr/>
+          <a:lstStyle/>
+          <a:p>
+            <a:r>
+              <a:rPr lang="ru-RU" dirty="0"/>
+              <a:t>Представленные растения окрашены в зеленый цвет (изображение а). </a:t>
+            </a:r>
+          </a:p>
+          <a:p>
+            <a:r>
+              <a:rPr lang="ru-RU" dirty="0"/>
+              <a:t>Для этого выбрали диапазон зеленых оттенков, по которому помечали нужные нам пиксели, остальные – игнорировали. Таким образом получается маска (изображени б).</a:t>
+            </a:r>
+            <a:endParaRPr lang="en-US" dirty="0"/>
+          </a:p>
+          <a:p>
+            <a:r>
+              <a:rPr lang="ru-RU" dirty="0"/>
+              <a:t>После логического умножения с исходным изображеним и присвоением фону черным цветом получалось сегментированное изображение (изображение с)</a:t>
+            </a:r>
+          </a:p>
+          <a:p>
+            <a:r>
+              <a:rPr lang="ru-RU" dirty="0"/>
+              <a:t>Цветовую модель </a:t>
+            </a:r>
+            <a:r>
+              <a:rPr lang="en-US" dirty="0"/>
+              <a:t>HSV </a:t>
+            </a:r>
+            <a:r>
+              <a:rPr lang="ru-RU" dirty="0"/>
+              <a:t>(цветовой тон, насыщенность и яркость</a:t>
+            </a:r>
+            <a:r>
+              <a:rPr lang="en-US" dirty="0"/>
+              <a:t>)/</a:t>
+            </a:r>
+          </a:p>
+        </p:txBody>
+      </p:sp>
+      <p:sp>
+        <p:nvSpPr>
+          <p:cNvPr id="4" name="Slide Number Placeholder 3"/>
+          <p:cNvSpPr>
+            <a:spLocks noGrp="1"/>
+          </p:cNvSpPr>
+          <p:nvPr>
+            <p:ph type="sldNum" sz="quarter" idx="5"/>
+          </p:nvPr>
+        </p:nvSpPr>
+        <p:spPr/>
+        <p:txBody>
+          <a:bodyPr/>
+          <a:lstStyle/>
+          <a:p>
+            <a:fld id="{740B04E9-EE27-490B-B120-9E5E749DAD50}" type="slidenum">
+              <a:rPr lang="en-US" smtClean="0"/>
+              <a:t>4</a:t>
+            </a:fld>
+            <a:endParaRPr lang="en-US"/>
+          </a:p>
+        </p:txBody>
+      </p:sp>
+    </p:spTree>
+    <p:extLst>
+      <p:ext uri="{BB962C8B-B14F-4D97-AF65-F5344CB8AC3E}">
+        <p14:creationId xmlns:p14="http://schemas.microsoft.com/office/powerpoint/2010/main" val="2874118564"/>
+      </p:ext>
+    </p:extLst>
+  </p:cSld>
+  <p:clrMapOvr>
+    <a:masterClrMapping/>
+  </p:clrMapOvr>
+</p:notes>
+</file>
+
+<file path=ppt/notesSlides/notesSlide5.xml><?xml version="1.0" encoding="utf-8"?>
+<p:notes xmlns:a="http://schemas.openxmlformats.org/drawingml/2006/main" xmlns:r="http://schemas.openxmlformats.org/officeDocument/2006/relationships" xmlns:p="http://schemas.openxmlformats.org/presentationml/2006/main">
+  <p:cSld>
+    <p:spTree>
+      <p:nvGrpSpPr>
+        <p:cNvPr id="1" name=""/>
+        <p:cNvGrpSpPr/>
+        <p:nvPr/>
+      </p:nvGrpSpPr>
+      <p:grpSpPr>
+        <a:xfrm>
+          <a:off x="0" y="0"/>
+          <a:ext cx="0" cy="0"/>
+          <a:chOff x="0" y="0"/>
+          <a:chExt cx="0" cy="0"/>
+        </a:xfrm>
+      </p:grpSpPr>
+      <p:sp>
+        <p:nvSpPr>
+          <p:cNvPr id="2" name="Slide Image Placeholder 1"/>
+          <p:cNvSpPr>
+            <a:spLocks noGrp="1" noRot="1" noChangeAspect="1"/>
+          </p:cNvSpPr>
+          <p:nvPr>
+            <p:ph type="sldImg"/>
+          </p:nvPr>
+        </p:nvSpPr>
+        <p:spPr/>
+      </p:sp>
+      <p:sp>
+        <p:nvSpPr>
+          <p:cNvPr id="3" name="Notes Placeholder 2"/>
+          <p:cNvSpPr>
+            <a:spLocks noGrp="1"/>
+          </p:cNvSpPr>
+          <p:nvPr>
+            <p:ph type="body" idx="1"/>
+          </p:nvPr>
+        </p:nvSpPr>
+        <p:spPr/>
+        <p:txBody>
+          <a:bodyPr/>
+          <a:lstStyle/>
+          <a:p>
+            <a:r>
+              <a:rPr lang="ru-RU" dirty="0"/>
+              <a:t>Сегментация не всегда проходила хорошо, как показано на изображение а. Для улучшения сегментации применим операцию морфологического закрытия – комбинацию операций дилатации и эрозии.</a:t>
+            </a:r>
+          </a:p>
+          <a:p>
+            <a:r>
+              <a:rPr lang="ru-RU" dirty="0"/>
+              <a:t>Для дилитации и эрозии мы выбрали квадрат размером 3 на 3.</a:t>
+            </a:r>
+          </a:p>
+          <a:p>
+            <a:r>
+              <a:rPr lang="ru-RU" dirty="0"/>
+              <a:t>В резульатет нам удалось побороть шум, что видно на изображении </a:t>
+            </a:r>
+            <a:r>
+              <a:rPr lang="en-US" dirty="0"/>
+              <a:t>b.</a:t>
+            </a:r>
+            <a:endParaRPr lang="ru-RU" dirty="0"/>
+          </a:p>
+        </p:txBody>
+      </p:sp>
+      <p:sp>
+        <p:nvSpPr>
+          <p:cNvPr id="4" name="Slide Number Placeholder 3"/>
+          <p:cNvSpPr>
+            <a:spLocks noGrp="1"/>
+          </p:cNvSpPr>
+          <p:nvPr>
+            <p:ph type="sldNum" sz="quarter" idx="5"/>
+          </p:nvPr>
+        </p:nvSpPr>
+        <p:spPr/>
+        <p:txBody>
+          <a:bodyPr/>
+          <a:lstStyle/>
+          <a:p>
+            <a:fld id="{740B04E9-EE27-490B-B120-9E5E749DAD50}" type="slidenum">
+              <a:rPr lang="en-US" smtClean="0"/>
+              <a:t>5</a:t>
+            </a:fld>
+            <a:endParaRPr lang="en-US"/>
+          </a:p>
+        </p:txBody>
+      </p:sp>
+    </p:spTree>
+    <p:extLst>
+      <p:ext uri="{BB962C8B-B14F-4D97-AF65-F5344CB8AC3E}">
+        <p14:creationId xmlns:p14="http://schemas.microsoft.com/office/powerpoint/2010/main" val="4013569339"/>
+      </p:ext>
+    </p:extLst>
+  </p:cSld>
+  <p:clrMapOvr>
+    <a:masterClrMapping/>
+  </p:clrMapOvr>
+</p:notes>
+</file>
+
+<file path=ppt/notesSlides/notesSlide6.xml><?xml version="1.0" encoding="utf-8"?>
+<p:notes xmlns:a="http://schemas.openxmlformats.org/drawingml/2006/main" xmlns:r="http://schemas.openxmlformats.org/officeDocument/2006/relationships" xmlns:p="http://schemas.openxmlformats.org/presentationml/2006/main">
+  <p:cSld>
+    <p:spTree>
+      <p:nvGrpSpPr>
+        <p:cNvPr id="1" name=""/>
+        <p:cNvGrpSpPr/>
+        <p:nvPr/>
+      </p:nvGrpSpPr>
+      <p:grpSpPr>
+        <a:xfrm>
+          <a:off x="0" y="0"/>
+          <a:ext cx="0" cy="0"/>
+          <a:chOff x="0" y="0"/>
+          <a:chExt cx="0" cy="0"/>
+        </a:xfrm>
+      </p:grpSpPr>
+      <p:sp>
+        <p:nvSpPr>
+          <p:cNvPr id="2" name="Slide Image Placeholder 1"/>
+          <p:cNvSpPr>
+            <a:spLocks noGrp="1" noRot="1" noChangeAspect="1"/>
+          </p:cNvSpPr>
+          <p:nvPr>
+            <p:ph type="sldImg"/>
+          </p:nvPr>
+        </p:nvSpPr>
+        <p:spPr/>
+      </p:sp>
+      <p:sp>
+        <p:nvSpPr>
+          <p:cNvPr id="3" name="Notes Placeholder 2"/>
+          <p:cNvSpPr>
+            <a:spLocks noGrp="1"/>
+          </p:cNvSpPr>
+          <p:nvPr>
+            <p:ph type="body" idx="1"/>
+          </p:nvPr>
+        </p:nvSpPr>
+        <p:spPr/>
+        <p:txBody>
+          <a:bodyPr/>
+          <a:lstStyle/>
+          <a:p>
+            <a:r>
+              <a:rPr lang="ru-RU" dirty="0"/>
+              <a:t>Но морфологическое закрытие не всегда однозначно хорошо действует на изображения, как показано на слайде.</a:t>
+            </a:r>
+          </a:p>
+          <a:p>
+            <a:r>
+              <a:rPr lang="ru-RU" dirty="0"/>
+              <a:t>В результате восстанавливается часть фона. Поэтому мы решили отказаться от данного подхода в пользу удаления областей с малым контуром.</a:t>
+            </a:r>
+            <a:endParaRPr lang="en-US" dirty="0"/>
+          </a:p>
+        </p:txBody>
+      </p:sp>
+      <p:sp>
+        <p:nvSpPr>
+          <p:cNvPr id="4" name="Slide Number Placeholder 3"/>
+          <p:cNvSpPr>
+            <a:spLocks noGrp="1"/>
+          </p:cNvSpPr>
+          <p:nvPr>
+            <p:ph type="sldNum" sz="quarter" idx="5"/>
+          </p:nvPr>
+        </p:nvSpPr>
+        <p:spPr/>
+        <p:txBody>
+          <a:bodyPr/>
+          <a:lstStyle/>
+          <a:p>
+            <a:fld id="{740B04E9-EE27-490B-B120-9E5E749DAD50}" type="slidenum">
+              <a:rPr lang="en-US" smtClean="0"/>
+              <a:t>6</a:t>
+            </a:fld>
+            <a:endParaRPr lang="en-US"/>
+          </a:p>
+        </p:txBody>
+      </p:sp>
+    </p:spTree>
+    <p:extLst>
+      <p:ext uri="{BB962C8B-B14F-4D97-AF65-F5344CB8AC3E}">
+        <p14:creationId xmlns:p14="http://schemas.microsoft.com/office/powerpoint/2010/main" val="925997226"/>
+      </p:ext>
+    </p:extLst>
+  </p:cSld>
+  <p:clrMapOvr>
+    <a:masterClrMapping/>
+  </p:clrMapOvr>
+</p:notes>
+</file>
+
+<file path=ppt/notesSlides/notesSlide7.xml><?xml version="1.0" encoding="utf-8"?>
+<p:notes xmlns:a="http://schemas.openxmlformats.org/drawingml/2006/main" xmlns:r="http://schemas.openxmlformats.org/officeDocument/2006/relationships" xmlns:p="http://schemas.openxmlformats.org/presentationml/2006/main">
+  <p:cSld>
+    <p:spTree>
+      <p:nvGrpSpPr>
+        <p:cNvPr id="1" name=""/>
+        <p:cNvGrpSpPr/>
+        <p:nvPr/>
+      </p:nvGrpSpPr>
+      <p:grpSpPr>
+        <a:xfrm>
+          <a:off x="0" y="0"/>
+          <a:ext cx="0" cy="0"/>
+          <a:chOff x="0" y="0"/>
+          <a:chExt cx="0" cy="0"/>
+        </a:xfrm>
+      </p:grpSpPr>
+      <p:sp>
+        <p:nvSpPr>
+          <p:cNvPr id="2" name="Slide Image Placeholder 1"/>
+          <p:cNvSpPr>
+            <a:spLocks noGrp="1" noRot="1" noChangeAspect="1"/>
+          </p:cNvSpPr>
+          <p:nvPr>
+            <p:ph type="sldImg"/>
+          </p:nvPr>
+        </p:nvSpPr>
+        <p:spPr/>
+      </p:sp>
+      <p:sp>
+        <p:nvSpPr>
+          <p:cNvPr id="3" name="Notes Placeholder 2"/>
+          <p:cNvSpPr>
+            <a:spLocks noGrp="1"/>
+          </p:cNvSpPr>
+          <p:nvPr>
+            <p:ph type="body" idx="1"/>
+          </p:nvPr>
+        </p:nvSpPr>
+        <p:spPr/>
+        <p:txBody>
+          <a:bodyPr/>
+          <a:lstStyle/>
+          <a:p>
+            <a:r>
+              <a:rPr lang="ru-RU" dirty="0"/>
+              <a:t>Для установления сходства по цвету мы разделили изображение по трем каналам (зеленому, красному и синему, как показано на слайде) и посчитали по каждому из каналов среднее, среднее октлонение и коэффициент асимметрии.</a:t>
+            </a:r>
+            <a:endParaRPr lang="en-US" dirty="0"/>
+          </a:p>
+        </p:txBody>
+      </p:sp>
+      <p:sp>
+        <p:nvSpPr>
+          <p:cNvPr id="4" name="Slide Number Placeholder 3"/>
+          <p:cNvSpPr>
+            <a:spLocks noGrp="1"/>
+          </p:cNvSpPr>
+          <p:nvPr>
+            <p:ph type="sldNum" sz="quarter" idx="5"/>
+          </p:nvPr>
+        </p:nvSpPr>
+        <p:spPr/>
+        <p:txBody>
+          <a:bodyPr/>
+          <a:lstStyle/>
+          <a:p>
+            <a:fld id="{740B04E9-EE27-490B-B120-9E5E749DAD50}" type="slidenum">
+              <a:rPr lang="en-US" smtClean="0"/>
+              <a:t>7</a:t>
+            </a:fld>
+            <a:endParaRPr lang="en-US"/>
+          </a:p>
+        </p:txBody>
+      </p:sp>
+    </p:spTree>
+    <p:extLst>
+      <p:ext uri="{BB962C8B-B14F-4D97-AF65-F5344CB8AC3E}">
+        <p14:creationId xmlns:p14="http://schemas.microsoft.com/office/powerpoint/2010/main" val="2847079537"/>
+      </p:ext>
+    </p:extLst>
+  </p:cSld>
+  <p:clrMapOvr>
+    <a:masterClrMapping/>
+  </p:clrMapOvr>
+</p:notes>
+</file>
+
+<file path=ppt/notesSlides/notesSlide8.xml><?xml version="1.0" encoding="utf-8"?>
+<p:notes xmlns:a="http://schemas.openxmlformats.org/drawingml/2006/main" xmlns:r="http://schemas.openxmlformats.org/officeDocument/2006/relationships" xmlns:p="http://schemas.openxmlformats.org/presentationml/2006/main">
+  <p:cSld>
+    <p:spTree>
+      <p:nvGrpSpPr>
+        <p:cNvPr id="1" name=""/>
+        <p:cNvGrpSpPr/>
+        <p:nvPr/>
+      </p:nvGrpSpPr>
+      <p:grpSpPr>
+        <a:xfrm>
+          <a:off x="0" y="0"/>
+          <a:ext cx="0" cy="0"/>
+          <a:chOff x="0" y="0"/>
+          <a:chExt cx="0" cy="0"/>
+        </a:xfrm>
+      </p:grpSpPr>
+      <p:sp>
+        <p:nvSpPr>
+          <p:cNvPr id="2" name="Slide Image Placeholder 1"/>
+          <p:cNvSpPr>
+            <a:spLocks noGrp="1" noRot="1" noChangeAspect="1"/>
+          </p:cNvSpPr>
+          <p:nvPr>
+            <p:ph type="sldImg"/>
+          </p:nvPr>
+        </p:nvSpPr>
+        <p:spPr/>
+      </p:sp>
+      <p:sp>
+        <p:nvSpPr>
+          <p:cNvPr id="3" name="Notes Placeholder 2"/>
+          <p:cNvSpPr>
+            <a:spLocks noGrp="1"/>
+          </p:cNvSpPr>
+          <p:nvPr>
+            <p:ph type="body" idx="1"/>
+          </p:nvPr>
+        </p:nvSpPr>
+        <p:spPr/>
+        <p:txBody>
+          <a:bodyPr/>
+          <a:lstStyle/>
+          <a:p>
+            <a:r>
+              <a:rPr lang="ru-RU" dirty="0"/>
+              <a:t>Следующими признаками по которым будем классифицировать являеются признаки формы. </a:t>
+            </a:r>
+          </a:p>
+          <a:p>
+            <a:r>
+              <a:rPr lang="ru-RU" dirty="0"/>
+              <a:t>Мы считали суммарный периметр контура, суммарную и максимальную площадь областей, ограниченных контурами.</a:t>
+            </a:r>
+          </a:p>
+          <a:p>
+            <a:r>
+              <a:rPr lang="ru-RU" dirty="0"/>
+              <a:t>Часть растений имело округлую форму, поэтому мы посчитали изопериметрический коэффициент – </a:t>
+            </a:r>
+            <a:r>
+              <a:rPr lang="ru-RU" sz="1200" b="0" i="0" kern="1200" dirty="0">
+                <a:solidFill>
+                  <a:schemeClr val="tx1"/>
+                </a:solidFill>
+                <a:effectLst/>
+                <a:latin typeface="+mn-lt"/>
+                <a:ea typeface="+mn-ea"/>
+                <a:cs typeface="+mn-cs"/>
+              </a:rPr>
+              <a:t>отношение площади фигуры к площади круга, имеющего тот же периметр</a:t>
+            </a:r>
+          </a:p>
+          <a:p>
+            <a:r>
+              <a:rPr lang="ru-RU" dirty="0"/>
+              <a:t>Так же мы посчитали меру прямоугольности – мы строили наименьший ограничивающий прямоугольник (как показано на слайде). </a:t>
+            </a:r>
+          </a:p>
+          <a:p>
+            <a:r>
+              <a:rPr lang="ru-RU" dirty="0"/>
+              <a:t>Тогда характеристика прямоугольсти считалась как отношение площади фигуры к площади прямоугольника.</a:t>
+            </a:r>
+            <a:endParaRPr lang="en-US" dirty="0"/>
+          </a:p>
+        </p:txBody>
+      </p:sp>
+      <p:sp>
+        <p:nvSpPr>
+          <p:cNvPr id="4" name="Slide Number Placeholder 3"/>
+          <p:cNvSpPr>
+            <a:spLocks noGrp="1"/>
+          </p:cNvSpPr>
+          <p:nvPr>
+            <p:ph type="sldNum" sz="quarter" idx="5"/>
+          </p:nvPr>
+        </p:nvSpPr>
+        <p:spPr/>
+        <p:txBody>
+          <a:bodyPr/>
+          <a:lstStyle/>
+          <a:p>
+            <a:fld id="{740B04E9-EE27-490B-B120-9E5E749DAD50}" type="slidenum">
+              <a:rPr lang="en-US" smtClean="0"/>
+              <a:t>8</a:t>
+            </a:fld>
+            <a:endParaRPr lang="en-US"/>
+          </a:p>
+        </p:txBody>
+      </p:sp>
+    </p:spTree>
+    <p:extLst>
+      <p:ext uri="{BB962C8B-B14F-4D97-AF65-F5344CB8AC3E}">
+        <p14:creationId xmlns:p14="http://schemas.microsoft.com/office/powerpoint/2010/main" val="3292163802"/>
+      </p:ext>
+    </p:extLst>
+  </p:cSld>
+  <p:clrMapOvr>
+    <a:masterClrMapping/>
+  </p:clrMapOvr>
+</p:notes>
+</file>
+
+<file path=ppt/notesSlides/notesSlide9.xml><?xml version="1.0" encoding="utf-8"?>
+<p:notes xmlns:a="http://schemas.openxmlformats.org/drawingml/2006/main" xmlns:r="http://schemas.openxmlformats.org/officeDocument/2006/relationships" xmlns:p="http://schemas.openxmlformats.org/presentationml/2006/main">
+  <p:cSld>
+    <p:spTree>
+      <p:nvGrpSpPr>
+        <p:cNvPr id="1" name=""/>
+        <p:cNvGrpSpPr/>
+        <p:nvPr/>
+      </p:nvGrpSpPr>
+      <p:grpSpPr>
+        <a:xfrm>
+          <a:off x="0" y="0"/>
+          <a:ext cx="0" cy="0"/>
+          <a:chOff x="0" y="0"/>
+          <a:chExt cx="0" cy="0"/>
+        </a:xfrm>
+      </p:grpSpPr>
+      <p:sp>
+        <p:nvSpPr>
+          <p:cNvPr id="2" name="Slide Image Placeholder 1"/>
+          <p:cNvSpPr>
+            <a:spLocks noGrp="1" noRot="1" noChangeAspect="1"/>
+          </p:cNvSpPr>
+          <p:nvPr>
+            <p:ph type="sldImg"/>
+          </p:nvPr>
+        </p:nvSpPr>
+        <p:spPr/>
+      </p:sp>
+      <p:sp>
+        <p:nvSpPr>
+          <p:cNvPr id="3" name="Notes Placeholder 2"/>
+          <p:cNvSpPr>
+            <a:spLocks noGrp="1"/>
+          </p:cNvSpPr>
+          <p:nvPr>
+            <p:ph type="body" idx="1"/>
+          </p:nvPr>
+        </p:nvSpPr>
+        <p:spPr/>
+        <p:txBody>
+          <a:bodyPr/>
+          <a:lstStyle/>
+          <a:p>
+            <a:r>
+              <a:rPr lang="ru-RU" dirty="0"/>
+              <a:t>Для посчитанных нами признакам мы построили таблицу корреляций.</a:t>
+            </a:r>
+          </a:p>
+          <a:p>
+            <a:r>
+              <a:rPr lang="ru-RU" dirty="0"/>
+              <a:t>Как видно по таблице между собой коррелируют только суммарная и наибольшая площадь. </a:t>
+            </a:r>
+          </a:p>
+          <a:p>
+            <a:r>
+              <a:rPr lang="ru-RU" dirty="0"/>
+              <a:t>Мы не стали убирать не один из этих признаков, так как не для всех типов растений это было верно.</a:t>
+            </a:r>
+            <a:endParaRPr lang="en-US" dirty="0"/>
+          </a:p>
+        </p:txBody>
+      </p:sp>
+      <p:sp>
+        <p:nvSpPr>
+          <p:cNvPr id="4" name="Slide Number Placeholder 3"/>
+          <p:cNvSpPr>
+            <a:spLocks noGrp="1"/>
+          </p:cNvSpPr>
+          <p:nvPr>
+            <p:ph type="sldNum" sz="quarter" idx="5"/>
+          </p:nvPr>
+        </p:nvSpPr>
+        <p:spPr/>
+        <p:txBody>
+          <a:bodyPr/>
+          <a:lstStyle/>
+          <a:p>
+            <a:fld id="{740B04E9-EE27-490B-B120-9E5E749DAD50}" type="slidenum">
+              <a:rPr lang="en-US" smtClean="0"/>
+              <a:t>9</a:t>
+            </a:fld>
+            <a:endParaRPr lang="en-US"/>
+          </a:p>
+        </p:txBody>
+      </p:sp>
+    </p:spTree>
+    <p:extLst>
+      <p:ext uri="{BB962C8B-B14F-4D97-AF65-F5344CB8AC3E}">
+        <p14:creationId xmlns:p14="http://schemas.microsoft.com/office/powerpoint/2010/main" val="1532223063"/>
+      </p:ext>
+    </p:extLst>
+  </p:cSld>
+  <p:clrMapOvr>
+    <a:masterClrMapping/>
+  </p:clrMapOvr>
+</p:notes>
 </file>
 
 <file path=ppt/slideLayouts/slideLayout1.xml><?xml version="1.0" encoding="utf-8"?>
@@ -146,7 +1880,7 @@
           <p:cNvPr id="2" name="Title 1">
             <a:extLst>
               <a:ext uri="{FF2B5EF4-FFF2-40B4-BE49-F238E27FC236}">
-                <a16:creationId xmlns="" xmlns:a16="http://schemas.microsoft.com/office/drawing/2014/main" id="{414A69B8-7A31-4C8A-BB84-D42A985727E4}"/>
+                <a16:creationId xmlns:a16="http://schemas.microsoft.com/office/drawing/2014/main" id="{414A69B8-7A31-4C8A-BB84-D42A985727E4}"/>
               </a:ext>
             </a:extLst>
           </p:cNvPr>
@@ -183,7 +1917,7 @@
           <p:cNvPr id="3" name="Subtitle 2">
             <a:extLst>
               <a:ext uri="{FF2B5EF4-FFF2-40B4-BE49-F238E27FC236}">
-                <a16:creationId xmlns="" xmlns:a16="http://schemas.microsoft.com/office/drawing/2014/main" id="{2DD1A611-CB3F-46F0-9E42-C8903C775E9A}"/>
+                <a16:creationId xmlns:a16="http://schemas.microsoft.com/office/drawing/2014/main" id="{2DD1A611-CB3F-46F0-9E42-C8903C775E9A}"/>
               </a:ext>
             </a:extLst>
           </p:cNvPr>
@@ -253,7 +1987,7 @@
           <p:cNvPr id="4" name="Date Placeholder 3">
             <a:extLst>
               <a:ext uri="{FF2B5EF4-FFF2-40B4-BE49-F238E27FC236}">
-                <a16:creationId xmlns="" xmlns:a16="http://schemas.microsoft.com/office/drawing/2014/main" id="{20CE7524-F0FB-4E74-A7A3-D9A9C138BDB3}"/>
+                <a16:creationId xmlns:a16="http://schemas.microsoft.com/office/drawing/2014/main" id="{20CE7524-F0FB-4E74-A7A3-D9A9C138BDB3}"/>
               </a:ext>
             </a:extLst>
           </p:cNvPr>
@@ -272,7 +2006,7 @@
             <a:fld id="{177E6806-CC6B-498A-9ADD-8522D25E232D}" type="datetimeFigureOut">
               <a:rPr lang="en-US" smtClean="0"/>
               <a:pPr/>
-              <a:t>11/14/2019</a:t>
+              <a:t>11/17/2019</a:t>
             </a:fld>
             <a:endParaRPr lang="en-US"/>
           </a:p>
@@ -283,7 +2017,7 @@
           <p:cNvPr id="5" name="Footer Placeholder 4">
             <a:extLst>
               <a:ext uri="{FF2B5EF4-FFF2-40B4-BE49-F238E27FC236}">
-                <a16:creationId xmlns="" xmlns:a16="http://schemas.microsoft.com/office/drawing/2014/main" id="{9285A050-7D16-4B73-B6BD-34CBF6F663A1}"/>
+                <a16:creationId xmlns:a16="http://schemas.microsoft.com/office/drawing/2014/main" id="{9285A050-7D16-4B73-B6BD-34CBF6F663A1}"/>
               </a:ext>
             </a:extLst>
           </p:cNvPr>
@@ -308,7 +2042,7 @@
           <p:cNvPr id="6" name="Slide Number Placeholder 5">
             <a:extLst>
               <a:ext uri="{FF2B5EF4-FFF2-40B4-BE49-F238E27FC236}">
-                <a16:creationId xmlns="" xmlns:a16="http://schemas.microsoft.com/office/drawing/2014/main" id="{1B6A5C8E-B026-408E-8911-0E1FD3049D7D}"/>
+                <a16:creationId xmlns:a16="http://schemas.microsoft.com/office/drawing/2014/main" id="{1B6A5C8E-B026-408E-8911-0E1FD3049D7D}"/>
               </a:ext>
             </a:extLst>
           </p:cNvPr>
@@ -336,7 +2070,7 @@
     </p:spTree>
     <p:extLst>
       <p:ext uri="{BB962C8B-B14F-4D97-AF65-F5344CB8AC3E}">
-        <p14:creationId xmlns:p14="http://schemas.microsoft.com/office/powerpoint/2010/main" xmlns="" val="1586929249"/>
+        <p14:creationId xmlns:p14="http://schemas.microsoft.com/office/powerpoint/2010/main" val="1586929249"/>
       </p:ext>
     </p:extLst>
   </p:cSld>
@@ -368,7 +2102,7 @@
           <p:cNvPr id="2" name="Title 1">
             <a:extLst>
               <a:ext uri="{FF2B5EF4-FFF2-40B4-BE49-F238E27FC236}">
-                <a16:creationId xmlns="" xmlns:a16="http://schemas.microsoft.com/office/drawing/2014/main" id="{6F05E97F-6710-4219-B3B4-9050E5B421B3}"/>
+                <a16:creationId xmlns:a16="http://schemas.microsoft.com/office/drawing/2014/main" id="{6F05E97F-6710-4219-B3B4-9050E5B421B3}"/>
               </a:ext>
             </a:extLst>
           </p:cNvPr>
@@ -396,7 +2130,7 @@
           <p:cNvPr id="3" name="Vertical Text Placeholder 2">
             <a:extLst>
               <a:ext uri="{FF2B5EF4-FFF2-40B4-BE49-F238E27FC236}">
-                <a16:creationId xmlns="" xmlns:a16="http://schemas.microsoft.com/office/drawing/2014/main" id="{D8755098-00B1-4F04-959E-3029CD021835}"/>
+                <a16:creationId xmlns:a16="http://schemas.microsoft.com/office/drawing/2014/main" id="{D8755098-00B1-4F04-959E-3029CD021835}"/>
               </a:ext>
             </a:extLst>
           </p:cNvPr>
@@ -453,7 +2187,7 @@
           <p:cNvPr id="4" name="Date Placeholder 3">
             <a:extLst>
               <a:ext uri="{FF2B5EF4-FFF2-40B4-BE49-F238E27FC236}">
-                <a16:creationId xmlns="" xmlns:a16="http://schemas.microsoft.com/office/drawing/2014/main" id="{DD1ECEDB-C9CA-45F3-9A94-8368F398B2D4}"/>
+                <a16:creationId xmlns:a16="http://schemas.microsoft.com/office/drawing/2014/main" id="{DD1ECEDB-C9CA-45F3-9A94-8368F398B2D4}"/>
               </a:ext>
             </a:extLst>
           </p:cNvPr>
@@ -472,7 +2206,7 @@
             <a:fld id="{177E6806-CC6B-498A-9ADD-8522D25E232D}" type="datetimeFigureOut">
               <a:rPr lang="en-US" smtClean="0"/>
               <a:pPr/>
-              <a:t>11/14/2019</a:t>
+              <a:t>11/17/2019</a:t>
             </a:fld>
             <a:endParaRPr lang="en-US"/>
           </a:p>
@@ -483,7 +2217,7 @@
           <p:cNvPr id="5" name="Footer Placeholder 4">
             <a:extLst>
               <a:ext uri="{FF2B5EF4-FFF2-40B4-BE49-F238E27FC236}">
-                <a16:creationId xmlns="" xmlns:a16="http://schemas.microsoft.com/office/drawing/2014/main" id="{333C7E31-54A6-4B4F-9DD4-DA60B9878333}"/>
+                <a16:creationId xmlns:a16="http://schemas.microsoft.com/office/drawing/2014/main" id="{333C7E31-54A6-4B4F-9DD4-DA60B9878333}"/>
               </a:ext>
             </a:extLst>
           </p:cNvPr>
@@ -508,7 +2242,7 @@
           <p:cNvPr id="6" name="Slide Number Placeholder 5">
             <a:extLst>
               <a:ext uri="{FF2B5EF4-FFF2-40B4-BE49-F238E27FC236}">
-                <a16:creationId xmlns="" xmlns:a16="http://schemas.microsoft.com/office/drawing/2014/main" id="{56389D19-BBD3-43C2-87F8-CB7FF1E604C6}"/>
+                <a16:creationId xmlns:a16="http://schemas.microsoft.com/office/drawing/2014/main" id="{56389D19-BBD3-43C2-87F8-CB7FF1E604C6}"/>
               </a:ext>
             </a:extLst>
           </p:cNvPr>
@@ -536,7 +2270,7 @@
     </p:spTree>
     <p:extLst>
       <p:ext uri="{BB962C8B-B14F-4D97-AF65-F5344CB8AC3E}">
-        <p14:creationId xmlns:p14="http://schemas.microsoft.com/office/powerpoint/2010/main" xmlns="" val="1048394676"/>
+        <p14:creationId xmlns:p14="http://schemas.microsoft.com/office/powerpoint/2010/main" val="1048394676"/>
       </p:ext>
     </p:extLst>
   </p:cSld>
@@ -568,7 +2302,7 @@
           <p:cNvPr id="2" name="Vertical Title 1">
             <a:extLst>
               <a:ext uri="{FF2B5EF4-FFF2-40B4-BE49-F238E27FC236}">
-                <a16:creationId xmlns="" xmlns:a16="http://schemas.microsoft.com/office/drawing/2014/main" id="{890894E3-D41B-41A1-85FC-9E5C560E0110}"/>
+                <a16:creationId xmlns:a16="http://schemas.microsoft.com/office/drawing/2014/main" id="{890894E3-D41B-41A1-85FC-9E5C560E0110}"/>
               </a:ext>
             </a:extLst>
           </p:cNvPr>
@@ -601,7 +2335,7 @@
           <p:cNvPr id="3" name="Vertical Text Placeholder 2">
             <a:extLst>
               <a:ext uri="{FF2B5EF4-FFF2-40B4-BE49-F238E27FC236}">
-                <a16:creationId xmlns="" xmlns:a16="http://schemas.microsoft.com/office/drawing/2014/main" id="{BB9674E3-720E-4593-8D4E-BCC5CE0DF804}"/>
+                <a16:creationId xmlns:a16="http://schemas.microsoft.com/office/drawing/2014/main" id="{BB9674E3-720E-4593-8D4E-BCC5CE0DF804}"/>
               </a:ext>
             </a:extLst>
           </p:cNvPr>
@@ -663,7 +2397,7 @@
           <p:cNvPr id="4" name="Date Placeholder 3">
             <a:extLst>
               <a:ext uri="{FF2B5EF4-FFF2-40B4-BE49-F238E27FC236}">
-                <a16:creationId xmlns="" xmlns:a16="http://schemas.microsoft.com/office/drawing/2014/main" id="{5EA6F0AD-7055-4124-BE1D-B8C6D01ABD65}"/>
+                <a16:creationId xmlns:a16="http://schemas.microsoft.com/office/drawing/2014/main" id="{5EA6F0AD-7055-4124-BE1D-B8C6D01ABD65}"/>
               </a:ext>
             </a:extLst>
           </p:cNvPr>
@@ -682,7 +2416,7 @@
             <a:fld id="{177E6806-CC6B-498A-9ADD-8522D25E232D}" type="datetimeFigureOut">
               <a:rPr lang="en-US" smtClean="0"/>
               <a:pPr/>
-              <a:t>11/14/2019</a:t>
+              <a:t>11/17/2019</a:t>
             </a:fld>
             <a:endParaRPr lang="en-US"/>
           </a:p>
@@ -693,7 +2427,7 @@
           <p:cNvPr id="5" name="Footer Placeholder 4">
             <a:extLst>
               <a:ext uri="{FF2B5EF4-FFF2-40B4-BE49-F238E27FC236}">
-                <a16:creationId xmlns="" xmlns:a16="http://schemas.microsoft.com/office/drawing/2014/main" id="{AB7D5CBE-4374-41B7-987A-7638254AA31A}"/>
+                <a16:creationId xmlns:a16="http://schemas.microsoft.com/office/drawing/2014/main" id="{AB7D5CBE-4374-41B7-987A-7638254AA31A}"/>
               </a:ext>
             </a:extLst>
           </p:cNvPr>
@@ -718,7 +2452,7 @@
           <p:cNvPr id="6" name="Slide Number Placeholder 5">
             <a:extLst>
               <a:ext uri="{FF2B5EF4-FFF2-40B4-BE49-F238E27FC236}">
-                <a16:creationId xmlns="" xmlns:a16="http://schemas.microsoft.com/office/drawing/2014/main" id="{96F0497C-70BE-407A-A099-5644C929D134}"/>
+                <a16:creationId xmlns:a16="http://schemas.microsoft.com/office/drawing/2014/main" id="{96F0497C-70BE-407A-A099-5644C929D134}"/>
               </a:ext>
             </a:extLst>
           </p:cNvPr>
@@ -746,7 +2480,7 @@
     </p:spTree>
     <p:extLst>
       <p:ext uri="{BB962C8B-B14F-4D97-AF65-F5344CB8AC3E}">
-        <p14:creationId xmlns:p14="http://schemas.microsoft.com/office/powerpoint/2010/main" xmlns="" val="2651954643"/>
+        <p14:creationId xmlns:p14="http://schemas.microsoft.com/office/powerpoint/2010/main" val="2651954643"/>
       </p:ext>
     </p:extLst>
   </p:cSld>
@@ -778,7 +2512,7 @@
           <p:cNvPr id="2" name="Title 1">
             <a:extLst>
               <a:ext uri="{FF2B5EF4-FFF2-40B4-BE49-F238E27FC236}">
-                <a16:creationId xmlns="" xmlns:a16="http://schemas.microsoft.com/office/drawing/2014/main" id="{43924329-1894-40C8-82F8-DF61B0374229}"/>
+                <a16:creationId xmlns:a16="http://schemas.microsoft.com/office/drawing/2014/main" id="{43924329-1894-40C8-82F8-DF61B0374229}"/>
               </a:ext>
             </a:extLst>
           </p:cNvPr>
@@ -806,7 +2540,7 @@
           <p:cNvPr id="3" name="Content Placeholder 2">
             <a:extLst>
               <a:ext uri="{FF2B5EF4-FFF2-40B4-BE49-F238E27FC236}">
-                <a16:creationId xmlns="" xmlns:a16="http://schemas.microsoft.com/office/drawing/2014/main" id="{E6A3BC9B-1457-4F92-A714-CBB3A3BDA447}"/>
+                <a16:creationId xmlns:a16="http://schemas.microsoft.com/office/drawing/2014/main" id="{E6A3BC9B-1457-4F92-A714-CBB3A3BDA447}"/>
               </a:ext>
             </a:extLst>
           </p:cNvPr>
@@ -863,7 +2597,7 @@
           <p:cNvPr id="4" name="Date Placeholder 3">
             <a:extLst>
               <a:ext uri="{FF2B5EF4-FFF2-40B4-BE49-F238E27FC236}">
-                <a16:creationId xmlns="" xmlns:a16="http://schemas.microsoft.com/office/drawing/2014/main" id="{9D2F05BB-1F9D-403C-AD32-8C4702318B93}"/>
+                <a16:creationId xmlns:a16="http://schemas.microsoft.com/office/drawing/2014/main" id="{9D2F05BB-1F9D-403C-AD32-8C4702318B93}"/>
               </a:ext>
             </a:extLst>
           </p:cNvPr>
@@ -882,7 +2616,7 @@
             <a:fld id="{177E6806-CC6B-498A-9ADD-8522D25E232D}" type="datetimeFigureOut">
               <a:rPr lang="en-US" smtClean="0"/>
               <a:pPr/>
-              <a:t>11/14/2019</a:t>
+              <a:t>11/17/2019</a:t>
             </a:fld>
             <a:endParaRPr lang="en-US"/>
           </a:p>
@@ -893,7 +2627,7 @@
           <p:cNvPr id="5" name="Footer Placeholder 4">
             <a:extLst>
               <a:ext uri="{FF2B5EF4-FFF2-40B4-BE49-F238E27FC236}">
-                <a16:creationId xmlns="" xmlns:a16="http://schemas.microsoft.com/office/drawing/2014/main" id="{4FBA387F-E822-4482-B105-84713F22D4C4}"/>
+                <a16:creationId xmlns:a16="http://schemas.microsoft.com/office/drawing/2014/main" id="{4FBA387F-E822-4482-B105-84713F22D4C4}"/>
               </a:ext>
             </a:extLst>
           </p:cNvPr>
@@ -918,7 +2652,7 @@
           <p:cNvPr id="6" name="Slide Number Placeholder 5">
             <a:extLst>
               <a:ext uri="{FF2B5EF4-FFF2-40B4-BE49-F238E27FC236}">
-                <a16:creationId xmlns="" xmlns:a16="http://schemas.microsoft.com/office/drawing/2014/main" id="{2A75E2B7-90D5-4D19-AA6D-4A955F58CE27}"/>
+                <a16:creationId xmlns:a16="http://schemas.microsoft.com/office/drawing/2014/main" id="{2A75E2B7-90D5-4D19-AA6D-4A955F58CE27}"/>
               </a:ext>
             </a:extLst>
           </p:cNvPr>
@@ -946,7 +2680,7 @@
     </p:spTree>
     <p:extLst>
       <p:ext uri="{BB962C8B-B14F-4D97-AF65-F5344CB8AC3E}">
-        <p14:creationId xmlns:p14="http://schemas.microsoft.com/office/powerpoint/2010/main" xmlns="" val="561362792"/>
+        <p14:creationId xmlns:p14="http://schemas.microsoft.com/office/powerpoint/2010/main" val="561362792"/>
       </p:ext>
     </p:extLst>
   </p:cSld>
@@ -978,7 +2712,7 @@
           <p:cNvPr id="2" name="Title 1">
             <a:extLst>
               <a:ext uri="{FF2B5EF4-FFF2-40B4-BE49-F238E27FC236}">
-                <a16:creationId xmlns="" xmlns:a16="http://schemas.microsoft.com/office/drawing/2014/main" id="{9510EFA7-AA0E-416A-8CA1-21EB740D56D8}"/>
+                <a16:creationId xmlns:a16="http://schemas.microsoft.com/office/drawing/2014/main" id="{9510EFA7-AA0E-416A-8CA1-21EB740D56D8}"/>
               </a:ext>
             </a:extLst>
           </p:cNvPr>
@@ -1015,7 +2749,7 @@
           <p:cNvPr id="3" name="Text Placeholder 2">
             <a:extLst>
               <a:ext uri="{FF2B5EF4-FFF2-40B4-BE49-F238E27FC236}">
-                <a16:creationId xmlns="" xmlns:a16="http://schemas.microsoft.com/office/drawing/2014/main" id="{3D3285EE-100D-4736-8288-8F7C455D45B2}"/>
+                <a16:creationId xmlns:a16="http://schemas.microsoft.com/office/drawing/2014/main" id="{3D3285EE-100D-4736-8288-8F7C455D45B2}"/>
               </a:ext>
             </a:extLst>
           </p:cNvPr>
@@ -1140,7 +2874,7 @@
           <p:cNvPr id="4" name="Date Placeholder 3">
             <a:extLst>
               <a:ext uri="{FF2B5EF4-FFF2-40B4-BE49-F238E27FC236}">
-                <a16:creationId xmlns="" xmlns:a16="http://schemas.microsoft.com/office/drawing/2014/main" id="{EF9726B9-27BB-4C87-9876-5205B7996A58}"/>
+                <a16:creationId xmlns:a16="http://schemas.microsoft.com/office/drawing/2014/main" id="{EF9726B9-27BB-4C87-9876-5205B7996A58}"/>
               </a:ext>
             </a:extLst>
           </p:cNvPr>
@@ -1159,7 +2893,7 @@
             <a:fld id="{177E6806-CC6B-498A-9ADD-8522D25E232D}" type="datetimeFigureOut">
               <a:rPr lang="en-US" smtClean="0"/>
               <a:pPr/>
-              <a:t>11/14/2019</a:t>
+              <a:t>11/17/2019</a:t>
             </a:fld>
             <a:endParaRPr lang="en-US"/>
           </a:p>
@@ -1170,7 +2904,7 @@
           <p:cNvPr id="5" name="Footer Placeholder 4">
             <a:extLst>
               <a:ext uri="{FF2B5EF4-FFF2-40B4-BE49-F238E27FC236}">
-                <a16:creationId xmlns="" xmlns:a16="http://schemas.microsoft.com/office/drawing/2014/main" id="{6BEE94E2-2332-481B-905E-25BAF18EB033}"/>
+                <a16:creationId xmlns:a16="http://schemas.microsoft.com/office/drawing/2014/main" id="{6BEE94E2-2332-481B-905E-25BAF18EB033}"/>
               </a:ext>
             </a:extLst>
           </p:cNvPr>
@@ -1195,7 +2929,7 @@
           <p:cNvPr id="6" name="Slide Number Placeholder 5">
             <a:extLst>
               <a:ext uri="{FF2B5EF4-FFF2-40B4-BE49-F238E27FC236}">
-                <a16:creationId xmlns="" xmlns:a16="http://schemas.microsoft.com/office/drawing/2014/main" id="{FB69E90F-3237-4057-B2D1-156389849DE5}"/>
+                <a16:creationId xmlns:a16="http://schemas.microsoft.com/office/drawing/2014/main" id="{FB69E90F-3237-4057-B2D1-156389849DE5}"/>
               </a:ext>
             </a:extLst>
           </p:cNvPr>
@@ -1223,7 +2957,7 @@
     </p:spTree>
     <p:extLst>
       <p:ext uri="{BB962C8B-B14F-4D97-AF65-F5344CB8AC3E}">
-        <p14:creationId xmlns:p14="http://schemas.microsoft.com/office/powerpoint/2010/main" xmlns="" val="218970509"/>
+        <p14:creationId xmlns:p14="http://schemas.microsoft.com/office/powerpoint/2010/main" val="218970509"/>
       </p:ext>
     </p:extLst>
   </p:cSld>
@@ -1255,7 +2989,7 @@
           <p:cNvPr id="2" name="Title 1">
             <a:extLst>
               <a:ext uri="{FF2B5EF4-FFF2-40B4-BE49-F238E27FC236}">
-                <a16:creationId xmlns="" xmlns:a16="http://schemas.microsoft.com/office/drawing/2014/main" id="{22CDFE1F-CBD2-4215-B9AF-24B72E402EEE}"/>
+                <a16:creationId xmlns:a16="http://schemas.microsoft.com/office/drawing/2014/main" id="{22CDFE1F-CBD2-4215-B9AF-24B72E402EEE}"/>
               </a:ext>
             </a:extLst>
           </p:cNvPr>
@@ -1283,7 +3017,7 @@
           <p:cNvPr id="3" name="Content Placeholder 2">
             <a:extLst>
               <a:ext uri="{FF2B5EF4-FFF2-40B4-BE49-F238E27FC236}">
-                <a16:creationId xmlns="" xmlns:a16="http://schemas.microsoft.com/office/drawing/2014/main" id="{1C061FDB-9959-4220-BE26-B25DC480515B}"/>
+                <a16:creationId xmlns:a16="http://schemas.microsoft.com/office/drawing/2014/main" id="{1C061FDB-9959-4220-BE26-B25DC480515B}"/>
               </a:ext>
             </a:extLst>
           </p:cNvPr>
@@ -1345,7 +3079,7 @@
           <p:cNvPr id="4" name="Content Placeholder 3">
             <a:extLst>
               <a:ext uri="{FF2B5EF4-FFF2-40B4-BE49-F238E27FC236}">
-                <a16:creationId xmlns="" xmlns:a16="http://schemas.microsoft.com/office/drawing/2014/main" id="{80B70312-2A47-4A8F-8BF0-AD89AAC88150}"/>
+                <a16:creationId xmlns:a16="http://schemas.microsoft.com/office/drawing/2014/main" id="{80B70312-2A47-4A8F-8BF0-AD89AAC88150}"/>
               </a:ext>
             </a:extLst>
           </p:cNvPr>
@@ -1407,7 +3141,7 @@
           <p:cNvPr id="5" name="Date Placeholder 4">
             <a:extLst>
               <a:ext uri="{FF2B5EF4-FFF2-40B4-BE49-F238E27FC236}">
-                <a16:creationId xmlns="" xmlns:a16="http://schemas.microsoft.com/office/drawing/2014/main" id="{6BB8D23B-232E-4077-9AB8-A68CBDE048D2}"/>
+                <a16:creationId xmlns:a16="http://schemas.microsoft.com/office/drawing/2014/main" id="{6BB8D23B-232E-4077-9AB8-A68CBDE048D2}"/>
               </a:ext>
             </a:extLst>
           </p:cNvPr>
@@ -1426,7 +3160,7 @@
             <a:fld id="{177E6806-CC6B-498A-9ADD-8522D25E232D}" type="datetimeFigureOut">
               <a:rPr lang="en-US" smtClean="0"/>
               <a:pPr/>
-              <a:t>11/14/2019</a:t>
+              <a:t>11/17/2019</a:t>
             </a:fld>
             <a:endParaRPr lang="en-US"/>
           </a:p>
@@ -1437,7 +3171,7 @@
           <p:cNvPr id="6" name="Footer Placeholder 5">
             <a:extLst>
               <a:ext uri="{FF2B5EF4-FFF2-40B4-BE49-F238E27FC236}">
-                <a16:creationId xmlns="" xmlns:a16="http://schemas.microsoft.com/office/drawing/2014/main" id="{92599478-D08A-4EA7-89EB-6BD2A1DCED11}"/>
+                <a16:creationId xmlns:a16="http://schemas.microsoft.com/office/drawing/2014/main" id="{92599478-D08A-4EA7-89EB-6BD2A1DCED11}"/>
               </a:ext>
             </a:extLst>
           </p:cNvPr>
@@ -1462,7 +3196,7 @@
           <p:cNvPr id="7" name="Slide Number Placeholder 6">
             <a:extLst>
               <a:ext uri="{FF2B5EF4-FFF2-40B4-BE49-F238E27FC236}">
-                <a16:creationId xmlns="" xmlns:a16="http://schemas.microsoft.com/office/drawing/2014/main" id="{883AA24C-8F42-497C-9A9C-31C5E739CFFB}"/>
+                <a16:creationId xmlns:a16="http://schemas.microsoft.com/office/drawing/2014/main" id="{883AA24C-8F42-497C-9A9C-31C5E739CFFB}"/>
               </a:ext>
             </a:extLst>
           </p:cNvPr>
@@ -1490,7 +3224,7 @@
     </p:spTree>
     <p:extLst>
       <p:ext uri="{BB962C8B-B14F-4D97-AF65-F5344CB8AC3E}">
-        <p14:creationId xmlns:p14="http://schemas.microsoft.com/office/powerpoint/2010/main" xmlns="" val="2107459991"/>
+        <p14:creationId xmlns:p14="http://schemas.microsoft.com/office/powerpoint/2010/main" val="2107459991"/>
       </p:ext>
     </p:extLst>
   </p:cSld>
@@ -1522,7 +3256,7 @@
           <p:cNvPr id="2" name="Title 1">
             <a:extLst>
               <a:ext uri="{FF2B5EF4-FFF2-40B4-BE49-F238E27FC236}">
-                <a16:creationId xmlns="" xmlns:a16="http://schemas.microsoft.com/office/drawing/2014/main" id="{B1F71FF1-E782-42F0-9E8E-FE24009DFEBA}"/>
+                <a16:creationId xmlns:a16="http://schemas.microsoft.com/office/drawing/2014/main" id="{B1F71FF1-E782-42F0-9E8E-FE24009DFEBA}"/>
               </a:ext>
             </a:extLst>
           </p:cNvPr>
@@ -1555,7 +3289,7 @@
           <p:cNvPr id="3" name="Text Placeholder 2">
             <a:extLst>
               <a:ext uri="{FF2B5EF4-FFF2-40B4-BE49-F238E27FC236}">
-                <a16:creationId xmlns="" xmlns:a16="http://schemas.microsoft.com/office/drawing/2014/main" id="{CA7C4EEF-29CB-49CD-AC45-D01AF54FB46C}"/>
+                <a16:creationId xmlns:a16="http://schemas.microsoft.com/office/drawing/2014/main" id="{CA7C4EEF-29CB-49CD-AC45-D01AF54FB46C}"/>
               </a:ext>
             </a:extLst>
           </p:cNvPr>
@@ -1626,7 +3360,7 @@
           <p:cNvPr id="4" name="Content Placeholder 3">
             <a:extLst>
               <a:ext uri="{FF2B5EF4-FFF2-40B4-BE49-F238E27FC236}">
-                <a16:creationId xmlns="" xmlns:a16="http://schemas.microsoft.com/office/drawing/2014/main" id="{5DAE092A-A5DF-4E4D-AB55-3273161F7398}"/>
+                <a16:creationId xmlns:a16="http://schemas.microsoft.com/office/drawing/2014/main" id="{5DAE092A-A5DF-4E4D-AB55-3273161F7398}"/>
               </a:ext>
             </a:extLst>
           </p:cNvPr>
@@ -1688,7 +3422,7 @@
           <p:cNvPr id="5" name="Text Placeholder 4">
             <a:extLst>
               <a:ext uri="{FF2B5EF4-FFF2-40B4-BE49-F238E27FC236}">
-                <a16:creationId xmlns="" xmlns:a16="http://schemas.microsoft.com/office/drawing/2014/main" id="{9C65526E-7A40-4CFF-AAA0-BA31BFD2AE91}"/>
+                <a16:creationId xmlns:a16="http://schemas.microsoft.com/office/drawing/2014/main" id="{9C65526E-7A40-4CFF-AAA0-BA31BFD2AE91}"/>
               </a:ext>
             </a:extLst>
           </p:cNvPr>
@@ -1759,7 +3493,7 @@
           <p:cNvPr id="6" name="Content Placeholder 5">
             <a:extLst>
               <a:ext uri="{FF2B5EF4-FFF2-40B4-BE49-F238E27FC236}">
-                <a16:creationId xmlns="" xmlns:a16="http://schemas.microsoft.com/office/drawing/2014/main" id="{B63A7161-0583-43A5-8E71-858B05ADC277}"/>
+                <a16:creationId xmlns:a16="http://schemas.microsoft.com/office/drawing/2014/main" id="{B63A7161-0583-43A5-8E71-858B05ADC277}"/>
               </a:ext>
             </a:extLst>
           </p:cNvPr>
@@ -1821,7 +3555,7 @@
           <p:cNvPr id="7" name="Date Placeholder 6">
             <a:extLst>
               <a:ext uri="{FF2B5EF4-FFF2-40B4-BE49-F238E27FC236}">
-                <a16:creationId xmlns="" xmlns:a16="http://schemas.microsoft.com/office/drawing/2014/main" id="{4F55091F-9541-4B93-B6C0-9F77C1396BAD}"/>
+                <a16:creationId xmlns:a16="http://schemas.microsoft.com/office/drawing/2014/main" id="{4F55091F-9541-4B93-B6C0-9F77C1396BAD}"/>
               </a:ext>
             </a:extLst>
           </p:cNvPr>
@@ -1840,7 +3574,7 @@
             <a:fld id="{177E6806-CC6B-498A-9ADD-8522D25E232D}" type="datetimeFigureOut">
               <a:rPr lang="en-US" smtClean="0"/>
               <a:pPr/>
-              <a:t>11/14/2019</a:t>
+              <a:t>11/17/2019</a:t>
             </a:fld>
             <a:endParaRPr lang="en-US"/>
           </a:p>
@@ -1851,7 +3585,7 @@
           <p:cNvPr id="8" name="Footer Placeholder 7">
             <a:extLst>
               <a:ext uri="{FF2B5EF4-FFF2-40B4-BE49-F238E27FC236}">
-                <a16:creationId xmlns="" xmlns:a16="http://schemas.microsoft.com/office/drawing/2014/main" id="{61F8F422-AD58-493D-98BE-2049F507ED99}"/>
+                <a16:creationId xmlns:a16="http://schemas.microsoft.com/office/drawing/2014/main" id="{61F8F422-AD58-493D-98BE-2049F507ED99}"/>
               </a:ext>
             </a:extLst>
           </p:cNvPr>
@@ -1876,7 +3610,7 @@
           <p:cNvPr id="9" name="Slide Number Placeholder 8">
             <a:extLst>
               <a:ext uri="{FF2B5EF4-FFF2-40B4-BE49-F238E27FC236}">
-                <a16:creationId xmlns="" xmlns:a16="http://schemas.microsoft.com/office/drawing/2014/main" id="{1F6EB6EB-0DF7-4B8A-A792-271AD58C307A}"/>
+                <a16:creationId xmlns:a16="http://schemas.microsoft.com/office/drawing/2014/main" id="{1F6EB6EB-0DF7-4B8A-A792-271AD58C307A}"/>
               </a:ext>
             </a:extLst>
           </p:cNvPr>
@@ -1904,7 +3638,7 @@
     </p:spTree>
     <p:extLst>
       <p:ext uri="{BB962C8B-B14F-4D97-AF65-F5344CB8AC3E}">
-        <p14:creationId xmlns:p14="http://schemas.microsoft.com/office/powerpoint/2010/main" xmlns="" val="2679218467"/>
+        <p14:creationId xmlns:p14="http://schemas.microsoft.com/office/powerpoint/2010/main" val="2679218467"/>
       </p:ext>
     </p:extLst>
   </p:cSld>
@@ -1936,7 +3670,7 @@
           <p:cNvPr id="2" name="Title 1">
             <a:extLst>
               <a:ext uri="{FF2B5EF4-FFF2-40B4-BE49-F238E27FC236}">
-                <a16:creationId xmlns="" xmlns:a16="http://schemas.microsoft.com/office/drawing/2014/main" id="{0E9C36F9-4217-4640-A81B-B4EDCF70A0C2}"/>
+                <a16:creationId xmlns:a16="http://schemas.microsoft.com/office/drawing/2014/main" id="{0E9C36F9-4217-4640-A81B-B4EDCF70A0C2}"/>
               </a:ext>
             </a:extLst>
           </p:cNvPr>
@@ -1964,7 +3698,7 @@
           <p:cNvPr id="3" name="Date Placeholder 2">
             <a:extLst>
               <a:ext uri="{FF2B5EF4-FFF2-40B4-BE49-F238E27FC236}">
-                <a16:creationId xmlns="" xmlns:a16="http://schemas.microsoft.com/office/drawing/2014/main" id="{D9020EC9-5BAE-4ABB-A11C-047F9A092C5C}"/>
+                <a16:creationId xmlns:a16="http://schemas.microsoft.com/office/drawing/2014/main" id="{D9020EC9-5BAE-4ABB-A11C-047F9A092C5C}"/>
               </a:ext>
             </a:extLst>
           </p:cNvPr>
@@ -1983,7 +3717,7 @@
             <a:fld id="{177E6806-CC6B-498A-9ADD-8522D25E232D}" type="datetimeFigureOut">
               <a:rPr lang="en-US" smtClean="0"/>
               <a:pPr/>
-              <a:t>11/14/2019</a:t>
+              <a:t>11/17/2019</a:t>
             </a:fld>
             <a:endParaRPr lang="en-US"/>
           </a:p>
@@ -1994,7 +3728,7 @@
           <p:cNvPr id="4" name="Footer Placeholder 3">
             <a:extLst>
               <a:ext uri="{FF2B5EF4-FFF2-40B4-BE49-F238E27FC236}">
-                <a16:creationId xmlns="" xmlns:a16="http://schemas.microsoft.com/office/drawing/2014/main" id="{5A3C717D-123D-4E3B-BB1B-8893260CEFEF}"/>
+                <a16:creationId xmlns:a16="http://schemas.microsoft.com/office/drawing/2014/main" id="{5A3C717D-123D-4E3B-BB1B-8893260CEFEF}"/>
               </a:ext>
             </a:extLst>
           </p:cNvPr>
@@ -2019,7 +3753,7 @@
           <p:cNvPr id="5" name="Slide Number Placeholder 4">
             <a:extLst>
               <a:ext uri="{FF2B5EF4-FFF2-40B4-BE49-F238E27FC236}">
-                <a16:creationId xmlns="" xmlns:a16="http://schemas.microsoft.com/office/drawing/2014/main" id="{FCB7F034-337B-4CBD-A34C-437F743DA9CD}"/>
+                <a16:creationId xmlns:a16="http://schemas.microsoft.com/office/drawing/2014/main" id="{FCB7F034-337B-4CBD-A34C-437F743DA9CD}"/>
               </a:ext>
             </a:extLst>
           </p:cNvPr>
@@ -2047,7 +3781,7 @@
     </p:spTree>
     <p:extLst>
       <p:ext uri="{BB962C8B-B14F-4D97-AF65-F5344CB8AC3E}">
-        <p14:creationId xmlns:p14="http://schemas.microsoft.com/office/powerpoint/2010/main" xmlns="" val="1550086527"/>
+        <p14:creationId xmlns:p14="http://schemas.microsoft.com/office/powerpoint/2010/main" val="1550086527"/>
       </p:ext>
     </p:extLst>
   </p:cSld>
@@ -2079,7 +3813,7 @@
           <p:cNvPr id="2" name="Date Placeholder 1">
             <a:extLst>
               <a:ext uri="{FF2B5EF4-FFF2-40B4-BE49-F238E27FC236}">
-                <a16:creationId xmlns="" xmlns:a16="http://schemas.microsoft.com/office/drawing/2014/main" id="{D5D0673F-6B9D-41A2-8D96-EBEB0CFDFB19}"/>
+                <a16:creationId xmlns:a16="http://schemas.microsoft.com/office/drawing/2014/main" id="{D5D0673F-6B9D-41A2-8D96-EBEB0CFDFB19}"/>
               </a:ext>
             </a:extLst>
           </p:cNvPr>
@@ -2098,7 +3832,7 @@
             <a:fld id="{177E6806-CC6B-498A-9ADD-8522D25E232D}" type="datetimeFigureOut">
               <a:rPr lang="en-US" smtClean="0"/>
               <a:pPr/>
-              <a:t>11/14/2019</a:t>
+              <a:t>11/17/2019</a:t>
             </a:fld>
             <a:endParaRPr lang="en-US"/>
           </a:p>
@@ -2109,7 +3843,7 @@
           <p:cNvPr id="3" name="Footer Placeholder 2">
             <a:extLst>
               <a:ext uri="{FF2B5EF4-FFF2-40B4-BE49-F238E27FC236}">
-                <a16:creationId xmlns="" xmlns:a16="http://schemas.microsoft.com/office/drawing/2014/main" id="{EB1B4D0D-C7DF-4D27-8761-6C035BA9E43E}"/>
+                <a16:creationId xmlns:a16="http://schemas.microsoft.com/office/drawing/2014/main" id="{EB1B4D0D-C7DF-4D27-8761-6C035BA9E43E}"/>
               </a:ext>
             </a:extLst>
           </p:cNvPr>
@@ -2134,7 +3868,7 @@
           <p:cNvPr id="4" name="Slide Number Placeholder 3">
             <a:extLst>
               <a:ext uri="{FF2B5EF4-FFF2-40B4-BE49-F238E27FC236}">
-                <a16:creationId xmlns="" xmlns:a16="http://schemas.microsoft.com/office/drawing/2014/main" id="{16B9C0D8-BAA0-4E3E-80A7-292885DAD1B7}"/>
+                <a16:creationId xmlns:a16="http://schemas.microsoft.com/office/drawing/2014/main" id="{16B9C0D8-BAA0-4E3E-80A7-292885DAD1B7}"/>
               </a:ext>
             </a:extLst>
           </p:cNvPr>
@@ -2162,7 +3896,7 @@
     </p:spTree>
     <p:extLst>
       <p:ext uri="{BB962C8B-B14F-4D97-AF65-F5344CB8AC3E}">
-        <p14:creationId xmlns:p14="http://schemas.microsoft.com/office/powerpoint/2010/main" xmlns="" val="2916426130"/>
+        <p14:creationId xmlns:p14="http://schemas.microsoft.com/office/powerpoint/2010/main" val="2916426130"/>
       </p:ext>
     </p:extLst>
   </p:cSld>
@@ -2194,7 +3928,7 @@
           <p:cNvPr id="2" name="Title 1">
             <a:extLst>
               <a:ext uri="{FF2B5EF4-FFF2-40B4-BE49-F238E27FC236}">
-                <a16:creationId xmlns="" xmlns:a16="http://schemas.microsoft.com/office/drawing/2014/main" id="{3FFBCB84-1189-409B-A372-090412BAD049}"/>
+                <a16:creationId xmlns:a16="http://schemas.microsoft.com/office/drawing/2014/main" id="{3FFBCB84-1189-409B-A372-090412BAD049}"/>
               </a:ext>
             </a:extLst>
           </p:cNvPr>
@@ -2231,7 +3965,7 @@
           <p:cNvPr id="3" name="Content Placeholder 2">
             <a:extLst>
               <a:ext uri="{FF2B5EF4-FFF2-40B4-BE49-F238E27FC236}">
-                <a16:creationId xmlns="" xmlns:a16="http://schemas.microsoft.com/office/drawing/2014/main" id="{7336E376-4370-4E92-9713-9D95EAE79ED6}"/>
+                <a16:creationId xmlns:a16="http://schemas.microsoft.com/office/drawing/2014/main" id="{7336E376-4370-4E92-9713-9D95EAE79ED6}"/>
               </a:ext>
             </a:extLst>
           </p:cNvPr>
@@ -2321,7 +4055,7 @@
           <p:cNvPr id="4" name="Text Placeholder 3">
             <a:extLst>
               <a:ext uri="{FF2B5EF4-FFF2-40B4-BE49-F238E27FC236}">
-                <a16:creationId xmlns="" xmlns:a16="http://schemas.microsoft.com/office/drawing/2014/main" id="{95AEE95D-41F8-4EBA-8052-5BBA00D1F4E7}"/>
+                <a16:creationId xmlns:a16="http://schemas.microsoft.com/office/drawing/2014/main" id="{95AEE95D-41F8-4EBA-8052-5BBA00D1F4E7}"/>
               </a:ext>
             </a:extLst>
           </p:cNvPr>
@@ -2392,7 +4126,7 @@
           <p:cNvPr id="5" name="Date Placeholder 4">
             <a:extLst>
               <a:ext uri="{FF2B5EF4-FFF2-40B4-BE49-F238E27FC236}">
-                <a16:creationId xmlns="" xmlns:a16="http://schemas.microsoft.com/office/drawing/2014/main" id="{901DE9C0-73D0-40DB-B85E-94A626B786D4}"/>
+                <a16:creationId xmlns:a16="http://schemas.microsoft.com/office/drawing/2014/main" id="{901DE9C0-73D0-40DB-B85E-94A626B786D4}"/>
               </a:ext>
             </a:extLst>
           </p:cNvPr>
@@ -2411,7 +4145,7 @@
             <a:fld id="{177E6806-CC6B-498A-9ADD-8522D25E232D}" type="datetimeFigureOut">
               <a:rPr lang="en-US" smtClean="0"/>
               <a:pPr/>
-              <a:t>11/14/2019</a:t>
+              <a:t>11/17/2019</a:t>
             </a:fld>
             <a:endParaRPr lang="en-US"/>
           </a:p>
@@ -2422,7 +4156,7 @@
           <p:cNvPr id="6" name="Footer Placeholder 5">
             <a:extLst>
               <a:ext uri="{FF2B5EF4-FFF2-40B4-BE49-F238E27FC236}">
-                <a16:creationId xmlns="" xmlns:a16="http://schemas.microsoft.com/office/drawing/2014/main" id="{281E7426-6A83-4B3A-A3E3-F3EA10011389}"/>
+                <a16:creationId xmlns:a16="http://schemas.microsoft.com/office/drawing/2014/main" id="{281E7426-6A83-4B3A-A3E3-F3EA10011389}"/>
               </a:ext>
             </a:extLst>
           </p:cNvPr>
@@ -2447,7 +4181,7 @@
           <p:cNvPr id="7" name="Slide Number Placeholder 6">
             <a:extLst>
               <a:ext uri="{FF2B5EF4-FFF2-40B4-BE49-F238E27FC236}">
-                <a16:creationId xmlns="" xmlns:a16="http://schemas.microsoft.com/office/drawing/2014/main" id="{C99E020F-3642-4462-B8FE-4AEE5C406859}"/>
+                <a16:creationId xmlns:a16="http://schemas.microsoft.com/office/drawing/2014/main" id="{C99E020F-3642-4462-B8FE-4AEE5C406859}"/>
               </a:ext>
             </a:extLst>
           </p:cNvPr>
@@ -2475,7 +4209,7 @@
     </p:spTree>
     <p:extLst>
       <p:ext uri="{BB962C8B-B14F-4D97-AF65-F5344CB8AC3E}">
-        <p14:creationId xmlns:p14="http://schemas.microsoft.com/office/powerpoint/2010/main" xmlns="" val="1006357550"/>
+        <p14:creationId xmlns:p14="http://schemas.microsoft.com/office/powerpoint/2010/main" val="1006357550"/>
       </p:ext>
     </p:extLst>
   </p:cSld>
@@ -2507,7 +4241,7 @@
           <p:cNvPr id="2" name="Title 1">
             <a:extLst>
               <a:ext uri="{FF2B5EF4-FFF2-40B4-BE49-F238E27FC236}">
-                <a16:creationId xmlns="" xmlns:a16="http://schemas.microsoft.com/office/drawing/2014/main" id="{7BD154AA-0E2A-4BF6-BC21-2A44748D9D37}"/>
+                <a16:creationId xmlns:a16="http://schemas.microsoft.com/office/drawing/2014/main" id="{7BD154AA-0E2A-4BF6-BC21-2A44748D9D37}"/>
               </a:ext>
             </a:extLst>
           </p:cNvPr>
@@ -2544,7 +4278,7 @@
           <p:cNvPr id="3" name="Picture Placeholder 2">
             <a:extLst>
               <a:ext uri="{FF2B5EF4-FFF2-40B4-BE49-F238E27FC236}">
-                <a16:creationId xmlns="" xmlns:a16="http://schemas.microsoft.com/office/drawing/2014/main" id="{A64B5038-0450-4D3D-A90B-2F85F7565716}"/>
+                <a16:creationId xmlns:a16="http://schemas.microsoft.com/office/drawing/2014/main" id="{A64B5038-0450-4D3D-A90B-2F85F7565716}"/>
               </a:ext>
             </a:extLst>
           </p:cNvPr>
@@ -2611,7 +4345,7 @@
           <p:cNvPr id="4" name="Text Placeholder 3">
             <a:extLst>
               <a:ext uri="{FF2B5EF4-FFF2-40B4-BE49-F238E27FC236}">
-                <a16:creationId xmlns="" xmlns:a16="http://schemas.microsoft.com/office/drawing/2014/main" id="{2BDB941D-9222-435E-8305-4A8CB89E7BED}"/>
+                <a16:creationId xmlns:a16="http://schemas.microsoft.com/office/drawing/2014/main" id="{2BDB941D-9222-435E-8305-4A8CB89E7BED}"/>
               </a:ext>
             </a:extLst>
           </p:cNvPr>
@@ -2682,7 +4416,7 @@
           <p:cNvPr id="5" name="Date Placeholder 4">
             <a:extLst>
               <a:ext uri="{FF2B5EF4-FFF2-40B4-BE49-F238E27FC236}">
-                <a16:creationId xmlns="" xmlns:a16="http://schemas.microsoft.com/office/drawing/2014/main" id="{256BC66E-EA7F-4F7B-88BE-D273BEBBD2DC}"/>
+                <a16:creationId xmlns:a16="http://schemas.microsoft.com/office/drawing/2014/main" id="{256BC66E-EA7F-4F7B-88BE-D273BEBBD2DC}"/>
               </a:ext>
             </a:extLst>
           </p:cNvPr>
@@ -2701,7 +4435,7 @@
             <a:fld id="{177E6806-CC6B-498A-9ADD-8522D25E232D}" type="datetimeFigureOut">
               <a:rPr lang="en-US" smtClean="0"/>
               <a:pPr/>
-              <a:t>11/14/2019</a:t>
+              <a:t>11/17/2019</a:t>
             </a:fld>
             <a:endParaRPr lang="en-US"/>
           </a:p>
@@ -2712,7 +4446,7 @@
           <p:cNvPr id="6" name="Footer Placeholder 5">
             <a:extLst>
               <a:ext uri="{FF2B5EF4-FFF2-40B4-BE49-F238E27FC236}">
-                <a16:creationId xmlns="" xmlns:a16="http://schemas.microsoft.com/office/drawing/2014/main" id="{89318CB3-0663-46C5-AC4E-3D2B94803B0C}"/>
+                <a16:creationId xmlns:a16="http://schemas.microsoft.com/office/drawing/2014/main" id="{89318CB3-0663-46C5-AC4E-3D2B94803B0C}"/>
               </a:ext>
             </a:extLst>
           </p:cNvPr>
@@ -2737,7 +4471,7 @@
           <p:cNvPr id="7" name="Slide Number Placeholder 6">
             <a:extLst>
               <a:ext uri="{FF2B5EF4-FFF2-40B4-BE49-F238E27FC236}">
-                <a16:creationId xmlns="" xmlns:a16="http://schemas.microsoft.com/office/drawing/2014/main" id="{8858CF0C-54D4-465B-89FF-955838C8077A}"/>
+                <a16:creationId xmlns:a16="http://schemas.microsoft.com/office/drawing/2014/main" id="{8858CF0C-54D4-465B-89FF-955838C8077A}"/>
               </a:ext>
             </a:extLst>
           </p:cNvPr>
@@ -2765,7 +4499,7 @@
     </p:spTree>
     <p:extLst>
       <p:ext uri="{BB962C8B-B14F-4D97-AF65-F5344CB8AC3E}">
-        <p14:creationId xmlns:p14="http://schemas.microsoft.com/office/powerpoint/2010/main" xmlns="" val="1134101139"/>
+        <p14:creationId xmlns:p14="http://schemas.microsoft.com/office/powerpoint/2010/main" val="1134101139"/>
       </p:ext>
     </p:extLst>
   </p:cSld>
@@ -2802,7 +4536,7 @@
           <p:cNvPr id="2" name="Title Placeholder 1">
             <a:extLst>
               <a:ext uri="{FF2B5EF4-FFF2-40B4-BE49-F238E27FC236}">
-                <a16:creationId xmlns="" xmlns:a16="http://schemas.microsoft.com/office/drawing/2014/main" id="{CC1684EB-0CB8-444F-9769-F142A3FE2EE8}"/>
+                <a16:creationId xmlns:a16="http://schemas.microsoft.com/office/drawing/2014/main" id="{CC1684EB-0CB8-444F-9769-F142A3FE2EE8}"/>
               </a:ext>
             </a:extLst>
           </p:cNvPr>
@@ -2840,7 +4574,7 @@
           <p:cNvPr id="3" name="Text Placeholder 2">
             <a:extLst>
               <a:ext uri="{FF2B5EF4-FFF2-40B4-BE49-F238E27FC236}">
-                <a16:creationId xmlns="" xmlns:a16="http://schemas.microsoft.com/office/drawing/2014/main" id="{1F7B1710-D254-433C-AB26-A86C70604A08}"/>
+                <a16:creationId xmlns:a16="http://schemas.microsoft.com/office/drawing/2014/main" id="{1F7B1710-D254-433C-AB26-A86C70604A08}"/>
               </a:ext>
             </a:extLst>
           </p:cNvPr>
@@ -2907,7 +4641,7 @@
           <p:cNvPr id="4" name="Date Placeholder 3">
             <a:extLst>
               <a:ext uri="{FF2B5EF4-FFF2-40B4-BE49-F238E27FC236}">
-                <a16:creationId xmlns="" xmlns:a16="http://schemas.microsoft.com/office/drawing/2014/main" id="{B0B7D5CB-6005-4016-8A05-A08F264BCB83}"/>
+                <a16:creationId xmlns:a16="http://schemas.microsoft.com/office/drawing/2014/main" id="{B0B7D5CB-6005-4016-8A05-A08F264BCB83}"/>
               </a:ext>
             </a:extLst>
           </p:cNvPr>
@@ -2944,7 +4678,7 @@
             <a:fld id="{177E6806-CC6B-498A-9ADD-8522D25E232D}" type="datetimeFigureOut">
               <a:rPr lang="en-US" smtClean="0"/>
               <a:pPr/>
-              <a:t>11/14/2019</a:t>
+              <a:t>11/17/2019</a:t>
             </a:fld>
             <a:endParaRPr lang="en-US"/>
           </a:p>
@@ -2955,7 +4689,7 @@
           <p:cNvPr id="5" name="Footer Placeholder 4">
             <a:extLst>
               <a:ext uri="{FF2B5EF4-FFF2-40B4-BE49-F238E27FC236}">
-                <a16:creationId xmlns="" xmlns:a16="http://schemas.microsoft.com/office/drawing/2014/main" id="{EBDD3E0E-A0A7-47A7-AE78-DE6F07B8EB84}"/>
+                <a16:creationId xmlns:a16="http://schemas.microsoft.com/office/drawing/2014/main" id="{EBDD3E0E-A0A7-47A7-AE78-DE6F07B8EB84}"/>
               </a:ext>
             </a:extLst>
           </p:cNvPr>
@@ -2998,7 +4732,7 @@
           <p:cNvPr id="6" name="Slide Number Placeholder 5">
             <a:extLst>
               <a:ext uri="{FF2B5EF4-FFF2-40B4-BE49-F238E27FC236}">
-                <a16:creationId xmlns="" xmlns:a16="http://schemas.microsoft.com/office/drawing/2014/main" id="{ACDBEFFF-3143-4D5F-AC4D-15CCA180E59D}"/>
+                <a16:creationId xmlns:a16="http://schemas.microsoft.com/office/drawing/2014/main" id="{ACDBEFFF-3143-4D5F-AC4D-15CCA180E59D}"/>
               </a:ext>
             </a:extLst>
           </p:cNvPr>
@@ -3044,7 +4778,7 @@
     </p:spTree>
     <p:extLst>
       <p:ext uri="{BB962C8B-B14F-4D97-AF65-F5344CB8AC3E}">
-        <p14:creationId xmlns:p14="http://schemas.microsoft.com/office/powerpoint/2010/main" xmlns="" val="2248394255"/>
+        <p14:creationId xmlns:p14="http://schemas.microsoft.com/office/powerpoint/2010/main" val="2248394255"/>
       </p:ext>
     </p:extLst>
   </p:cSld>
@@ -3367,7 +5101,7 @@
           <p:cNvPr id="4" name="Title 1">
             <a:extLst>
               <a:ext uri="{FF2B5EF4-FFF2-40B4-BE49-F238E27FC236}">
-                <a16:creationId xmlns="" xmlns:a16="http://schemas.microsoft.com/office/drawing/2014/main" id="{7E4C7065-9053-439E-8FAC-B3F312009E29}"/>
+                <a16:creationId xmlns:a16="http://schemas.microsoft.com/office/drawing/2014/main" id="{7E4C7065-9053-439E-8FAC-B3F312009E29}"/>
               </a:ext>
             </a:extLst>
           </p:cNvPr>
@@ -3421,7 +5155,7 @@
           <p:cNvPr id="5" name="Subtitle 2">
             <a:extLst>
               <a:ext uri="{FF2B5EF4-FFF2-40B4-BE49-F238E27FC236}">
-                <a16:creationId xmlns="" xmlns:a16="http://schemas.microsoft.com/office/drawing/2014/main" id="{8B948D26-62F4-458D-960A-FD96A5CC0FCA}"/>
+                <a16:creationId xmlns:a16="http://schemas.microsoft.com/office/drawing/2014/main" id="{8B948D26-62F4-458D-960A-FD96A5CC0FCA}"/>
               </a:ext>
             </a:extLst>
           </p:cNvPr>
@@ -3664,7 +5398,7 @@
           <p:cNvPr id="6" name="TextBox 3">
             <a:extLst>
               <a:ext uri="{FF2B5EF4-FFF2-40B4-BE49-F238E27FC236}">
-                <a16:creationId xmlns="" xmlns:a16="http://schemas.microsoft.com/office/drawing/2014/main" id="{F9E51A6D-14F0-4C80-8A42-D5242AC31F14}"/>
+                <a16:creationId xmlns:a16="http://schemas.microsoft.com/office/drawing/2014/main" id="{F9E51A6D-14F0-4C80-8A42-D5242AC31F14}"/>
               </a:ext>
             </a:extLst>
           </p:cNvPr>
@@ -3791,15 +5525,7 @@
             <a:pPr algn="ctr"/>
             <a:r>
               <a:rPr lang="en-US" sz="2000" dirty="0"/>
-              <a:t>Higher School of Applied Mathematics and </a:t>
-            </a:r>
-            <a:r>
-              <a:rPr lang="en-US" sz="2000" dirty="0" smtClean="0"/>
-              <a:t>Computational </a:t>
-            </a:r>
-            <a:r>
-              <a:rPr lang="en-US" sz="2000" dirty="0"/>
-              <a:t>Physics, Russia</a:t>
+              <a:t>Higher School of Applied Mathematics and Computational Physics, Russia</a:t>
             </a:r>
           </a:p>
         </p:txBody>
@@ -3809,7 +5535,7 @@
           <p:cNvPr id="9" name="TextBox 6">
             <a:extLst>
               <a:ext uri="{FF2B5EF4-FFF2-40B4-BE49-F238E27FC236}">
-                <a16:creationId xmlns="" xmlns:a16="http://schemas.microsoft.com/office/drawing/2014/main" id="{B976E0B5-438B-456D-95FF-0ED4CE212731}"/>
+                <a16:creationId xmlns:a16="http://schemas.microsoft.com/office/drawing/2014/main" id="{B976E0B5-438B-456D-95FF-0ED4CE212731}"/>
               </a:ext>
             </a:extLst>
           </p:cNvPr>
@@ -3929,7 +5655,7 @@
             <a:pPr algn="ctr"/>
             <a:r>
               <a:rPr lang="ru-RU" dirty="0"/>
-              <a:t>201</a:t>
+              <a:t>18 ноября 201</a:t>
             </a:r>
             <a:r>
               <a:rPr lang="en-US" dirty="0"/>
@@ -3946,7 +5672,7 @@
     </p:spTree>
     <p:extLst>
       <p:ext uri="{BB962C8B-B14F-4D97-AF65-F5344CB8AC3E}">
-        <p14:creationId xmlns:p14="http://schemas.microsoft.com/office/powerpoint/2010/main" xmlns="" val="3071901561"/>
+        <p14:creationId xmlns:p14="http://schemas.microsoft.com/office/powerpoint/2010/main" val="3071901561"/>
       </p:ext>
     </p:extLst>
   </p:cSld>
@@ -3978,7 +5704,7 @@
           <p:cNvPr id="2" name="Title 1">
             <a:extLst>
               <a:ext uri="{FF2B5EF4-FFF2-40B4-BE49-F238E27FC236}">
-                <a16:creationId xmlns="" xmlns:a16="http://schemas.microsoft.com/office/drawing/2014/main" id="{FB4CC34F-AB48-4150-B1EE-2D3A1EBA5063}"/>
+                <a16:creationId xmlns:a16="http://schemas.microsoft.com/office/drawing/2014/main" id="{FB4CC34F-AB48-4150-B1EE-2D3A1EBA5063}"/>
               </a:ext>
             </a:extLst>
           </p:cNvPr>
@@ -4006,7 +5732,7 @@
           <p:cNvPr id="3" name="Content Placeholder 2">
             <a:extLst>
               <a:ext uri="{FF2B5EF4-FFF2-40B4-BE49-F238E27FC236}">
-                <a16:creationId xmlns="" xmlns:a16="http://schemas.microsoft.com/office/drawing/2014/main" id="{F2F3F7CF-4925-4D7C-95F0-D81BD5CEA879}"/>
+                <a16:creationId xmlns:a16="http://schemas.microsoft.com/office/drawing/2014/main" id="{F2F3F7CF-4925-4D7C-95F0-D81BD5CEA879}"/>
               </a:ext>
             </a:extLst>
           </p:cNvPr>
@@ -4050,7 +5776,7 @@
     </p:spTree>
     <p:extLst>
       <p:ext uri="{BB962C8B-B14F-4D97-AF65-F5344CB8AC3E}">
-        <p14:creationId xmlns:p14="http://schemas.microsoft.com/office/powerpoint/2010/main" xmlns="" val="372936009"/>
+        <p14:creationId xmlns:p14="http://schemas.microsoft.com/office/powerpoint/2010/main" val="372936009"/>
       </p:ext>
     </p:extLst>
   </p:cSld>
@@ -4082,7 +5808,7 @@
           <p:cNvPr id="2" name="Title 1">
             <a:extLst>
               <a:ext uri="{FF2B5EF4-FFF2-40B4-BE49-F238E27FC236}">
-                <a16:creationId xmlns="" xmlns:a16="http://schemas.microsoft.com/office/drawing/2014/main" id="{7FAFCCAF-85E0-4793-BC14-1BA9F112AFB5}"/>
+                <a16:creationId xmlns:a16="http://schemas.microsoft.com/office/drawing/2014/main" id="{7FAFCCAF-85E0-4793-BC14-1BA9F112AFB5}"/>
               </a:ext>
             </a:extLst>
           </p:cNvPr>
@@ -4115,7 +5841,7 @@
           <p:cNvPr id="9" name="Table 8">
             <a:extLst>
               <a:ext uri="{FF2B5EF4-FFF2-40B4-BE49-F238E27FC236}">
-                <a16:creationId xmlns="" xmlns:a16="http://schemas.microsoft.com/office/drawing/2014/main" id="{F3361100-D2FC-4CE8-80E8-A8C0BE531E2F}"/>
+                <a16:creationId xmlns:a16="http://schemas.microsoft.com/office/drawing/2014/main" id="{F3361100-D2FC-4CE8-80E8-A8C0BE531E2F}"/>
               </a:ext>
             </a:extLst>
           </p:cNvPr>
@@ -4125,7 +5851,7 @@
           <p:nvPr>
             <p:extLst>
               <p:ext uri="{D42A27DB-BD31-4B8C-83A1-F6EECF244321}">
-                <p14:modId xmlns:p14="http://schemas.microsoft.com/office/powerpoint/2010/main" xmlns="" val="877376678"/>
+                <p14:modId xmlns:p14="http://schemas.microsoft.com/office/powerpoint/2010/main" val="877376678"/>
               </p:ext>
             </p:extLst>
           </p:nvPr>
@@ -4142,14 +5868,14 @@
                 <a:gridCol w="2757055">
                   <a:extLst>
                     <a:ext uri="{9D8B030D-6E8A-4147-A177-3AD203B41FA5}">
-                      <a16:colId xmlns="" xmlns:a16="http://schemas.microsoft.com/office/drawing/2014/main" val="4136364936"/>
+                      <a16:colId xmlns:a16="http://schemas.microsoft.com/office/drawing/2014/main" val="4136364936"/>
                     </a:ext>
                   </a:extLst>
                 </a:gridCol>
                 <a:gridCol w="1551709">
                   <a:extLst>
                     <a:ext uri="{9D8B030D-6E8A-4147-A177-3AD203B41FA5}">
-                      <a16:colId xmlns="" xmlns:a16="http://schemas.microsoft.com/office/drawing/2014/main" val="3962416559"/>
+                      <a16:colId xmlns:a16="http://schemas.microsoft.com/office/drawing/2014/main" val="3962416559"/>
                     </a:ext>
                   </a:extLst>
                 </a:gridCol>
@@ -4297,7 +6023,7 @@
                 </a:tc>
                 <a:extLst>
                   <a:ext uri="{0D108BD9-81ED-4DB2-BD59-A6C34878D82A}">
-                    <a16:rowId xmlns="" xmlns:a16="http://schemas.microsoft.com/office/drawing/2014/main" val="253634774"/>
+                    <a16:rowId xmlns:a16="http://schemas.microsoft.com/office/drawing/2014/main" val="253634774"/>
                   </a:ext>
                 </a:extLst>
               </a:tr>
@@ -4434,7 +6160,7 @@
                 </a:tc>
                 <a:extLst>
                   <a:ext uri="{0D108BD9-81ED-4DB2-BD59-A6C34878D82A}">
-                    <a16:rowId xmlns="" xmlns:a16="http://schemas.microsoft.com/office/drawing/2014/main" val="1260823875"/>
+                    <a16:rowId xmlns:a16="http://schemas.microsoft.com/office/drawing/2014/main" val="1260823875"/>
                   </a:ext>
                 </a:extLst>
               </a:tr>
@@ -4571,7 +6297,7 @@
                 </a:tc>
                 <a:extLst>
                   <a:ext uri="{0D108BD9-81ED-4DB2-BD59-A6C34878D82A}">
-                    <a16:rowId xmlns="" xmlns:a16="http://schemas.microsoft.com/office/drawing/2014/main" val="1383525387"/>
+                    <a16:rowId xmlns:a16="http://schemas.microsoft.com/office/drawing/2014/main" val="1383525387"/>
                   </a:ext>
                 </a:extLst>
               </a:tr>
@@ -4708,7 +6434,7 @@
                 </a:tc>
                 <a:extLst>
                   <a:ext uri="{0D108BD9-81ED-4DB2-BD59-A6C34878D82A}">
-                    <a16:rowId xmlns="" xmlns:a16="http://schemas.microsoft.com/office/drawing/2014/main" val="802050039"/>
+                    <a16:rowId xmlns:a16="http://schemas.microsoft.com/office/drawing/2014/main" val="802050039"/>
                   </a:ext>
                 </a:extLst>
               </a:tr>
@@ -4845,7 +6571,7 @@
                 </a:tc>
                 <a:extLst>
                   <a:ext uri="{0D108BD9-81ED-4DB2-BD59-A6C34878D82A}">
-                    <a16:rowId xmlns="" xmlns:a16="http://schemas.microsoft.com/office/drawing/2014/main" val="1262826881"/>
+                    <a16:rowId xmlns:a16="http://schemas.microsoft.com/office/drawing/2014/main" val="1262826881"/>
                   </a:ext>
                 </a:extLst>
               </a:tr>
@@ -4985,7 +6711,7 @@
                 </a:tc>
                 <a:extLst>
                   <a:ext uri="{0D108BD9-81ED-4DB2-BD59-A6C34878D82A}">
-                    <a16:rowId xmlns="" xmlns:a16="http://schemas.microsoft.com/office/drawing/2014/main" val="2393056217"/>
+                    <a16:rowId xmlns:a16="http://schemas.microsoft.com/office/drawing/2014/main" val="2393056217"/>
                   </a:ext>
                 </a:extLst>
               </a:tr>
@@ -5122,7 +6848,7 @@
                 </a:tc>
                 <a:extLst>
                   <a:ext uri="{0D108BD9-81ED-4DB2-BD59-A6C34878D82A}">
-                    <a16:rowId xmlns="" xmlns:a16="http://schemas.microsoft.com/office/drawing/2014/main" val="2943836085"/>
+                    <a16:rowId xmlns:a16="http://schemas.microsoft.com/office/drawing/2014/main" val="2943836085"/>
                   </a:ext>
                 </a:extLst>
               </a:tr>
@@ -5259,7 +6985,7 @@
                 </a:tc>
                 <a:extLst>
                   <a:ext uri="{0D108BD9-81ED-4DB2-BD59-A6C34878D82A}">
-                    <a16:rowId xmlns="" xmlns:a16="http://schemas.microsoft.com/office/drawing/2014/main" val="2605425791"/>
+                    <a16:rowId xmlns:a16="http://schemas.microsoft.com/office/drawing/2014/main" val="2605425791"/>
                   </a:ext>
                 </a:extLst>
               </a:tr>
@@ -5399,7 +7125,7 @@
                 </a:tc>
                 <a:extLst>
                   <a:ext uri="{0D108BD9-81ED-4DB2-BD59-A6C34878D82A}">
-                    <a16:rowId xmlns="" xmlns:a16="http://schemas.microsoft.com/office/drawing/2014/main" val="2448526215"/>
+                    <a16:rowId xmlns:a16="http://schemas.microsoft.com/office/drawing/2014/main" val="2448526215"/>
                   </a:ext>
                 </a:extLst>
               </a:tr>
@@ -5539,7 +7265,7 @@
                 </a:tc>
                 <a:extLst>
                   <a:ext uri="{0D108BD9-81ED-4DB2-BD59-A6C34878D82A}">
-                    <a16:rowId xmlns="" xmlns:a16="http://schemas.microsoft.com/office/drawing/2014/main" val="2139935751"/>
+                    <a16:rowId xmlns:a16="http://schemas.microsoft.com/office/drawing/2014/main" val="2139935751"/>
                   </a:ext>
                 </a:extLst>
               </a:tr>
@@ -5679,7 +7405,7 @@
                 </a:tc>
                 <a:extLst>
                   <a:ext uri="{0D108BD9-81ED-4DB2-BD59-A6C34878D82A}">
-                    <a16:rowId xmlns="" xmlns:a16="http://schemas.microsoft.com/office/drawing/2014/main" val="1868532617"/>
+                    <a16:rowId xmlns:a16="http://schemas.microsoft.com/office/drawing/2014/main" val="1868532617"/>
                   </a:ext>
                 </a:extLst>
               </a:tr>
@@ -5819,7 +7545,7 @@
                 </a:tc>
                 <a:extLst>
                   <a:ext uri="{0D108BD9-81ED-4DB2-BD59-A6C34878D82A}">
-                    <a16:rowId xmlns="" xmlns:a16="http://schemas.microsoft.com/office/drawing/2014/main" val="3434249434"/>
+                    <a16:rowId xmlns:a16="http://schemas.microsoft.com/office/drawing/2014/main" val="3434249434"/>
                   </a:ext>
                 </a:extLst>
               </a:tr>
@@ -5959,7 +7685,7 @@
                 </a:tc>
                 <a:extLst>
                   <a:ext uri="{0D108BD9-81ED-4DB2-BD59-A6C34878D82A}">
-                    <a16:rowId xmlns="" xmlns:a16="http://schemas.microsoft.com/office/drawing/2014/main" val="3058925131"/>
+                    <a16:rowId xmlns:a16="http://schemas.microsoft.com/office/drawing/2014/main" val="3058925131"/>
                   </a:ext>
                 </a:extLst>
               </a:tr>
@@ -6104,7 +7830,7 @@
                 </a:tc>
                 <a:extLst>
                   <a:ext uri="{0D108BD9-81ED-4DB2-BD59-A6C34878D82A}">
-                    <a16:rowId xmlns="" xmlns:a16="http://schemas.microsoft.com/office/drawing/2014/main" val="99529181"/>
+                    <a16:rowId xmlns:a16="http://schemas.microsoft.com/office/drawing/2014/main" val="99529181"/>
                   </a:ext>
                 </a:extLst>
               </a:tr>
@@ -6113,13 +7839,13 @@
         </a:graphic>
       </p:graphicFrame>
       <mc:AlternateContent xmlns:mc="http://schemas.openxmlformats.org/markup-compatibility/2006">
-        <mc:Choice xmlns:a14="http://schemas.microsoft.com/office/drawing/2010/main" xmlns="" Requires="a14">
+        <mc:Choice xmlns:a14="http://schemas.microsoft.com/office/drawing/2010/main" Requires="a14">
           <p:sp>
             <p:nvSpPr>
               <p:cNvPr id="11" name="Rectangle 10">
                 <a:extLst>
                   <a:ext uri="{FF2B5EF4-FFF2-40B4-BE49-F238E27FC236}">
-                    <a16:creationId xmlns:a16="http://schemas.microsoft.com/office/drawing/2014/main" xmlns="" id="{88C80FDC-9B9D-40F4-A79B-9A7681595EA5}"/>
+                    <a16:creationId xmlns:a16="http://schemas.microsoft.com/office/drawing/2014/main" id="{88C80FDC-9B9D-40F4-A79B-9A7681595EA5}"/>
                   </a:ext>
                 </a:extLst>
               </p:cNvPr>
@@ -6152,7 +7878,7 @@
                       <m:sSubPr>
                         <m:ctrlPr>
                           <a:rPr lang="en-US" sz="2000" i="1" smtClean="0">
-                            <a:latin typeface="Cambria Math" charset="0"/>
+                            <a:latin typeface="Cambria Math" panose="02040503050406030204" pitchFamily="18" charset="0"/>
                             <a:ea typeface="Times New Roman" panose="02020603050405020304" pitchFamily="18" charset="0"/>
                           </a:rPr>
                         </m:ctrlPr>
@@ -6187,7 +7913,7 @@
                       <m:fPr>
                         <m:ctrlPr>
                           <a:rPr lang="en-US" sz="2000" i="1">
-                            <a:latin typeface="Cambria Math" charset="0"/>
+                            <a:latin typeface="Cambria Math" panose="02040503050406030204" pitchFamily="18" charset="0"/>
                             <a:ea typeface="Times New Roman" panose="02020603050405020304" pitchFamily="18" charset="0"/>
                           </a:rPr>
                         </m:ctrlPr>
@@ -6200,7 +7926,7 @@
                             <m:supHide m:val="on"/>
                             <m:ctrlPr>
                               <a:rPr lang="en-US" sz="2000" i="1">
-                                <a:latin typeface="Cambria Math" charset="0"/>
+                                <a:latin typeface="Cambria Math" panose="02040503050406030204" pitchFamily="18" charset="0"/>
                                 <a:ea typeface="Times New Roman" panose="02020603050405020304" pitchFamily="18" charset="0"/>
                               </a:rPr>
                             </m:ctrlPr>
@@ -6241,7 +7967,7 @@
                               <m:sSubPr>
                                 <m:ctrlPr>
                                   <a:rPr lang="en-US" sz="2000" i="1">
-                                    <a:latin typeface="Cambria Math" charset="0"/>
+                                    <a:latin typeface="Cambria Math" panose="02040503050406030204" pitchFamily="18" charset="0"/>
                                     <a:ea typeface="Times New Roman" panose="02020603050405020304" pitchFamily="18" charset="0"/>
                                   </a:rPr>
                                 </m:ctrlPr>
@@ -6276,7 +8002,7 @@
                             <m:supHide m:val="on"/>
                             <m:ctrlPr>
                               <a:rPr lang="en-US" sz="2000" i="1">
-                                <a:latin typeface="Cambria Math" charset="0"/>
+                                <a:latin typeface="Cambria Math" panose="02040503050406030204" pitchFamily="18" charset="0"/>
                                 <a:ea typeface="Times New Roman" panose="02020603050405020304" pitchFamily="18" charset="0"/>
                               </a:rPr>
                             </m:ctrlPr>
@@ -6317,7 +8043,7 @@
                               <m:sSubPr>
                                 <m:ctrlPr>
                                   <a:rPr lang="en-US" sz="2000" i="1">
-                                    <a:latin typeface="Cambria Math" charset="0"/>
+                                    <a:latin typeface="Cambria Math" panose="02040503050406030204" pitchFamily="18" charset="0"/>
                                     <a:ea typeface="Times New Roman" panose="02020603050405020304" pitchFamily="18" charset="0"/>
                                   </a:rPr>
                                 </m:ctrlPr>
@@ -6361,7 +8087,7 @@
                           <m:sSubPr>
                             <m:ctrlPr>
                               <a:rPr lang="en-US" sz="2000" i="1">
-                                <a:latin typeface="Cambria Math" charset="0"/>
+                                <a:latin typeface="Cambria Math" panose="02040503050406030204" pitchFamily="18" charset="0"/>
                                 <a:ea typeface="Times New Roman" panose="02020603050405020304" pitchFamily="18" charset="0"/>
                               </a:rPr>
                             </m:ctrlPr>
@@ -6421,7 +8147,7 @@
               <p:cNvPr id="11" name="Rectangle 10">
                 <a:extLst>
                   <a:ext uri="{FF2B5EF4-FFF2-40B4-BE49-F238E27FC236}">
-                    <a16:creationId xmlns="" xmlns:a14="http://schemas.microsoft.com/office/drawing/2010/main" xmlns:a16="http://schemas.microsoft.com/office/drawing/2014/main" id="{88C80FDC-9B9D-40F4-A79B-9A7681595EA5}"/>
+                    <a16:creationId xmlns:a16="http://schemas.microsoft.com/office/drawing/2014/main" id="{88C80FDC-9B9D-40F4-A79B-9A7681595EA5}"/>
                   </a:ext>
                 </a:extLst>
               </p:cNvPr>
@@ -6438,8 +8164,8 @@
               <a:prstGeom prst="rect">
                 <a:avLst/>
               </a:prstGeom>
-              <a:blipFill rotWithShape="0">
-                <a:blip r:embed="rId2"/>
+              <a:blipFill>
+                <a:blip r:embed="rId3"/>
                 <a:stretch>
                   <a:fillRect t="-67273"/>
                 </a:stretch>
@@ -6461,7 +8187,7 @@
         </mc:Fallback>
       </mc:AlternateContent>
       <mc:AlternateContent xmlns:mc="http://schemas.openxmlformats.org/markup-compatibility/2006">
-        <mc:Choice xmlns:a14="http://schemas.microsoft.com/office/drawing/2010/main" xmlns="" Requires="a14">
+        <mc:Choice xmlns:a14="http://schemas.microsoft.com/office/drawing/2010/main" Requires="a14">
           <p:sp>
             <p:nvSpPr>
               <p:cNvPr id="4" name="Rectangle 3"/>
@@ -6494,7 +8220,7 @@
                       <m:sSubPr>
                         <m:ctrlPr>
                           <a:rPr lang="en-US" sz="2000" i="1">
-                            <a:latin typeface="Cambria Math" charset="0"/>
+                            <a:latin typeface="Cambria Math" panose="02040503050406030204" pitchFamily="18" charset="0"/>
                             <a:ea typeface="Times New Roman" panose="02020603050405020304" pitchFamily="18" charset="0"/>
                           </a:rPr>
                         </m:ctrlPr>
@@ -6529,7 +8255,7 @@
                       <m:fPr>
                         <m:ctrlPr>
                           <a:rPr lang="en-US" sz="2000" i="1">
-                            <a:latin typeface="Cambria Math" charset="0"/>
+                            <a:latin typeface="Cambria Math" panose="02040503050406030204" pitchFamily="18" charset="0"/>
                             <a:ea typeface="Times New Roman" panose="02020603050405020304" pitchFamily="18" charset="0"/>
                           </a:rPr>
                         </m:ctrlPr>
@@ -6542,7 +8268,7 @@
                             <m:supHide m:val="on"/>
                             <m:ctrlPr>
                               <a:rPr lang="en-US" sz="2000" i="1">
-                                <a:latin typeface="Cambria Math" charset="0"/>
+                                <a:latin typeface="Cambria Math" panose="02040503050406030204" pitchFamily="18" charset="0"/>
                                 <a:ea typeface="Times New Roman" panose="02020603050405020304" pitchFamily="18" charset="0"/>
                               </a:rPr>
                             </m:ctrlPr>
@@ -6583,7 +8309,7 @@
                               <m:sSubPr>
                                 <m:ctrlPr>
                                   <a:rPr lang="en-US" sz="2000" i="1">
-                                    <a:latin typeface="Cambria Math" charset="0"/>
+                                    <a:latin typeface="Cambria Math" panose="02040503050406030204" pitchFamily="18" charset="0"/>
                                     <a:ea typeface="Times New Roman" panose="02020603050405020304" pitchFamily="18" charset="0"/>
                                   </a:rPr>
                                 </m:ctrlPr>
@@ -6618,7 +8344,7 @@
                             <m:supHide m:val="on"/>
                             <m:ctrlPr>
                               <a:rPr lang="en-US" sz="2000" i="1">
-                                <a:latin typeface="Cambria Math" charset="0"/>
+                                <a:latin typeface="Cambria Math" panose="02040503050406030204" pitchFamily="18" charset="0"/>
                                 <a:ea typeface="Times New Roman" panose="02020603050405020304" pitchFamily="18" charset="0"/>
                               </a:rPr>
                             </m:ctrlPr>
@@ -6659,7 +8385,7 @@
                               <m:sSubPr>
                                 <m:ctrlPr>
                                   <a:rPr lang="en-US" sz="2000" i="1">
-                                    <a:latin typeface="Cambria Math" charset="0"/>
+                                    <a:latin typeface="Cambria Math" panose="02040503050406030204" pitchFamily="18" charset="0"/>
                                     <a:ea typeface="Times New Roman" panose="02020603050405020304" pitchFamily="18" charset="0"/>
                                   </a:rPr>
                                 </m:ctrlPr>
@@ -6703,7 +8429,7 @@
                           <m:sSubPr>
                             <m:ctrlPr>
                               <a:rPr lang="en-US" sz="2000" i="1">
-                                <a:latin typeface="Cambria Math" charset="0"/>
+                                <a:latin typeface="Cambria Math" panose="02040503050406030204" pitchFamily="18" charset="0"/>
                                 <a:ea typeface="Times New Roman" panose="02020603050405020304" pitchFamily="18" charset="0"/>
                               </a:rPr>
                             </m:ctrlPr>
@@ -6790,8 +8516,8 @@
               <a:prstGeom prst="rect">
                 <a:avLst/>
               </a:prstGeom>
-              <a:blipFill rotWithShape="0">
-                <a:blip r:embed="rId3"/>
+              <a:blipFill>
+                <a:blip r:embed="rId4"/>
                 <a:stretch>
                   <a:fillRect t="-40659"/>
                 </a:stretch>
@@ -6813,7 +8539,7 @@
         </mc:Fallback>
       </mc:AlternateContent>
       <mc:AlternateContent xmlns:mc="http://schemas.openxmlformats.org/markup-compatibility/2006">
-        <mc:Choice xmlns:a14="http://schemas.microsoft.com/office/drawing/2010/main" xmlns="" Requires="a14">
+        <mc:Choice xmlns:a14="http://schemas.microsoft.com/office/drawing/2010/main" Requires="a14">
           <p:sp>
             <p:nvSpPr>
               <p:cNvPr id="5" name="Rectangle 4"/>
@@ -6863,7 +8589,7 @@
                       <m:sSubPr>
                         <m:ctrlPr>
                           <a:rPr lang="en-US" sz="2000" i="1">
-                            <a:latin typeface="Cambria Math" charset="0"/>
+                            <a:latin typeface="Cambria Math" panose="02040503050406030204" pitchFamily="18" charset="0"/>
                             <a:ea typeface="Times New Roman" panose="02020603050405020304" pitchFamily="18" charset="0"/>
                           </a:rPr>
                         </m:ctrlPr>
@@ -6898,7 +8624,7 @@
                       <m:fPr>
                         <m:ctrlPr>
                           <a:rPr lang="en-US" sz="2000" i="1">
-                            <a:latin typeface="Cambria Math" charset="0"/>
+                            <a:latin typeface="Cambria Math" panose="02040503050406030204" pitchFamily="18" charset="0"/>
                             <a:ea typeface="Times New Roman" panose="02020603050405020304" pitchFamily="18" charset="0"/>
                           </a:rPr>
                         </m:ctrlPr>
@@ -6915,7 +8641,7 @@
                           <m:sSubPr>
                             <m:ctrlPr>
                               <a:rPr lang="en-US" sz="2000" i="1">
-                                <a:latin typeface="Cambria Math" charset="0"/>
+                                <a:latin typeface="Cambria Math" panose="02040503050406030204" pitchFamily="18" charset="0"/>
                                 <a:ea typeface="Times New Roman" panose="02020603050405020304" pitchFamily="18" charset="0"/>
                               </a:rPr>
                             </m:ctrlPr>
@@ -6943,7 +8669,7 @@
                           <m:sSubPr>
                             <m:ctrlPr>
                               <a:rPr lang="en-US" sz="2000" i="1">
-                                <a:latin typeface="Cambria Math" charset="0"/>
+                                <a:latin typeface="Cambria Math" panose="02040503050406030204" pitchFamily="18" charset="0"/>
                                 <a:ea typeface="Times New Roman" panose="02020603050405020304" pitchFamily="18" charset="0"/>
                               </a:rPr>
                             </m:ctrlPr>
@@ -6973,7 +8699,7 @@
                           <m:sSubPr>
                             <m:ctrlPr>
                               <a:rPr lang="en-US" sz="2000" i="1">
-                                <a:latin typeface="Cambria Math" charset="0"/>
+                                <a:latin typeface="Cambria Math" panose="02040503050406030204" pitchFamily="18" charset="0"/>
                                 <a:ea typeface="Times New Roman" panose="02020603050405020304" pitchFamily="18" charset="0"/>
                               </a:rPr>
                             </m:ctrlPr>
@@ -7008,7 +8734,7 @@
                           <m:sSubPr>
                             <m:ctrlPr>
                               <a:rPr lang="en-US" sz="2000" i="1">
-                                <a:latin typeface="Cambria Math" charset="0"/>
+                                <a:latin typeface="Cambria Math" panose="02040503050406030204" pitchFamily="18" charset="0"/>
                                 <a:ea typeface="Times New Roman" panose="02020603050405020304" pitchFamily="18" charset="0"/>
                               </a:rPr>
                             </m:ctrlPr>
@@ -7064,8 +8790,8 @@
               <a:prstGeom prst="rect">
                 <a:avLst/>
               </a:prstGeom>
-              <a:blipFill rotWithShape="0">
-                <a:blip r:embed="rId4"/>
+              <a:blipFill>
+                <a:blip r:embed="rId5"/>
                 <a:stretch>
                   <a:fillRect t="-11250"/>
                 </a:stretch>
@@ -7089,7 +8815,7 @@
     </p:spTree>
     <p:extLst>
       <p:ext uri="{BB962C8B-B14F-4D97-AF65-F5344CB8AC3E}">
-        <p14:creationId xmlns:p14="http://schemas.microsoft.com/office/powerpoint/2010/main" xmlns="" val="3887754581"/>
+        <p14:creationId xmlns:p14="http://schemas.microsoft.com/office/powerpoint/2010/main" val="3887754581"/>
       </p:ext>
     </p:extLst>
   </p:cSld>
@@ -7121,7 +8847,7 @@
           <p:cNvPr id="2" name="Title 1">
             <a:extLst>
               <a:ext uri="{FF2B5EF4-FFF2-40B4-BE49-F238E27FC236}">
-                <a16:creationId xmlns="" xmlns:a16="http://schemas.microsoft.com/office/drawing/2014/main" id="{D0F82475-9B7E-45A8-9A45-E0C2E2791608}"/>
+                <a16:creationId xmlns:a16="http://schemas.microsoft.com/office/drawing/2014/main" id="{D0F82475-9B7E-45A8-9A45-E0C2E2791608}"/>
               </a:ext>
             </a:extLst>
           </p:cNvPr>
@@ -7149,7 +8875,7 @@
           <p:cNvPr id="5" name="Table 4">
             <a:extLst>
               <a:ext uri="{FF2B5EF4-FFF2-40B4-BE49-F238E27FC236}">
-                <a16:creationId xmlns="" xmlns:a16="http://schemas.microsoft.com/office/drawing/2014/main" id="{0575E406-495F-47BF-8674-5C2F23227401}"/>
+                <a16:creationId xmlns:a16="http://schemas.microsoft.com/office/drawing/2014/main" id="{0575E406-495F-47BF-8674-5C2F23227401}"/>
               </a:ext>
             </a:extLst>
           </p:cNvPr>
@@ -7159,7 +8885,7 @@
           <p:nvPr>
             <p:extLst>
               <p:ext uri="{D42A27DB-BD31-4B8C-83A1-F6EECF244321}">
-                <p14:modId xmlns:p14="http://schemas.microsoft.com/office/powerpoint/2010/main" xmlns="" val="3767782818"/>
+                <p14:modId xmlns:p14="http://schemas.microsoft.com/office/powerpoint/2010/main" val="3767782818"/>
               </p:ext>
             </p:extLst>
           </p:nvPr>
@@ -7178,14 +8904,14 @@
                 <a:gridCol w="3999232">
                   <a:extLst>
                     <a:ext uri="{9D8B030D-6E8A-4147-A177-3AD203B41FA5}">
-                      <a16:colId xmlns="" xmlns:a16="http://schemas.microsoft.com/office/drawing/2014/main" val="1301186544"/>
+                      <a16:colId xmlns:a16="http://schemas.microsoft.com/office/drawing/2014/main" val="1301186544"/>
                     </a:ext>
                   </a:extLst>
                 </a:gridCol>
                 <a:gridCol w="4824337">
                   <a:extLst>
                     <a:ext uri="{9D8B030D-6E8A-4147-A177-3AD203B41FA5}">
-                      <a16:colId xmlns="" xmlns:a16="http://schemas.microsoft.com/office/drawing/2014/main" val="2915870967"/>
+                      <a16:colId xmlns:a16="http://schemas.microsoft.com/office/drawing/2014/main" val="2915870967"/>
                     </a:ext>
                   </a:extLst>
                 </a:gridCol>
@@ -7339,7 +9065,7 @@
                 </a:tc>
                 <a:extLst>
                   <a:ext uri="{0D108BD9-81ED-4DB2-BD59-A6C34878D82A}">
-                    <a16:rowId xmlns="" xmlns:a16="http://schemas.microsoft.com/office/drawing/2014/main" val="3170020359"/>
+                    <a16:rowId xmlns:a16="http://schemas.microsoft.com/office/drawing/2014/main" val="3170020359"/>
                   </a:ext>
                 </a:extLst>
               </a:tr>
@@ -7504,7 +9230,7 @@
                 </a:tc>
                 <a:extLst>
                   <a:ext uri="{0D108BD9-81ED-4DB2-BD59-A6C34878D82A}">
-                    <a16:rowId xmlns="" xmlns:a16="http://schemas.microsoft.com/office/drawing/2014/main" val="1789036120"/>
+                    <a16:rowId xmlns:a16="http://schemas.microsoft.com/office/drawing/2014/main" val="1789036120"/>
                   </a:ext>
                 </a:extLst>
               </a:tr>
@@ -7643,7 +9369,7 @@
                 </a:tc>
                 <a:extLst>
                   <a:ext uri="{0D108BD9-81ED-4DB2-BD59-A6C34878D82A}">
-                    <a16:rowId xmlns="" xmlns:a16="http://schemas.microsoft.com/office/drawing/2014/main" val="2778997295"/>
+                    <a16:rowId xmlns:a16="http://schemas.microsoft.com/office/drawing/2014/main" val="2778997295"/>
                   </a:ext>
                 </a:extLst>
               </a:tr>
@@ -7776,7 +9502,7 @@
                 </a:tc>
                 <a:extLst>
                   <a:ext uri="{0D108BD9-81ED-4DB2-BD59-A6C34878D82A}">
-                    <a16:rowId xmlns="" xmlns:a16="http://schemas.microsoft.com/office/drawing/2014/main" val="378496545"/>
+                    <a16:rowId xmlns:a16="http://schemas.microsoft.com/office/drawing/2014/main" val="378496545"/>
                   </a:ext>
                 </a:extLst>
               </a:tr>
@@ -7885,7 +9611,7 @@
                 </a:tc>
                 <a:extLst>
                   <a:ext uri="{0D108BD9-81ED-4DB2-BD59-A6C34878D82A}">
-                    <a16:rowId xmlns="" xmlns:a16="http://schemas.microsoft.com/office/drawing/2014/main" val="1871567688"/>
+                    <a16:rowId xmlns:a16="http://schemas.microsoft.com/office/drawing/2014/main" val="1871567688"/>
                   </a:ext>
                 </a:extLst>
               </a:tr>
@@ -7896,7 +9622,7 @@
     </p:spTree>
     <p:extLst>
       <p:ext uri="{BB962C8B-B14F-4D97-AF65-F5344CB8AC3E}">
-        <p14:creationId xmlns:p14="http://schemas.microsoft.com/office/powerpoint/2010/main" xmlns="" val="3993429936"/>
+        <p14:creationId xmlns:p14="http://schemas.microsoft.com/office/powerpoint/2010/main" val="3993429936"/>
       </p:ext>
     </p:extLst>
   </p:cSld>
@@ -7928,7 +9654,7 @@
           <p:cNvPr id="2" name="Title 1">
             <a:extLst>
               <a:ext uri="{FF2B5EF4-FFF2-40B4-BE49-F238E27FC236}">
-                <a16:creationId xmlns="" xmlns:a16="http://schemas.microsoft.com/office/drawing/2014/main" id="{28C66FFE-A8EC-4EA3-BB83-4C0121472BFE}"/>
+                <a16:creationId xmlns:a16="http://schemas.microsoft.com/office/drawing/2014/main" id="{28C66FFE-A8EC-4EA3-BB83-4C0121472BFE}"/>
               </a:ext>
             </a:extLst>
           </p:cNvPr>
@@ -7945,7 +9671,7 @@
           <a:lstStyle/>
           <a:p>
             <a:r>
-              <a:rPr lang="en-US" dirty="0"/>
+              <a:rPr lang="en-US" b="1" dirty="0"/>
               <a:t>Conclusion</a:t>
             </a:r>
           </a:p>
@@ -7956,7 +9682,7 @@
           <p:cNvPr id="3" name="Content Placeholder 2">
             <a:extLst>
               <a:ext uri="{FF2B5EF4-FFF2-40B4-BE49-F238E27FC236}">
-                <a16:creationId xmlns="" xmlns:a16="http://schemas.microsoft.com/office/drawing/2014/main" id="{932917B2-9D44-4309-A682-EF57BF4CFDC1}"/>
+                <a16:creationId xmlns:a16="http://schemas.microsoft.com/office/drawing/2014/main" id="{932917B2-9D44-4309-A682-EF57BF4CFDC1}"/>
               </a:ext>
             </a:extLst>
           </p:cNvPr>
@@ -7975,92 +9701,34 @@
           <a:lstStyle/>
           <a:p>
             <a:r>
-              <a:rPr lang="en-US" dirty="0" smtClean="0"/>
-              <a:t>The </a:t>
-            </a:r>
-            <a:r>
-              <a:rPr lang="en-US" dirty="0" smtClean="0"/>
-              <a:t>feature-based </a:t>
-            </a:r>
-            <a:r>
-              <a:rPr lang="en-US" dirty="0" smtClean="0"/>
-              <a:t>method is applied </a:t>
-            </a:r>
-            <a:r>
-              <a:rPr lang="en-US" dirty="0" smtClean="0"/>
-              <a:t>to </a:t>
-            </a:r>
-            <a:r>
-              <a:rPr lang="en-US" dirty="0" smtClean="0"/>
-              <a:t>the new  practically important real-life </a:t>
-            </a:r>
-            <a:r>
-              <a:rPr lang="en-US" dirty="0" smtClean="0"/>
-              <a:t>image classification task. </a:t>
-            </a:r>
-            <a:endParaRPr lang="en-US" dirty="0" smtClean="0"/>
-          </a:p>
-          <a:p>
-            <a:r>
-              <a:rPr lang="en-US" dirty="0" smtClean="0"/>
-              <a:t>The </a:t>
-            </a:r>
-            <a:r>
-              <a:rPr lang="en-US" dirty="0" smtClean="0"/>
-              <a:t>constructed algorithm is implemented and evaluated on the real plant dataset containing images of 12 different types of </a:t>
-            </a:r>
-            <a:r>
-              <a:rPr lang="en-US" dirty="0" smtClean="0"/>
-              <a:t>seedlings: the features are selected and extracted by using </a:t>
-            </a:r>
-            <a:r>
-              <a:rPr lang="en-US" dirty="0" smtClean="0"/>
-              <a:t>computer vision algorithms. </a:t>
-            </a:r>
-            <a:endParaRPr lang="en-US" dirty="0" smtClean="0"/>
-          </a:p>
-          <a:p>
-            <a:r>
-              <a:rPr lang="en-US" dirty="0" smtClean="0"/>
-              <a:t>It follows from Table 3 that </a:t>
-            </a:r>
-            <a:r>
-              <a:rPr lang="en-US" dirty="0" smtClean="0"/>
-              <a:t>the best performance is reached with the Support Vector Machines </a:t>
-            </a:r>
-            <a:r>
-              <a:rPr lang="en-US" dirty="0" smtClean="0"/>
-              <a:t>algorithm whereas </a:t>
-            </a:r>
-            <a:r>
-              <a:rPr lang="en-US" dirty="0" smtClean="0"/>
-              <a:t>the K-Nearest Neighbors algorithm is slightly worse.</a:t>
-            </a:r>
-            <a:r>
-              <a:rPr lang="en-US" dirty="0" smtClean="0"/>
-              <a:t>  </a:t>
-            </a:r>
-          </a:p>
-          <a:p>
-            <a:r>
-              <a:rPr lang="en-US" dirty="0" smtClean="0"/>
-              <a:t>Future works aim </a:t>
-            </a:r>
-            <a:r>
-              <a:rPr lang="en-US" dirty="0" smtClean="0"/>
-              <a:t>at improving segmentation output and at the usage of other types of image features.</a:t>
-            </a:r>
-            <a:endParaRPr lang="ru-RU" dirty="0" smtClean="0"/>
-          </a:p>
-          <a:p>
-            <a:endParaRPr lang="en-US" dirty="0"/>
+              <a:rPr lang="en-US" dirty="0"/>
+              <a:t>The feature-based method is applied to the new  practically important real-life image classification task. </a:t>
+            </a:r>
+          </a:p>
+          <a:p>
+            <a:r>
+              <a:rPr lang="en-US" dirty="0"/>
+              <a:t>The constructed algorithm is implemented and evaluated on the real plant dataset containing images of 12 different types of seedlings: the features are selected and extracted by using computer vision algorithms. </a:t>
+            </a:r>
+          </a:p>
+          <a:p>
+            <a:r>
+              <a:rPr lang="en-US" dirty="0"/>
+              <a:t>It follows from Table 3 that the best performance is reached with the Support Vector Machines algorithm whereas the K-Nearest Neighbors algorithm is slightly worse.  </a:t>
+            </a:r>
+          </a:p>
+          <a:p>
+            <a:r>
+              <a:rPr lang="en-US" dirty="0"/>
+              <a:t>Future work is aimed at improving segmentation output, tuning methods and at the discovering of other types of image features.</a:t>
+            </a:r>
           </a:p>
         </p:txBody>
       </p:sp>
     </p:spTree>
     <p:extLst>
       <p:ext uri="{BB962C8B-B14F-4D97-AF65-F5344CB8AC3E}">
-        <p14:creationId xmlns:p14="http://schemas.microsoft.com/office/powerpoint/2010/main" xmlns="" val="641770364"/>
+        <p14:creationId xmlns:p14="http://schemas.microsoft.com/office/powerpoint/2010/main" val="641770364"/>
       </p:ext>
     </p:extLst>
   </p:cSld>
@@ -8092,7 +9760,7 @@
           <p:cNvPr id="2" name="Title 1">
             <a:extLst>
               <a:ext uri="{FF2B5EF4-FFF2-40B4-BE49-F238E27FC236}">
-                <a16:creationId xmlns="" xmlns:a16="http://schemas.microsoft.com/office/drawing/2014/main" id="{4674C270-4EB3-4A56-A039-706833423356}"/>
+                <a16:creationId xmlns:a16="http://schemas.microsoft.com/office/drawing/2014/main" id="{4674C270-4EB3-4A56-A039-706833423356}"/>
               </a:ext>
             </a:extLst>
           </p:cNvPr>
@@ -8121,7 +9789,7 @@
           <p:cNvPr id="4" name="Picture 3">
             <a:extLst>
               <a:ext uri="{FF2B5EF4-FFF2-40B4-BE49-F238E27FC236}">
-                <a16:creationId xmlns="" xmlns:a16="http://schemas.microsoft.com/office/drawing/2014/main" id="{F633F335-E72E-433D-A588-55DD46ECFD28}"/>
+                <a16:creationId xmlns:a16="http://schemas.microsoft.com/office/drawing/2014/main" id="{F633F335-E72E-433D-A588-55DD46ECFD28}"/>
               </a:ext>
             </a:extLst>
           </p:cNvPr>
@@ -8131,15 +9799,15 @@
           <p:nvPr/>
         </p:nvPicPr>
         <p:blipFill>
-          <a:blip r:embed="rId2"/>
+          <a:blip r:embed="rId3"/>
           <a:stretch>
             <a:fillRect/>
           </a:stretch>
         </p:blipFill>
         <p:spPr>
           <a:xfrm>
-            <a:off x="2649469" y="1425333"/>
-            <a:ext cx="6089497" cy="4844416"/>
+            <a:off x="2015613" y="1425332"/>
+            <a:ext cx="6723353" cy="5348671"/>
           </a:xfrm>
           <a:prstGeom prst="rect">
             <a:avLst/>
@@ -8149,7 +9817,7 @@
     </p:spTree>
     <p:extLst>
       <p:ext uri="{BB962C8B-B14F-4D97-AF65-F5344CB8AC3E}">
-        <p14:creationId xmlns:p14="http://schemas.microsoft.com/office/powerpoint/2010/main" xmlns="" val="2711873854"/>
+        <p14:creationId xmlns:p14="http://schemas.microsoft.com/office/powerpoint/2010/main" val="2711873854"/>
       </p:ext>
     </p:extLst>
   </p:cSld>
@@ -8181,7 +9849,7 @@
           <p:cNvPr id="2" name="Title 1">
             <a:extLst>
               <a:ext uri="{FF2B5EF4-FFF2-40B4-BE49-F238E27FC236}">
-                <a16:creationId xmlns="" xmlns:a16="http://schemas.microsoft.com/office/drawing/2014/main" id="{0DF95023-A5B0-4296-A016-CD04FCC23BB0}"/>
+                <a16:creationId xmlns:a16="http://schemas.microsoft.com/office/drawing/2014/main" id="{0DF95023-A5B0-4296-A016-CD04FCC23BB0}"/>
               </a:ext>
             </a:extLst>
           </p:cNvPr>
@@ -8209,7 +9877,7 @@
           <p:cNvPr id="3" name="Content Placeholder 2">
             <a:extLst>
               <a:ext uri="{FF2B5EF4-FFF2-40B4-BE49-F238E27FC236}">
-                <a16:creationId xmlns="" xmlns:a16="http://schemas.microsoft.com/office/drawing/2014/main" id="{A75511B4-9504-4927-916C-41C771E33C51}"/>
+                <a16:creationId xmlns:a16="http://schemas.microsoft.com/office/drawing/2014/main" id="{A75511B4-9504-4927-916C-41C771E33C51}"/>
               </a:ext>
             </a:extLst>
           </p:cNvPr>
@@ -8250,21 +9918,9 @@
           <a:p>
             <a:r>
               <a:rPr lang="en-US" dirty="0"/>
-              <a:t>Resolutions vary </a:t>
-            </a:r>
-            <a:r>
-              <a:rPr lang="en-US" dirty="0" smtClean="0"/>
-              <a:t>from 50x50px </a:t>
-            </a:r>
-            <a:r>
-              <a:rPr lang="en-US" dirty="0"/>
-              <a:t>to </a:t>
-            </a:r>
-            <a:r>
-              <a:rPr lang="en-US" dirty="0" smtClean="0"/>
-              <a:t>2000x2000px</a:t>
-            </a:r>
-            <a:endParaRPr lang="ru-RU" dirty="0" smtClean="0"/>
+              <a:t>Resolutions vary from 50x50px to 2000x2000px</a:t>
+            </a:r>
+            <a:endParaRPr lang="ru-RU" dirty="0"/>
           </a:p>
           <a:p>
             <a:endParaRPr lang="en-US" dirty="0"/>
@@ -8302,7 +9958,7 @@
     </p:spTree>
     <p:extLst>
       <p:ext uri="{BB962C8B-B14F-4D97-AF65-F5344CB8AC3E}">
-        <p14:creationId xmlns:p14="http://schemas.microsoft.com/office/powerpoint/2010/main" xmlns="" val="3988760464"/>
+        <p14:creationId xmlns:p14="http://schemas.microsoft.com/office/powerpoint/2010/main" val="3988760464"/>
       </p:ext>
     </p:extLst>
   </p:cSld>
@@ -8334,7 +9990,7 @@
           <p:cNvPr id="2" name="Title 1">
             <a:extLst>
               <a:ext uri="{FF2B5EF4-FFF2-40B4-BE49-F238E27FC236}">
-                <a16:creationId xmlns="" xmlns:a16="http://schemas.microsoft.com/office/drawing/2014/main" id="{240412D5-708D-4601-9A7A-B089F93CAB9D}"/>
+                <a16:creationId xmlns:a16="http://schemas.microsoft.com/office/drawing/2014/main" id="{240412D5-708D-4601-9A7A-B089F93CAB9D}"/>
               </a:ext>
             </a:extLst>
           </p:cNvPr>
@@ -8362,7 +10018,7 @@
           <p:cNvPr id="1026" name="Picture 5">
             <a:extLst>
               <a:ext uri="{FF2B5EF4-FFF2-40B4-BE49-F238E27FC236}">
-                <a16:creationId xmlns="" xmlns:a16="http://schemas.microsoft.com/office/drawing/2014/main" id="{4AB5D89D-D842-4C1E-9FBB-91265A88B59A}"/>
+                <a16:creationId xmlns:a16="http://schemas.microsoft.com/office/drawing/2014/main" id="{4AB5D89D-D842-4C1E-9FBB-91265A88B59A}"/>
               </a:ext>
             </a:extLst>
           </p:cNvPr>
@@ -8372,10 +10028,10 @@
           <p:nvPr/>
         </p:nvPicPr>
         <p:blipFill>
-          <a:blip r:embed="rId2">
+          <a:blip r:embed="rId3">
             <a:extLst>
               <a:ext uri="{28A0092B-C50C-407E-A947-70E740481C1C}">
-                <a14:useLocalDpi xmlns:a14="http://schemas.microsoft.com/office/drawing/2010/main" xmlns="" val="0"/>
+                <a14:useLocalDpi xmlns:a14="http://schemas.microsoft.com/office/drawing/2010/main" val="0"/>
               </a:ext>
             </a:extLst>
           </a:blip>
@@ -8398,14 +10054,14 @@
           </a:ln>
           <a:extLst>
             <a:ext uri="{909E8E84-426E-40DD-AFC4-6F175D3DCCD1}">
-              <a14:hiddenFill xmlns:a14="http://schemas.microsoft.com/office/drawing/2010/main" xmlns="">
+              <a14:hiddenFill xmlns:a14="http://schemas.microsoft.com/office/drawing/2010/main">
                 <a:solidFill>
                   <a:srgbClr val="FFFFFF"/>
                 </a:solidFill>
               </a14:hiddenFill>
             </a:ext>
             <a:ext uri="{91240B29-F687-4F45-9708-019B960494DF}">
-              <a14:hiddenLine xmlns:a14="http://schemas.microsoft.com/office/drawing/2010/main" xmlns="" w="9525">
+              <a14:hiddenLine xmlns:a14="http://schemas.microsoft.com/office/drawing/2010/main" w="9525">
                 <a:solidFill>
                   <a:srgbClr val="000000"/>
                 </a:solidFill>
@@ -8420,7 +10076,7 @@
     </p:spTree>
     <p:extLst>
       <p:ext uri="{BB962C8B-B14F-4D97-AF65-F5344CB8AC3E}">
-        <p14:creationId xmlns:p14="http://schemas.microsoft.com/office/powerpoint/2010/main" xmlns="" val="289463096"/>
+        <p14:creationId xmlns:p14="http://schemas.microsoft.com/office/powerpoint/2010/main" val="289463096"/>
       </p:ext>
     </p:extLst>
   </p:cSld>
@@ -8452,7 +10108,7 @@
           <p:cNvPr id="2" name="Title 1">
             <a:extLst>
               <a:ext uri="{FF2B5EF4-FFF2-40B4-BE49-F238E27FC236}">
-                <a16:creationId xmlns="" xmlns:a16="http://schemas.microsoft.com/office/drawing/2014/main" id="{6751B0A7-A918-42B4-9391-D0BA47887F82}"/>
+                <a16:creationId xmlns:a16="http://schemas.microsoft.com/office/drawing/2014/main" id="{6751B0A7-A918-42B4-9391-D0BA47887F82}"/>
               </a:ext>
             </a:extLst>
           </p:cNvPr>
@@ -8480,7 +10136,7 @@
           <p:cNvPr id="4" name="Picture 3">
             <a:extLst>
               <a:ext uri="{FF2B5EF4-FFF2-40B4-BE49-F238E27FC236}">
-                <a16:creationId xmlns="" xmlns:a16="http://schemas.microsoft.com/office/drawing/2014/main" id="{6DEB7C80-B314-41A7-8426-87539BA42C91}"/>
+                <a16:creationId xmlns:a16="http://schemas.microsoft.com/office/drawing/2014/main" id="{6DEB7C80-B314-41A7-8426-87539BA42C91}"/>
               </a:ext>
             </a:extLst>
           </p:cNvPr>
@@ -8488,10 +10144,10 @@
           <p:nvPr/>
         </p:nvPicPr>
         <p:blipFill>
-          <a:blip r:embed="rId2" cstate="print">
+          <a:blip r:embed="rId3" cstate="print">
             <a:extLst>
               <a:ext uri="{28A0092B-C50C-407E-A947-70E740481C1C}">
-                <a14:useLocalDpi xmlns:a14="http://schemas.microsoft.com/office/drawing/2010/main" xmlns="" val="0"/>
+                <a14:useLocalDpi xmlns:a14="http://schemas.microsoft.com/office/drawing/2010/main" val="0"/>
               </a:ext>
             </a:extLst>
           </a:blip>
@@ -8517,7 +10173,7 @@
     </p:spTree>
     <p:extLst>
       <p:ext uri="{BB962C8B-B14F-4D97-AF65-F5344CB8AC3E}">
-        <p14:creationId xmlns:p14="http://schemas.microsoft.com/office/powerpoint/2010/main" xmlns="" val="1240864855"/>
+        <p14:creationId xmlns:p14="http://schemas.microsoft.com/office/powerpoint/2010/main" val="1240864855"/>
       </p:ext>
     </p:extLst>
   </p:cSld>
@@ -8549,7 +10205,7 @@
           <p:cNvPr id="2" name="Title 1">
             <a:extLst>
               <a:ext uri="{FF2B5EF4-FFF2-40B4-BE49-F238E27FC236}">
-                <a16:creationId xmlns="" xmlns:a16="http://schemas.microsoft.com/office/drawing/2014/main" id="{8AD17CEE-9884-4B83-8669-41D248BF4EAC}"/>
+                <a16:creationId xmlns:a16="http://schemas.microsoft.com/office/drawing/2014/main" id="{8AD17CEE-9884-4B83-8669-41D248BF4EAC}"/>
               </a:ext>
             </a:extLst>
           </p:cNvPr>
@@ -8578,7 +10234,7 @@
           <p:cNvPr id="4" name="Picture 3">
             <a:extLst>
               <a:ext uri="{FF2B5EF4-FFF2-40B4-BE49-F238E27FC236}">
-                <a16:creationId xmlns="" xmlns:a16="http://schemas.microsoft.com/office/drawing/2014/main" id="{D069C22B-EB37-4DB9-A628-A450654215C3}"/>
+                <a16:creationId xmlns:a16="http://schemas.microsoft.com/office/drawing/2014/main" id="{D069C22B-EB37-4DB9-A628-A450654215C3}"/>
               </a:ext>
             </a:extLst>
           </p:cNvPr>
@@ -8586,10 +10242,10 @@
           <p:nvPr/>
         </p:nvPicPr>
         <p:blipFill>
-          <a:blip r:embed="rId2" cstate="print">
+          <a:blip r:embed="rId3" cstate="print">
             <a:extLst>
               <a:ext uri="{28A0092B-C50C-407E-A947-70E740481C1C}">
-                <a14:useLocalDpi xmlns:a14="http://schemas.microsoft.com/office/drawing/2010/main" xmlns="" val="0"/>
+                <a14:useLocalDpi xmlns:a14="http://schemas.microsoft.com/office/drawing/2010/main" val="0"/>
               </a:ext>
             </a:extLst>
           </a:blip>
@@ -8600,7 +10256,7 @@
         </p:blipFill>
         <p:spPr bwMode="auto">
           <a:xfrm>
-            <a:off x="1136073" y="1690688"/>
+            <a:off x="1155737" y="1690688"/>
             <a:ext cx="9448799" cy="4723967"/>
           </a:xfrm>
           <a:prstGeom prst="rect">
@@ -8612,10 +10268,114 @@
           </a:ln>
         </p:spPr>
       </p:pic>
+      <p:sp>
+        <p:nvSpPr>
+          <p:cNvPr id="3" name="Oval 2">
+            <a:extLst>
+              <a:ext uri="{FF2B5EF4-FFF2-40B4-BE49-F238E27FC236}">
+                <a16:creationId xmlns:a16="http://schemas.microsoft.com/office/drawing/2014/main" id="{F3082474-1D85-4A2C-83C9-B405E48AB791}"/>
+              </a:ext>
+            </a:extLst>
+          </p:cNvPr>
+          <p:cNvSpPr/>
+          <p:nvPr/>
+        </p:nvSpPr>
+        <p:spPr>
+          <a:xfrm>
+            <a:off x="2605547" y="3716593"/>
+            <a:ext cx="1101213" cy="973393"/>
+          </a:xfrm>
+          <a:prstGeom prst="ellipse">
+            <a:avLst/>
+          </a:prstGeom>
+          <a:noFill/>
+          <a:ln w="57150">
+            <a:solidFill>
+              <a:srgbClr val="FF0000"/>
+            </a:solidFill>
+          </a:ln>
+        </p:spPr>
+        <p:style>
+          <a:lnRef idx="2">
+            <a:schemeClr val="accent1">
+              <a:shade val="50000"/>
+            </a:schemeClr>
+          </a:lnRef>
+          <a:fillRef idx="1">
+            <a:schemeClr val="accent1"/>
+          </a:fillRef>
+          <a:effectRef idx="0">
+            <a:schemeClr val="accent1"/>
+          </a:effectRef>
+          <a:fontRef idx="minor">
+            <a:schemeClr val="lt1"/>
+          </a:fontRef>
+        </p:style>
+        <p:txBody>
+          <a:bodyPr rtlCol="0" anchor="ctr"/>
+          <a:lstStyle/>
+          <a:p>
+            <a:pPr algn="ctr"/>
+            <a:endParaRPr lang="en-US"/>
+          </a:p>
+        </p:txBody>
+      </p:sp>
+      <p:sp>
+        <p:nvSpPr>
+          <p:cNvPr id="5" name="Oval 4">
+            <a:extLst>
+              <a:ext uri="{FF2B5EF4-FFF2-40B4-BE49-F238E27FC236}">
+                <a16:creationId xmlns:a16="http://schemas.microsoft.com/office/drawing/2014/main" id="{376D87A0-E68F-46BC-AEF8-49098BD2EEEB}"/>
+              </a:ext>
+            </a:extLst>
+          </p:cNvPr>
+          <p:cNvSpPr/>
+          <p:nvPr/>
+        </p:nvSpPr>
+        <p:spPr>
+          <a:xfrm>
+            <a:off x="7683908" y="3716593"/>
+            <a:ext cx="1101213" cy="973393"/>
+          </a:xfrm>
+          <a:prstGeom prst="ellipse">
+            <a:avLst/>
+          </a:prstGeom>
+          <a:noFill/>
+          <a:ln w="57150">
+            <a:solidFill>
+              <a:srgbClr val="FF0000"/>
+            </a:solidFill>
+          </a:ln>
+        </p:spPr>
+        <p:style>
+          <a:lnRef idx="2">
+            <a:schemeClr val="accent1">
+              <a:shade val="50000"/>
+            </a:schemeClr>
+          </a:lnRef>
+          <a:fillRef idx="1">
+            <a:schemeClr val="accent1"/>
+          </a:fillRef>
+          <a:effectRef idx="0">
+            <a:schemeClr val="accent1"/>
+          </a:effectRef>
+          <a:fontRef idx="minor">
+            <a:schemeClr val="lt1"/>
+          </a:fontRef>
+        </p:style>
+        <p:txBody>
+          <a:bodyPr rtlCol="0" anchor="ctr"/>
+          <a:lstStyle/>
+          <a:p>
+            <a:pPr algn="ctr"/>
+            <a:endParaRPr lang="en-US"/>
+          </a:p>
+        </p:txBody>
+      </p:sp>
     </p:spTree>
     <p:extLst>
       <p:ext uri="{BB962C8B-B14F-4D97-AF65-F5344CB8AC3E}">
-        <p14:creationId xmlns:p14="http://schemas.microsoft.com/office/powerpoint/2010/main" xmlns="" val="2482352883"/>
+        <p14:creationId xmlns:p14="http://schemas.microsoft.com/office/powerpoint/2010/main" val="2482352883"/>
       </p:ext>
     </p:extLst>
   </p:cSld>
@@ -8647,7 +10407,7 @@
           <p:cNvPr id="2" name="Title 1">
             <a:extLst>
               <a:ext uri="{FF2B5EF4-FFF2-40B4-BE49-F238E27FC236}">
-                <a16:creationId xmlns="" xmlns:a16="http://schemas.microsoft.com/office/drawing/2014/main" id="{B3367AE1-693E-49F4-BC77-3B2A9CF898DA}"/>
+                <a16:creationId xmlns:a16="http://schemas.microsoft.com/office/drawing/2014/main" id="{B3367AE1-693E-49F4-BC77-3B2A9CF898DA}"/>
               </a:ext>
             </a:extLst>
           </p:cNvPr>
@@ -8675,7 +10435,7 @@
           <p:cNvPr id="8" name="Picture 7">
             <a:extLst>
               <a:ext uri="{FF2B5EF4-FFF2-40B4-BE49-F238E27FC236}">
-                <a16:creationId xmlns="" xmlns:a16="http://schemas.microsoft.com/office/drawing/2014/main" id="{A9DEC665-C8F2-447B-B3C8-8D5FB5662C3E}"/>
+                <a16:creationId xmlns:a16="http://schemas.microsoft.com/office/drawing/2014/main" id="{A9DEC665-C8F2-447B-B3C8-8D5FB5662C3E}"/>
               </a:ext>
             </a:extLst>
           </p:cNvPr>
@@ -8683,10 +10443,10 @@
           <p:nvPr/>
         </p:nvPicPr>
         <p:blipFill>
-          <a:blip r:embed="rId2" cstate="print">
+          <a:blip r:embed="rId3" cstate="print">
             <a:extLst>
               <a:ext uri="{28A0092B-C50C-407E-A947-70E740481C1C}">
-                <a14:useLocalDpi xmlns:a14="http://schemas.microsoft.com/office/drawing/2010/main" xmlns="" val="0"/>
+                <a14:useLocalDpi xmlns:a14="http://schemas.microsoft.com/office/drawing/2010/main" val="0"/>
               </a:ext>
             </a:extLst>
           </a:blip>
@@ -8712,7 +10472,7 @@
     </p:spTree>
     <p:extLst>
       <p:ext uri="{BB962C8B-B14F-4D97-AF65-F5344CB8AC3E}">
-        <p14:creationId xmlns:p14="http://schemas.microsoft.com/office/powerpoint/2010/main" xmlns="" val="4027803207"/>
+        <p14:creationId xmlns:p14="http://schemas.microsoft.com/office/powerpoint/2010/main" val="4027803207"/>
       </p:ext>
     </p:extLst>
   </p:cSld>
@@ -8744,7 +10504,7 @@
           <p:cNvPr id="2" name="Title 1">
             <a:extLst>
               <a:ext uri="{FF2B5EF4-FFF2-40B4-BE49-F238E27FC236}">
-                <a16:creationId xmlns="" xmlns:a16="http://schemas.microsoft.com/office/drawing/2014/main" id="{A3591ABB-D2B4-4DCB-BF82-B6E4374061F5}"/>
+                <a16:creationId xmlns:a16="http://schemas.microsoft.com/office/drawing/2014/main" id="{A3591ABB-D2B4-4DCB-BF82-B6E4374061F5}"/>
               </a:ext>
             </a:extLst>
           </p:cNvPr>
@@ -8772,7 +10532,7 @@
           <p:cNvPr id="4" name="Content Placeholder 2">
             <a:extLst>
               <a:ext uri="{FF2B5EF4-FFF2-40B4-BE49-F238E27FC236}">
-                <a16:creationId xmlns="" xmlns:a16="http://schemas.microsoft.com/office/drawing/2014/main" id="{76829438-1011-4950-86BE-6A8D5C2D23F1}"/>
+                <a16:creationId xmlns:a16="http://schemas.microsoft.com/office/drawing/2014/main" id="{76829438-1011-4950-86BE-6A8D5C2D23F1}"/>
               </a:ext>
             </a:extLst>
           </p:cNvPr>
@@ -8785,12 +10545,14 @@
         </p:nvSpPr>
         <p:spPr>
           <a:xfrm>
-            <a:off x="838200" y="1825625"/>
+            <a:off x="920085" y="1447672"/>
             <a:ext cx="10515600" cy="4351338"/>
           </a:xfrm>
         </p:spPr>
         <p:txBody>
-          <a:bodyPr/>
+          <a:bodyPr>
+            <a:normAutofit/>
+          </a:bodyPr>
           <a:lstStyle/>
           <a:p>
             <a:r>
@@ -8812,16 +10574,29 @@
           </a:p>
           <a:p>
             <a:r>
-              <a:rPr lang="en-US" dirty="0" smtClean="0"/>
+              <a:rPr lang="en-US" dirty="0"/>
+              <a:t>Isoperimetric quotient</a:t>
+            </a:r>
+            <a:endParaRPr lang="ru-RU" dirty="0"/>
+          </a:p>
+          <a:p>
+            <a:r>
+              <a:rPr lang="en-US" dirty="0"/>
               <a:t>Rectangularity</a:t>
             </a:r>
+            <a:endParaRPr lang="ru-RU" dirty="0"/>
+          </a:p>
+          <a:p>
+            <a:endParaRPr lang="ru-RU" dirty="0"/>
+          </a:p>
+          <a:p>
+            <a:endParaRPr lang="ru-RU" dirty="0"/>
+          </a:p>
+          <a:p>
+            <a:endParaRPr lang="ru-RU" dirty="0"/>
+          </a:p>
+          <a:p>
             <a:endParaRPr lang="en-US" dirty="0"/>
-          </a:p>
-          <a:p>
-            <a:r>
-              <a:rPr lang="en-US" dirty="0"/>
-              <a:t>Circularity</a:t>
-            </a:r>
           </a:p>
           <a:p>
             <a:pPr marL="0" indent="0">
@@ -8831,10 +10606,149 @@
           </a:p>
         </p:txBody>
       </p:sp>
+      <p:pic>
+        <p:nvPicPr>
+          <p:cNvPr id="1026" name="Picture 2">
+            <a:extLst>
+              <a:ext uri="{FF2B5EF4-FFF2-40B4-BE49-F238E27FC236}">
+                <a16:creationId xmlns:a16="http://schemas.microsoft.com/office/drawing/2014/main" id="{565C42AA-EACF-4F36-8C47-CEDDF9F2BF7D}"/>
+              </a:ext>
+            </a:extLst>
+          </p:cNvPr>
+          <p:cNvPicPr>
+            <a:picLocks noChangeAspect="1" noChangeArrowheads="1"/>
+          </p:cNvPicPr>
+          <p:nvPr/>
+        </p:nvPicPr>
+        <p:blipFill>
+          <a:blip r:embed="rId3">
+            <a:extLst>
+              <a:ext uri="{28A0092B-C50C-407E-A947-70E740481C1C}">
+                <a14:useLocalDpi xmlns:a14="http://schemas.microsoft.com/office/drawing/2010/main" val="0"/>
+              </a:ext>
+            </a:extLst>
+          </a:blip>
+          <a:srcRect/>
+          <a:stretch>
+            <a:fillRect/>
+          </a:stretch>
+        </p:blipFill>
+        <p:spPr bwMode="auto">
+          <a:xfrm>
+            <a:off x="4331876" y="4092575"/>
+            <a:ext cx="2486025" cy="2400300"/>
+          </a:xfrm>
+          <a:prstGeom prst="rect">
+            <a:avLst/>
+          </a:prstGeom>
+          <a:noFill/>
+          <a:extLst>
+            <a:ext uri="{909E8E84-426E-40DD-AFC4-6F175D3DCCD1}">
+              <a14:hiddenFill xmlns:a14="http://schemas.microsoft.com/office/drawing/2010/main">
+                <a:solidFill>
+                  <a:srgbClr val="FFFFFF"/>
+                </a:solidFill>
+              </a14:hiddenFill>
+            </a:ext>
+          </a:extLst>
+        </p:spPr>
+      </p:pic>
+      <p:pic>
+        <p:nvPicPr>
+          <p:cNvPr id="1028" name="Picture 4">
+            <a:extLst>
+              <a:ext uri="{FF2B5EF4-FFF2-40B4-BE49-F238E27FC236}">
+                <a16:creationId xmlns:a16="http://schemas.microsoft.com/office/drawing/2014/main" id="{A3654E21-A0DB-4923-B73F-D90ACA490888}"/>
+              </a:ext>
+            </a:extLst>
+          </p:cNvPr>
+          <p:cNvPicPr>
+            <a:picLocks noChangeAspect="1" noChangeArrowheads="1"/>
+          </p:cNvPicPr>
+          <p:nvPr/>
+        </p:nvPicPr>
+        <p:blipFill>
+          <a:blip r:embed="rId4">
+            <a:extLst>
+              <a:ext uri="{28A0092B-C50C-407E-A947-70E740481C1C}">
+                <a14:useLocalDpi xmlns:a14="http://schemas.microsoft.com/office/drawing/2010/main" val="0"/>
+              </a:ext>
+            </a:extLst>
+          </a:blip>
+          <a:srcRect/>
+          <a:stretch>
+            <a:fillRect/>
+          </a:stretch>
+        </p:blipFill>
+        <p:spPr bwMode="auto">
+          <a:xfrm>
+            <a:off x="920085" y="4092575"/>
+            <a:ext cx="2486025" cy="2400300"/>
+          </a:xfrm>
+          <a:prstGeom prst="rect">
+            <a:avLst/>
+          </a:prstGeom>
+          <a:noFill/>
+          <a:extLst>
+            <a:ext uri="{909E8E84-426E-40DD-AFC4-6F175D3DCCD1}">
+              <a14:hiddenFill xmlns:a14="http://schemas.microsoft.com/office/drawing/2010/main">
+                <a:solidFill>
+                  <a:srgbClr val="FFFFFF"/>
+                </a:solidFill>
+              </a14:hiddenFill>
+            </a:ext>
+          </a:extLst>
+        </p:spPr>
+      </p:pic>
+      <p:sp>
+        <p:nvSpPr>
+          <p:cNvPr id="3" name="Arrow: Right 2">
+            <a:extLst>
+              <a:ext uri="{FF2B5EF4-FFF2-40B4-BE49-F238E27FC236}">
+                <a16:creationId xmlns:a16="http://schemas.microsoft.com/office/drawing/2014/main" id="{96D9127D-8B11-4B74-8E51-C503BB2BF0E1}"/>
+              </a:ext>
+            </a:extLst>
+          </p:cNvPr>
+          <p:cNvSpPr/>
+          <p:nvPr/>
+        </p:nvSpPr>
+        <p:spPr>
+          <a:xfrm>
+            <a:off x="3569110" y="5062281"/>
+            <a:ext cx="609600" cy="442452"/>
+          </a:xfrm>
+          <a:prstGeom prst="rightArrow">
+            <a:avLst/>
+          </a:prstGeom>
+          <a:ln w="38100"/>
+        </p:spPr>
+        <p:style>
+          <a:lnRef idx="2">
+            <a:schemeClr val="dk1"/>
+          </a:lnRef>
+          <a:fillRef idx="1">
+            <a:schemeClr val="lt1"/>
+          </a:fillRef>
+          <a:effectRef idx="0">
+            <a:schemeClr val="dk1"/>
+          </a:effectRef>
+          <a:fontRef idx="minor">
+            <a:schemeClr val="dk1"/>
+          </a:fontRef>
+        </p:style>
+        <p:txBody>
+          <a:bodyPr rtlCol="0" anchor="ctr"/>
+          <a:lstStyle/>
+          <a:p>
+            <a:pPr algn="ctr"/>
+            <a:endParaRPr lang="en-US"/>
+          </a:p>
+        </p:txBody>
+      </p:sp>
     </p:spTree>
     <p:extLst>
       <p:ext uri="{BB962C8B-B14F-4D97-AF65-F5344CB8AC3E}">
-        <p14:creationId xmlns:p14="http://schemas.microsoft.com/office/powerpoint/2010/main" xmlns="" val="3524118719"/>
+        <p14:creationId xmlns:p14="http://schemas.microsoft.com/office/powerpoint/2010/main" val="3524118719"/>
       </p:ext>
     </p:extLst>
   </p:cSld>
@@ -8866,7 +10780,7 @@
           <p:cNvPr id="2" name="Title 1">
             <a:extLst>
               <a:ext uri="{FF2B5EF4-FFF2-40B4-BE49-F238E27FC236}">
-                <a16:creationId xmlns="" xmlns:a16="http://schemas.microsoft.com/office/drawing/2014/main" id="{CCC38707-2573-4AE3-90AE-961D4C37378D}"/>
+                <a16:creationId xmlns:a16="http://schemas.microsoft.com/office/drawing/2014/main" id="{CCC38707-2573-4AE3-90AE-961D4C37378D}"/>
               </a:ext>
             </a:extLst>
           </p:cNvPr>
@@ -8883,8 +10797,12 @@
           <a:lstStyle/>
           <a:p>
             <a:r>
+              <a:rPr lang="en-US" b="1" dirty="0"/>
+              <a:t>Feature correlation matrix </a:t>
+            </a:r>
+            <a:r>
               <a:rPr lang="en-US" dirty="0"/>
-              <a:t>Feature correlation matrix ?</a:t>
+              <a:t>?</a:t>
             </a:r>
           </a:p>
         </p:txBody>
@@ -8894,7 +10812,7 @@
           <p:cNvPr id="4" name="Picture 3">
             <a:extLst>
               <a:ext uri="{FF2B5EF4-FFF2-40B4-BE49-F238E27FC236}">
-                <a16:creationId xmlns="" xmlns:a16="http://schemas.microsoft.com/office/drawing/2014/main" id="{8E7140DD-614E-4DDB-AC12-C0D6F6007E40}"/>
+                <a16:creationId xmlns:a16="http://schemas.microsoft.com/office/drawing/2014/main" id="{8E7140DD-614E-4DDB-AC12-C0D6F6007E40}"/>
               </a:ext>
             </a:extLst>
           </p:cNvPr>
@@ -8902,7 +10820,7 @@
           <p:nvPr/>
         </p:nvPicPr>
         <p:blipFill>
-          <a:blip r:embed="rId2"/>
+          <a:blip r:embed="rId3"/>
           <a:stretch>
             <a:fillRect/>
           </a:stretch>
@@ -8920,7 +10838,7 @@
     </p:spTree>
     <p:extLst>
       <p:ext uri="{BB962C8B-B14F-4D97-AF65-F5344CB8AC3E}">
-        <p14:creationId xmlns:p14="http://schemas.microsoft.com/office/powerpoint/2010/main" xmlns="" val="2872247765"/>
+        <p14:creationId xmlns:p14="http://schemas.microsoft.com/office/powerpoint/2010/main" val="2872247765"/>
       </p:ext>
     </p:extLst>
   </p:cSld>
@@ -9219,7 +11137,302 @@
   <a:extraClrSchemeLst/>
   <a:extLst>
     <a:ext uri="{05A4C25C-085E-4340-85A3-A5531E510DB2}">
-      <thm15:themeFamily xmlns:thm15="http://schemas.microsoft.com/office/thememl/2012/main" xmlns="" name="Office Theme" id="{62F939B6-93AF-4DB8-9C6B-D6C7DFDC589F}" vid="{4A3C46E8-61CC-4603-A589-7422A47A8E4A}"/>
+      <thm15:themeFamily xmlns:thm15="http://schemas.microsoft.com/office/thememl/2012/main" name="Office Theme" id="{62F939B6-93AF-4DB8-9C6B-D6C7DFDC589F}" vid="{4A3C46E8-61CC-4603-A589-7422A47A8E4A}"/>
+    </a:ext>
+  </a:extLst>
+</a:theme>
+</file>
+
+<file path=ppt/theme/theme2.xml><?xml version="1.0" encoding="utf-8"?>
+<a:theme xmlns:a="http://schemas.openxmlformats.org/drawingml/2006/main" name="Office Theme">
+  <a:themeElements>
+    <a:clrScheme name="Office">
+      <a:dk1>
+        <a:sysClr val="windowText" lastClr="000000"/>
+      </a:dk1>
+      <a:lt1>
+        <a:sysClr val="window" lastClr="FFFFFF"/>
+      </a:lt1>
+      <a:dk2>
+        <a:srgbClr val="44546A"/>
+      </a:dk2>
+      <a:lt2>
+        <a:srgbClr val="E7E6E6"/>
+      </a:lt2>
+      <a:accent1>
+        <a:srgbClr val="4472C4"/>
+      </a:accent1>
+      <a:accent2>
+        <a:srgbClr val="ED7D31"/>
+      </a:accent2>
+      <a:accent3>
+        <a:srgbClr val="A5A5A5"/>
+      </a:accent3>
+      <a:accent4>
+        <a:srgbClr val="FFC000"/>
+      </a:accent4>
+      <a:accent5>
+        <a:srgbClr val="5B9BD5"/>
+      </a:accent5>
+      <a:accent6>
+        <a:srgbClr val="70AD47"/>
+      </a:accent6>
+      <a:hlink>
+        <a:srgbClr val="0563C1"/>
+      </a:hlink>
+      <a:folHlink>
+        <a:srgbClr val="954F72"/>
+      </a:folHlink>
+    </a:clrScheme>
+    <a:fontScheme name="Office">
+      <a:majorFont>
+        <a:latin typeface="Calibri Light" panose="020F0302020204030204"/>
+        <a:ea typeface=""/>
+        <a:cs typeface=""/>
+        <a:font script="Jpan" typeface="游ゴシック Light"/>
+        <a:font script="Hang" typeface="맑은 고딕"/>
+        <a:font script="Hans" typeface="等线 Light"/>
+        <a:font script="Hant" typeface="新細明體"/>
+        <a:font script="Arab" typeface="Times New Roman"/>
+        <a:font script="Hebr" typeface="Times New Roman"/>
+        <a:font script="Thai" typeface="Angsana New"/>
+        <a:font script="Ethi" typeface="Nyala"/>
+        <a:font script="Beng" typeface="Vrinda"/>
+        <a:font script="Gujr" typeface="Shruti"/>
+        <a:font script="Khmr" typeface="MoolBoran"/>
+        <a:font script="Knda" typeface="Tunga"/>
+        <a:font script="Guru" typeface="Raavi"/>
+        <a:font script="Cans" typeface="Euphemia"/>
+        <a:font script="Cher" typeface="Plantagenet Cherokee"/>
+        <a:font script="Yiii" typeface="Microsoft Yi Baiti"/>
+        <a:font script="Tibt" typeface="Microsoft Himalaya"/>
+        <a:font script="Thaa" typeface="MV Boli"/>
+        <a:font script="Deva" typeface="Mangal"/>
+        <a:font script="Telu" typeface="Gautami"/>
+        <a:font script="Taml" typeface="Latha"/>
+        <a:font script="Syrc" typeface="Estrangelo Edessa"/>
+        <a:font script="Orya" typeface="Kalinga"/>
+        <a:font script="Mlym" typeface="Kartika"/>
+        <a:font script="Laoo" typeface="DokChampa"/>
+        <a:font script="Sinh" typeface="Iskoola Pota"/>
+        <a:font script="Mong" typeface="Mongolian Baiti"/>
+        <a:font script="Viet" typeface="Times New Roman"/>
+        <a:font script="Uigh" typeface="Microsoft Uighur"/>
+        <a:font script="Geor" typeface="Sylfaen"/>
+        <a:font script="Armn" typeface="Arial"/>
+        <a:font script="Bugi" typeface="Leelawadee UI"/>
+        <a:font script="Bopo" typeface="Microsoft JhengHei"/>
+        <a:font script="Java" typeface="Javanese Text"/>
+        <a:font script="Lisu" typeface="Segoe UI"/>
+        <a:font script="Mymr" typeface="Myanmar Text"/>
+        <a:font script="Nkoo" typeface="Ebrima"/>
+        <a:font script="Olck" typeface="Nirmala UI"/>
+        <a:font script="Osma" typeface="Ebrima"/>
+        <a:font script="Phag" typeface="Phagspa"/>
+        <a:font script="Syrn" typeface="Estrangelo Edessa"/>
+        <a:font script="Syrj" typeface="Estrangelo Edessa"/>
+        <a:font script="Syre" typeface="Estrangelo Edessa"/>
+        <a:font script="Sora" typeface="Nirmala UI"/>
+        <a:font script="Tale" typeface="Microsoft Tai Le"/>
+        <a:font script="Talu" typeface="Microsoft New Tai Lue"/>
+        <a:font script="Tfng" typeface="Ebrima"/>
+      </a:majorFont>
+      <a:minorFont>
+        <a:latin typeface="Calibri" panose="020F0502020204030204"/>
+        <a:ea typeface=""/>
+        <a:cs typeface=""/>
+        <a:font script="Jpan" typeface="游ゴシック"/>
+        <a:font script="Hang" typeface="맑은 고딕"/>
+        <a:font script="Hans" typeface="等线"/>
+        <a:font script="Hant" typeface="新細明體"/>
+        <a:font script="Arab" typeface="Arial"/>
+        <a:font script="Hebr" typeface="Arial"/>
+        <a:font script="Thai" typeface="Cordia New"/>
+        <a:font script="Ethi" typeface="Nyala"/>
+        <a:font script="Beng" typeface="Vrinda"/>
+        <a:font script="Gujr" typeface="Shruti"/>
+        <a:font script="Khmr" typeface="DaunPenh"/>
+        <a:font script="Knda" typeface="Tunga"/>
+        <a:font script="Guru" typeface="Raavi"/>
+        <a:font script="Cans" typeface="Euphemia"/>
+        <a:font script="Cher" typeface="Plantagenet Cherokee"/>
+        <a:font script="Yiii" typeface="Microsoft Yi Baiti"/>
+        <a:font script="Tibt" typeface="Microsoft Himalaya"/>
+        <a:font script="Thaa" typeface="MV Boli"/>
+        <a:font script="Deva" typeface="Mangal"/>
+        <a:font script="Telu" typeface="Gautami"/>
+        <a:font script="Taml" typeface="Latha"/>
+        <a:font script="Syrc" typeface="Estrangelo Edessa"/>
+        <a:font script="Orya" typeface="Kalinga"/>
+        <a:font script="Mlym" typeface="Kartika"/>
+        <a:font script="Laoo" typeface="DokChampa"/>
+        <a:font script="Sinh" typeface="Iskoola Pota"/>
+        <a:font script="Mong" typeface="Mongolian Baiti"/>
+        <a:font script="Viet" typeface="Arial"/>
+        <a:font script="Uigh" typeface="Microsoft Uighur"/>
+        <a:font script="Geor" typeface="Sylfaen"/>
+        <a:font script="Armn" typeface="Arial"/>
+        <a:font script="Bugi" typeface="Leelawadee UI"/>
+        <a:font script="Bopo" typeface="Microsoft JhengHei"/>
+        <a:font script="Java" typeface="Javanese Text"/>
+        <a:font script="Lisu" typeface="Segoe UI"/>
+        <a:font script="Mymr" typeface="Myanmar Text"/>
+        <a:font script="Nkoo" typeface="Ebrima"/>
+        <a:font script="Olck" typeface="Nirmala UI"/>
+        <a:font script="Osma" typeface="Ebrima"/>
+        <a:font script="Phag" typeface="Phagspa"/>
+        <a:font script="Syrn" typeface="Estrangelo Edessa"/>
+        <a:font script="Syrj" typeface="Estrangelo Edessa"/>
+        <a:font script="Syre" typeface="Estrangelo Edessa"/>
+        <a:font script="Sora" typeface="Nirmala UI"/>
+        <a:font script="Tale" typeface="Microsoft Tai Le"/>
+        <a:font script="Talu" typeface="Microsoft New Tai Lue"/>
+        <a:font script="Tfng" typeface="Ebrima"/>
+      </a:minorFont>
+    </a:fontScheme>
+    <a:fmtScheme name="Office">
+      <a:fillStyleLst>
+        <a:solidFill>
+          <a:schemeClr val="phClr"/>
+        </a:solidFill>
+        <a:gradFill rotWithShape="1">
+          <a:gsLst>
+            <a:gs pos="0">
+              <a:schemeClr val="phClr">
+                <a:lumMod val="110000"/>
+                <a:satMod val="105000"/>
+                <a:tint val="67000"/>
+              </a:schemeClr>
+            </a:gs>
+            <a:gs pos="50000">
+              <a:schemeClr val="phClr">
+                <a:lumMod val="105000"/>
+                <a:satMod val="103000"/>
+                <a:tint val="73000"/>
+              </a:schemeClr>
+            </a:gs>
+            <a:gs pos="100000">
+              <a:schemeClr val="phClr">
+                <a:lumMod val="105000"/>
+                <a:satMod val="109000"/>
+                <a:tint val="81000"/>
+              </a:schemeClr>
+            </a:gs>
+          </a:gsLst>
+          <a:lin ang="5400000" scaled="0"/>
+        </a:gradFill>
+        <a:gradFill rotWithShape="1">
+          <a:gsLst>
+            <a:gs pos="0">
+              <a:schemeClr val="phClr">
+                <a:satMod val="103000"/>
+                <a:lumMod val="102000"/>
+                <a:tint val="94000"/>
+              </a:schemeClr>
+            </a:gs>
+            <a:gs pos="50000">
+              <a:schemeClr val="phClr">
+                <a:satMod val="110000"/>
+                <a:lumMod val="100000"/>
+                <a:shade val="100000"/>
+              </a:schemeClr>
+            </a:gs>
+            <a:gs pos="100000">
+              <a:schemeClr val="phClr">
+                <a:lumMod val="99000"/>
+                <a:satMod val="120000"/>
+                <a:shade val="78000"/>
+              </a:schemeClr>
+            </a:gs>
+          </a:gsLst>
+          <a:lin ang="5400000" scaled="0"/>
+        </a:gradFill>
+      </a:fillStyleLst>
+      <a:lnStyleLst>
+        <a:ln w="6350" cap="flat" cmpd="sng" algn="ctr">
+          <a:solidFill>
+            <a:schemeClr val="phClr"/>
+          </a:solidFill>
+          <a:prstDash val="solid"/>
+          <a:miter lim="800000"/>
+        </a:ln>
+        <a:ln w="12700" cap="flat" cmpd="sng" algn="ctr">
+          <a:solidFill>
+            <a:schemeClr val="phClr"/>
+          </a:solidFill>
+          <a:prstDash val="solid"/>
+          <a:miter lim="800000"/>
+        </a:ln>
+        <a:ln w="19050" cap="flat" cmpd="sng" algn="ctr">
+          <a:solidFill>
+            <a:schemeClr val="phClr"/>
+          </a:solidFill>
+          <a:prstDash val="solid"/>
+          <a:miter lim="800000"/>
+        </a:ln>
+      </a:lnStyleLst>
+      <a:effectStyleLst>
+        <a:effectStyle>
+          <a:effectLst/>
+        </a:effectStyle>
+        <a:effectStyle>
+          <a:effectLst/>
+        </a:effectStyle>
+        <a:effectStyle>
+          <a:effectLst>
+            <a:outerShdw blurRad="57150" dist="19050" dir="5400000" algn="ctr" rotWithShape="0">
+              <a:srgbClr val="000000">
+                <a:alpha val="63000"/>
+              </a:srgbClr>
+            </a:outerShdw>
+          </a:effectLst>
+        </a:effectStyle>
+      </a:effectStyleLst>
+      <a:bgFillStyleLst>
+        <a:solidFill>
+          <a:schemeClr val="phClr"/>
+        </a:solidFill>
+        <a:solidFill>
+          <a:schemeClr val="phClr">
+            <a:tint val="95000"/>
+            <a:satMod val="170000"/>
+          </a:schemeClr>
+        </a:solidFill>
+        <a:gradFill rotWithShape="1">
+          <a:gsLst>
+            <a:gs pos="0">
+              <a:schemeClr val="phClr">
+                <a:tint val="93000"/>
+                <a:satMod val="150000"/>
+                <a:shade val="98000"/>
+                <a:lumMod val="102000"/>
+              </a:schemeClr>
+            </a:gs>
+            <a:gs pos="50000">
+              <a:schemeClr val="phClr">
+                <a:tint val="98000"/>
+                <a:satMod val="130000"/>
+                <a:shade val="90000"/>
+                <a:lumMod val="103000"/>
+              </a:schemeClr>
+            </a:gs>
+            <a:gs pos="100000">
+              <a:schemeClr val="phClr">
+                <a:shade val="63000"/>
+                <a:satMod val="120000"/>
+              </a:schemeClr>
+            </a:gs>
+          </a:gsLst>
+          <a:lin ang="5400000" scaled="0"/>
+        </a:gradFill>
+      </a:bgFillStyleLst>
+    </a:fmtScheme>
+  </a:themeElements>
+  <a:objectDefaults/>
+  <a:extraClrSchemeLst/>
+  <a:extLst>
+    <a:ext uri="{05A4C25C-085E-4340-85A3-A5531E510DB2}">
+      <thm15:themeFamily xmlns:thm15="http://schemas.microsoft.com/office/thememl/2012/main" name="Office Theme" id="{62F939B6-93AF-4DB8-9C6B-D6C7DFDC589F}" vid="{4A3C46E8-61CC-4603-A589-7422A47A8E4A}"/>
     </a:ext>
   </a:extLst>
 </a:theme>

</xml_diff>

<commit_message>
Update presentation, add some lines to notebook
</commit_message>
<xml_diff>
--- a/reports/paper/word_version/Jakovlev_Presentation_TELECCON_2019.pptx
+++ b/reports/paper/word_version/Jakovlev_Presentation_TELECCON_2019.pptx
@@ -5,7 +5,7 @@
     <p:sldMasterId id="2147483648" r:id="rId1"/>
   </p:sldMasterIdLst>
   <p:notesMasterIdLst>
-    <p:notesMasterId r:id="rId15"/>
+    <p:notesMasterId r:id="rId16"/>
   </p:notesMasterIdLst>
   <p:sldIdLst>
     <p:sldId id="256" r:id="rId2"/>
@@ -16,11 +16,12 @@
     <p:sldId id="266" r:id="rId7"/>
     <p:sldId id="259" r:id="rId8"/>
     <p:sldId id="267" r:id="rId9"/>
-    <p:sldId id="268" r:id="rId10"/>
-    <p:sldId id="260" r:id="rId11"/>
-    <p:sldId id="261" r:id="rId12"/>
-    <p:sldId id="262" r:id="rId13"/>
-    <p:sldId id="264" r:id="rId14"/>
+    <p:sldId id="269" r:id="rId10"/>
+    <p:sldId id="268" r:id="rId11"/>
+    <p:sldId id="260" r:id="rId12"/>
+    <p:sldId id="261" r:id="rId13"/>
+    <p:sldId id="262" r:id="rId14"/>
+    <p:sldId id="264" r:id="rId15"/>
   </p:sldIdLst>
   <p:sldSz cx="12192000" cy="6858000"/>
   <p:notesSz cx="6858000" cy="9144000"/>
@@ -220,7 +221,7 @@
           <a:p>
             <a:fld id="{60CFFF46-31C8-4451-8663-B190ACB66019}" type="datetimeFigureOut">
               <a:rPr lang="en-US" smtClean="0"/>
-              <a:t>11/17/2019</a:t>
+              <a:t>11/17/19</a:t>
             </a:fld>
             <a:endParaRPr lang="en-US"/>
           </a:p>
@@ -673,7 +674,7 @@
           <a:p>
             <a:fld id="{740B04E9-EE27-490B-B120-9E5E749DAD50}" type="slidenum">
               <a:rPr lang="en-US" smtClean="0"/>
-              <a:t>10</a:t>
+              <a:t>11</a:t>
             </a:fld>
             <a:endParaRPr lang="en-US"/>
           </a:p>
@@ -738,16 +739,69 @@
           <a:p>
             <a:r>
               <a:rPr lang="ru-RU" dirty="0"/>
-              <a:t>Оценку мы проводили на тестовом датасете из 960 растений с помощью </a:t>
-            </a:r>
-            <a:r>
-              <a:rPr lang="en-US" dirty="0"/>
-              <a:t>F </a:t>
+              <a:t>Оценку мы проводили на тестовом датасете из </a:t>
+            </a:r>
+            <a:r>
+              <a:rPr lang="ru-RU" dirty="0" smtClean="0"/>
+              <a:t>794 растений </a:t>
             </a:r>
             <a:r>
               <a:rPr lang="ru-RU" dirty="0"/>
-              <a:t>меры (формулы представлены на слайде). </a:t>
-            </a:r>
+              <a:t>с помощью </a:t>
+            </a:r>
+            <a:r>
+              <a:rPr lang="ru-RU" dirty="0" smtClean="0"/>
+              <a:t>микро-усредненной </a:t>
+            </a:r>
+            <a:r>
+              <a:rPr lang="en-US" dirty="0" smtClean="0"/>
+              <a:t>F</a:t>
+            </a:r>
+            <a:r>
+              <a:rPr lang="ru-RU" dirty="0" smtClean="0"/>
+              <a:t>-меры </a:t>
+            </a:r>
+            <a:r>
+              <a:rPr lang="ru-RU" dirty="0"/>
+              <a:t>(формулы представлены на слайде). </a:t>
+            </a:r>
+            <a:r>
+              <a:rPr lang="ru-RU" dirty="0" smtClean="0"/>
+              <a:t>Усредняются </a:t>
+            </a:r>
+            <a:r>
+              <a:rPr lang="en-GB" dirty="0" smtClean="0"/>
+              <a:t>Precision </a:t>
+            </a:r>
+            <a:r>
+              <a:rPr lang="ru-RU" dirty="0" smtClean="0"/>
+              <a:t>и </a:t>
+            </a:r>
+            <a:r>
+              <a:rPr lang="en-GB" dirty="0" smtClean="0"/>
+              <a:t>Recall</a:t>
+            </a:r>
+            <a:r>
+              <a:rPr lang="ru-RU" dirty="0" smtClean="0"/>
+              <a:t> по всем классам</a:t>
+            </a:r>
+            <a:r>
+              <a:rPr lang="en-GB" dirty="0" smtClean="0"/>
+              <a:t>, </a:t>
+            </a:r>
+            <a:r>
+              <a:rPr lang="ru-RU" dirty="0" smtClean="0"/>
+              <a:t>а затем считаем </a:t>
+            </a:r>
+            <a:r>
+              <a:rPr lang="en-GB" dirty="0" smtClean="0"/>
+              <a:t>F</a:t>
+            </a:r>
+            <a:r>
+              <a:rPr lang="ru-RU" dirty="0" smtClean="0"/>
+              <a:t>-меру для полученных средних.</a:t>
+            </a:r>
+            <a:endParaRPr lang="ru-RU" dirty="0"/>
           </a:p>
           <a:p>
             <a:r>
@@ -775,7 +829,7 @@
           <a:p>
             <a:fld id="{740B04E9-EE27-490B-B120-9E5E749DAD50}" type="slidenum">
               <a:rPr lang="en-US" smtClean="0"/>
-              <a:t>11</a:t>
+              <a:t>12</a:t>
             </a:fld>
             <a:endParaRPr lang="en-US"/>
           </a:p>
@@ -899,7 +953,7 @@
           <a:p>
             <a:fld id="{740B04E9-EE27-490B-B120-9E5E749DAD50}" type="slidenum">
               <a:rPr lang="en-US" smtClean="0"/>
-              <a:t>12</a:t>
+              <a:t>13</a:t>
             </a:fld>
             <a:endParaRPr lang="en-US"/>
           </a:p>
@@ -999,7 +1053,7 @@
           <a:p>
             <a:fld id="{740B04E9-EE27-490B-B120-9E5E749DAD50}" type="slidenum">
               <a:rPr lang="en-US" smtClean="0"/>
-              <a:t>13</a:t>
+              <a:t>14</a:t>
             </a:fld>
             <a:endParaRPr lang="en-US"/>
           </a:p>
@@ -1839,7 +1893,7 @@
           <a:p>
             <a:fld id="{740B04E9-EE27-490B-B120-9E5E749DAD50}" type="slidenum">
               <a:rPr lang="en-US" smtClean="0"/>
-              <a:t>9</a:t>
+              <a:t>10</a:t>
             </a:fld>
             <a:endParaRPr lang="en-US"/>
           </a:p>
@@ -1880,7 +1934,7 @@
           <p:cNvPr id="2" name="Title 1">
             <a:extLst>
               <a:ext uri="{FF2B5EF4-FFF2-40B4-BE49-F238E27FC236}">
-                <a16:creationId xmlns:a16="http://schemas.microsoft.com/office/drawing/2014/main" id="{414A69B8-7A31-4C8A-BB84-D42A985727E4}"/>
+                <a16:creationId xmlns="" xmlns:a16="http://schemas.microsoft.com/office/drawing/2014/main" id="{414A69B8-7A31-4C8A-BB84-D42A985727E4}"/>
               </a:ext>
             </a:extLst>
           </p:cNvPr>
@@ -1917,7 +1971,7 @@
           <p:cNvPr id="3" name="Subtitle 2">
             <a:extLst>
               <a:ext uri="{FF2B5EF4-FFF2-40B4-BE49-F238E27FC236}">
-                <a16:creationId xmlns:a16="http://schemas.microsoft.com/office/drawing/2014/main" id="{2DD1A611-CB3F-46F0-9E42-C8903C775E9A}"/>
+                <a16:creationId xmlns="" xmlns:a16="http://schemas.microsoft.com/office/drawing/2014/main" id="{2DD1A611-CB3F-46F0-9E42-C8903C775E9A}"/>
               </a:ext>
             </a:extLst>
           </p:cNvPr>
@@ -1987,7 +2041,7 @@
           <p:cNvPr id="4" name="Date Placeholder 3">
             <a:extLst>
               <a:ext uri="{FF2B5EF4-FFF2-40B4-BE49-F238E27FC236}">
-                <a16:creationId xmlns:a16="http://schemas.microsoft.com/office/drawing/2014/main" id="{20CE7524-F0FB-4E74-A7A3-D9A9C138BDB3}"/>
+                <a16:creationId xmlns="" xmlns:a16="http://schemas.microsoft.com/office/drawing/2014/main" id="{20CE7524-F0FB-4E74-A7A3-D9A9C138BDB3}"/>
               </a:ext>
             </a:extLst>
           </p:cNvPr>
@@ -2006,7 +2060,7 @@
             <a:fld id="{177E6806-CC6B-498A-9ADD-8522D25E232D}" type="datetimeFigureOut">
               <a:rPr lang="en-US" smtClean="0"/>
               <a:pPr/>
-              <a:t>11/17/2019</a:t>
+              <a:t>11/17/19</a:t>
             </a:fld>
             <a:endParaRPr lang="en-US"/>
           </a:p>
@@ -2017,7 +2071,7 @@
           <p:cNvPr id="5" name="Footer Placeholder 4">
             <a:extLst>
               <a:ext uri="{FF2B5EF4-FFF2-40B4-BE49-F238E27FC236}">
-                <a16:creationId xmlns:a16="http://schemas.microsoft.com/office/drawing/2014/main" id="{9285A050-7D16-4B73-B6BD-34CBF6F663A1}"/>
+                <a16:creationId xmlns="" xmlns:a16="http://schemas.microsoft.com/office/drawing/2014/main" id="{9285A050-7D16-4B73-B6BD-34CBF6F663A1}"/>
               </a:ext>
             </a:extLst>
           </p:cNvPr>
@@ -2042,7 +2096,7 @@
           <p:cNvPr id="6" name="Slide Number Placeholder 5">
             <a:extLst>
               <a:ext uri="{FF2B5EF4-FFF2-40B4-BE49-F238E27FC236}">
-                <a16:creationId xmlns:a16="http://schemas.microsoft.com/office/drawing/2014/main" id="{1B6A5C8E-B026-408E-8911-0E1FD3049D7D}"/>
+                <a16:creationId xmlns="" xmlns:a16="http://schemas.microsoft.com/office/drawing/2014/main" id="{1B6A5C8E-B026-408E-8911-0E1FD3049D7D}"/>
               </a:ext>
             </a:extLst>
           </p:cNvPr>
@@ -2102,7 +2156,7 @@
           <p:cNvPr id="2" name="Title 1">
             <a:extLst>
               <a:ext uri="{FF2B5EF4-FFF2-40B4-BE49-F238E27FC236}">
-                <a16:creationId xmlns:a16="http://schemas.microsoft.com/office/drawing/2014/main" id="{6F05E97F-6710-4219-B3B4-9050E5B421B3}"/>
+                <a16:creationId xmlns="" xmlns:a16="http://schemas.microsoft.com/office/drawing/2014/main" id="{6F05E97F-6710-4219-B3B4-9050E5B421B3}"/>
               </a:ext>
             </a:extLst>
           </p:cNvPr>
@@ -2130,7 +2184,7 @@
           <p:cNvPr id="3" name="Vertical Text Placeholder 2">
             <a:extLst>
               <a:ext uri="{FF2B5EF4-FFF2-40B4-BE49-F238E27FC236}">
-                <a16:creationId xmlns:a16="http://schemas.microsoft.com/office/drawing/2014/main" id="{D8755098-00B1-4F04-959E-3029CD021835}"/>
+                <a16:creationId xmlns="" xmlns:a16="http://schemas.microsoft.com/office/drawing/2014/main" id="{D8755098-00B1-4F04-959E-3029CD021835}"/>
               </a:ext>
             </a:extLst>
           </p:cNvPr>
@@ -2187,7 +2241,7 @@
           <p:cNvPr id="4" name="Date Placeholder 3">
             <a:extLst>
               <a:ext uri="{FF2B5EF4-FFF2-40B4-BE49-F238E27FC236}">
-                <a16:creationId xmlns:a16="http://schemas.microsoft.com/office/drawing/2014/main" id="{DD1ECEDB-C9CA-45F3-9A94-8368F398B2D4}"/>
+                <a16:creationId xmlns="" xmlns:a16="http://schemas.microsoft.com/office/drawing/2014/main" id="{DD1ECEDB-C9CA-45F3-9A94-8368F398B2D4}"/>
               </a:ext>
             </a:extLst>
           </p:cNvPr>
@@ -2206,7 +2260,7 @@
             <a:fld id="{177E6806-CC6B-498A-9ADD-8522D25E232D}" type="datetimeFigureOut">
               <a:rPr lang="en-US" smtClean="0"/>
               <a:pPr/>
-              <a:t>11/17/2019</a:t>
+              <a:t>11/17/19</a:t>
             </a:fld>
             <a:endParaRPr lang="en-US"/>
           </a:p>
@@ -2217,7 +2271,7 @@
           <p:cNvPr id="5" name="Footer Placeholder 4">
             <a:extLst>
               <a:ext uri="{FF2B5EF4-FFF2-40B4-BE49-F238E27FC236}">
-                <a16:creationId xmlns:a16="http://schemas.microsoft.com/office/drawing/2014/main" id="{333C7E31-54A6-4B4F-9DD4-DA60B9878333}"/>
+                <a16:creationId xmlns="" xmlns:a16="http://schemas.microsoft.com/office/drawing/2014/main" id="{333C7E31-54A6-4B4F-9DD4-DA60B9878333}"/>
               </a:ext>
             </a:extLst>
           </p:cNvPr>
@@ -2242,7 +2296,7 @@
           <p:cNvPr id="6" name="Slide Number Placeholder 5">
             <a:extLst>
               <a:ext uri="{FF2B5EF4-FFF2-40B4-BE49-F238E27FC236}">
-                <a16:creationId xmlns:a16="http://schemas.microsoft.com/office/drawing/2014/main" id="{56389D19-BBD3-43C2-87F8-CB7FF1E604C6}"/>
+                <a16:creationId xmlns="" xmlns:a16="http://schemas.microsoft.com/office/drawing/2014/main" id="{56389D19-BBD3-43C2-87F8-CB7FF1E604C6}"/>
               </a:ext>
             </a:extLst>
           </p:cNvPr>
@@ -2302,7 +2356,7 @@
           <p:cNvPr id="2" name="Vertical Title 1">
             <a:extLst>
               <a:ext uri="{FF2B5EF4-FFF2-40B4-BE49-F238E27FC236}">
-                <a16:creationId xmlns:a16="http://schemas.microsoft.com/office/drawing/2014/main" id="{890894E3-D41B-41A1-85FC-9E5C560E0110}"/>
+                <a16:creationId xmlns="" xmlns:a16="http://schemas.microsoft.com/office/drawing/2014/main" id="{890894E3-D41B-41A1-85FC-9E5C560E0110}"/>
               </a:ext>
             </a:extLst>
           </p:cNvPr>
@@ -2335,7 +2389,7 @@
           <p:cNvPr id="3" name="Vertical Text Placeholder 2">
             <a:extLst>
               <a:ext uri="{FF2B5EF4-FFF2-40B4-BE49-F238E27FC236}">
-                <a16:creationId xmlns:a16="http://schemas.microsoft.com/office/drawing/2014/main" id="{BB9674E3-720E-4593-8D4E-BCC5CE0DF804}"/>
+                <a16:creationId xmlns="" xmlns:a16="http://schemas.microsoft.com/office/drawing/2014/main" id="{BB9674E3-720E-4593-8D4E-BCC5CE0DF804}"/>
               </a:ext>
             </a:extLst>
           </p:cNvPr>
@@ -2397,7 +2451,7 @@
           <p:cNvPr id="4" name="Date Placeholder 3">
             <a:extLst>
               <a:ext uri="{FF2B5EF4-FFF2-40B4-BE49-F238E27FC236}">
-                <a16:creationId xmlns:a16="http://schemas.microsoft.com/office/drawing/2014/main" id="{5EA6F0AD-7055-4124-BE1D-B8C6D01ABD65}"/>
+                <a16:creationId xmlns="" xmlns:a16="http://schemas.microsoft.com/office/drawing/2014/main" id="{5EA6F0AD-7055-4124-BE1D-B8C6D01ABD65}"/>
               </a:ext>
             </a:extLst>
           </p:cNvPr>
@@ -2416,7 +2470,7 @@
             <a:fld id="{177E6806-CC6B-498A-9ADD-8522D25E232D}" type="datetimeFigureOut">
               <a:rPr lang="en-US" smtClean="0"/>
               <a:pPr/>
-              <a:t>11/17/2019</a:t>
+              <a:t>11/17/19</a:t>
             </a:fld>
             <a:endParaRPr lang="en-US"/>
           </a:p>
@@ -2427,7 +2481,7 @@
           <p:cNvPr id="5" name="Footer Placeholder 4">
             <a:extLst>
               <a:ext uri="{FF2B5EF4-FFF2-40B4-BE49-F238E27FC236}">
-                <a16:creationId xmlns:a16="http://schemas.microsoft.com/office/drawing/2014/main" id="{AB7D5CBE-4374-41B7-987A-7638254AA31A}"/>
+                <a16:creationId xmlns="" xmlns:a16="http://schemas.microsoft.com/office/drawing/2014/main" id="{AB7D5CBE-4374-41B7-987A-7638254AA31A}"/>
               </a:ext>
             </a:extLst>
           </p:cNvPr>
@@ -2452,7 +2506,7 @@
           <p:cNvPr id="6" name="Slide Number Placeholder 5">
             <a:extLst>
               <a:ext uri="{FF2B5EF4-FFF2-40B4-BE49-F238E27FC236}">
-                <a16:creationId xmlns:a16="http://schemas.microsoft.com/office/drawing/2014/main" id="{96F0497C-70BE-407A-A099-5644C929D134}"/>
+                <a16:creationId xmlns="" xmlns:a16="http://schemas.microsoft.com/office/drawing/2014/main" id="{96F0497C-70BE-407A-A099-5644C929D134}"/>
               </a:ext>
             </a:extLst>
           </p:cNvPr>
@@ -2512,7 +2566,7 @@
           <p:cNvPr id="2" name="Title 1">
             <a:extLst>
               <a:ext uri="{FF2B5EF4-FFF2-40B4-BE49-F238E27FC236}">
-                <a16:creationId xmlns:a16="http://schemas.microsoft.com/office/drawing/2014/main" id="{43924329-1894-40C8-82F8-DF61B0374229}"/>
+                <a16:creationId xmlns="" xmlns:a16="http://schemas.microsoft.com/office/drawing/2014/main" id="{43924329-1894-40C8-82F8-DF61B0374229}"/>
               </a:ext>
             </a:extLst>
           </p:cNvPr>
@@ -2540,7 +2594,7 @@
           <p:cNvPr id="3" name="Content Placeholder 2">
             <a:extLst>
               <a:ext uri="{FF2B5EF4-FFF2-40B4-BE49-F238E27FC236}">
-                <a16:creationId xmlns:a16="http://schemas.microsoft.com/office/drawing/2014/main" id="{E6A3BC9B-1457-4F92-A714-CBB3A3BDA447}"/>
+                <a16:creationId xmlns="" xmlns:a16="http://schemas.microsoft.com/office/drawing/2014/main" id="{E6A3BC9B-1457-4F92-A714-CBB3A3BDA447}"/>
               </a:ext>
             </a:extLst>
           </p:cNvPr>
@@ -2597,7 +2651,7 @@
           <p:cNvPr id="4" name="Date Placeholder 3">
             <a:extLst>
               <a:ext uri="{FF2B5EF4-FFF2-40B4-BE49-F238E27FC236}">
-                <a16:creationId xmlns:a16="http://schemas.microsoft.com/office/drawing/2014/main" id="{9D2F05BB-1F9D-403C-AD32-8C4702318B93}"/>
+                <a16:creationId xmlns="" xmlns:a16="http://schemas.microsoft.com/office/drawing/2014/main" id="{9D2F05BB-1F9D-403C-AD32-8C4702318B93}"/>
               </a:ext>
             </a:extLst>
           </p:cNvPr>
@@ -2616,7 +2670,7 @@
             <a:fld id="{177E6806-CC6B-498A-9ADD-8522D25E232D}" type="datetimeFigureOut">
               <a:rPr lang="en-US" smtClean="0"/>
               <a:pPr/>
-              <a:t>11/17/2019</a:t>
+              <a:t>11/17/19</a:t>
             </a:fld>
             <a:endParaRPr lang="en-US"/>
           </a:p>
@@ -2627,7 +2681,7 @@
           <p:cNvPr id="5" name="Footer Placeholder 4">
             <a:extLst>
               <a:ext uri="{FF2B5EF4-FFF2-40B4-BE49-F238E27FC236}">
-                <a16:creationId xmlns:a16="http://schemas.microsoft.com/office/drawing/2014/main" id="{4FBA387F-E822-4482-B105-84713F22D4C4}"/>
+                <a16:creationId xmlns="" xmlns:a16="http://schemas.microsoft.com/office/drawing/2014/main" id="{4FBA387F-E822-4482-B105-84713F22D4C4}"/>
               </a:ext>
             </a:extLst>
           </p:cNvPr>
@@ -2652,7 +2706,7 @@
           <p:cNvPr id="6" name="Slide Number Placeholder 5">
             <a:extLst>
               <a:ext uri="{FF2B5EF4-FFF2-40B4-BE49-F238E27FC236}">
-                <a16:creationId xmlns:a16="http://schemas.microsoft.com/office/drawing/2014/main" id="{2A75E2B7-90D5-4D19-AA6D-4A955F58CE27}"/>
+                <a16:creationId xmlns="" xmlns:a16="http://schemas.microsoft.com/office/drawing/2014/main" id="{2A75E2B7-90D5-4D19-AA6D-4A955F58CE27}"/>
               </a:ext>
             </a:extLst>
           </p:cNvPr>
@@ -2712,7 +2766,7 @@
           <p:cNvPr id="2" name="Title 1">
             <a:extLst>
               <a:ext uri="{FF2B5EF4-FFF2-40B4-BE49-F238E27FC236}">
-                <a16:creationId xmlns:a16="http://schemas.microsoft.com/office/drawing/2014/main" id="{9510EFA7-AA0E-416A-8CA1-21EB740D56D8}"/>
+                <a16:creationId xmlns="" xmlns:a16="http://schemas.microsoft.com/office/drawing/2014/main" id="{9510EFA7-AA0E-416A-8CA1-21EB740D56D8}"/>
               </a:ext>
             </a:extLst>
           </p:cNvPr>
@@ -2749,7 +2803,7 @@
           <p:cNvPr id="3" name="Text Placeholder 2">
             <a:extLst>
               <a:ext uri="{FF2B5EF4-FFF2-40B4-BE49-F238E27FC236}">
-                <a16:creationId xmlns:a16="http://schemas.microsoft.com/office/drawing/2014/main" id="{3D3285EE-100D-4736-8288-8F7C455D45B2}"/>
+                <a16:creationId xmlns="" xmlns:a16="http://schemas.microsoft.com/office/drawing/2014/main" id="{3D3285EE-100D-4736-8288-8F7C455D45B2}"/>
               </a:ext>
             </a:extLst>
           </p:cNvPr>
@@ -2874,7 +2928,7 @@
           <p:cNvPr id="4" name="Date Placeholder 3">
             <a:extLst>
               <a:ext uri="{FF2B5EF4-FFF2-40B4-BE49-F238E27FC236}">
-                <a16:creationId xmlns:a16="http://schemas.microsoft.com/office/drawing/2014/main" id="{EF9726B9-27BB-4C87-9876-5205B7996A58}"/>
+                <a16:creationId xmlns="" xmlns:a16="http://schemas.microsoft.com/office/drawing/2014/main" id="{EF9726B9-27BB-4C87-9876-5205B7996A58}"/>
               </a:ext>
             </a:extLst>
           </p:cNvPr>
@@ -2893,7 +2947,7 @@
             <a:fld id="{177E6806-CC6B-498A-9ADD-8522D25E232D}" type="datetimeFigureOut">
               <a:rPr lang="en-US" smtClean="0"/>
               <a:pPr/>
-              <a:t>11/17/2019</a:t>
+              <a:t>11/17/19</a:t>
             </a:fld>
             <a:endParaRPr lang="en-US"/>
           </a:p>
@@ -2904,7 +2958,7 @@
           <p:cNvPr id="5" name="Footer Placeholder 4">
             <a:extLst>
               <a:ext uri="{FF2B5EF4-FFF2-40B4-BE49-F238E27FC236}">
-                <a16:creationId xmlns:a16="http://schemas.microsoft.com/office/drawing/2014/main" id="{6BEE94E2-2332-481B-905E-25BAF18EB033}"/>
+                <a16:creationId xmlns="" xmlns:a16="http://schemas.microsoft.com/office/drawing/2014/main" id="{6BEE94E2-2332-481B-905E-25BAF18EB033}"/>
               </a:ext>
             </a:extLst>
           </p:cNvPr>
@@ -2929,7 +2983,7 @@
           <p:cNvPr id="6" name="Slide Number Placeholder 5">
             <a:extLst>
               <a:ext uri="{FF2B5EF4-FFF2-40B4-BE49-F238E27FC236}">
-                <a16:creationId xmlns:a16="http://schemas.microsoft.com/office/drawing/2014/main" id="{FB69E90F-3237-4057-B2D1-156389849DE5}"/>
+                <a16:creationId xmlns="" xmlns:a16="http://schemas.microsoft.com/office/drawing/2014/main" id="{FB69E90F-3237-4057-B2D1-156389849DE5}"/>
               </a:ext>
             </a:extLst>
           </p:cNvPr>
@@ -2989,7 +3043,7 @@
           <p:cNvPr id="2" name="Title 1">
             <a:extLst>
               <a:ext uri="{FF2B5EF4-FFF2-40B4-BE49-F238E27FC236}">
-                <a16:creationId xmlns:a16="http://schemas.microsoft.com/office/drawing/2014/main" id="{22CDFE1F-CBD2-4215-B9AF-24B72E402EEE}"/>
+                <a16:creationId xmlns="" xmlns:a16="http://schemas.microsoft.com/office/drawing/2014/main" id="{22CDFE1F-CBD2-4215-B9AF-24B72E402EEE}"/>
               </a:ext>
             </a:extLst>
           </p:cNvPr>
@@ -3017,7 +3071,7 @@
           <p:cNvPr id="3" name="Content Placeholder 2">
             <a:extLst>
               <a:ext uri="{FF2B5EF4-FFF2-40B4-BE49-F238E27FC236}">
-                <a16:creationId xmlns:a16="http://schemas.microsoft.com/office/drawing/2014/main" id="{1C061FDB-9959-4220-BE26-B25DC480515B}"/>
+                <a16:creationId xmlns="" xmlns:a16="http://schemas.microsoft.com/office/drawing/2014/main" id="{1C061FDB-9959-4220-BE26-B25DC480515B}"/>
               </a:ext>
             </a:extLst>
           </p:cNvPr>
@@ -3079,7 +3133,7 @@
           <p:cNvPr id="4" name="Content Placeholder 3">
             <a:extLst>
               <a:ext uri="{FF2B5EF4-FFF2-40B4-BE49-F238E27FC236}">
-                <a16:creationId xmlns:a16="http://schemas.microsoft.com/office/drawing/2014/main" id="{80B70312-2A47-4A8F-8BF0-AD89AAC88150}"/>
+                <a16:creationId xmlns="" xmlns:a16="http://schemas.microsoft.com/office/drawing/2014/main" id="{80B70312-2A47-4A8F-8BF0-AD89AAC88150}"/>
               </a:ext>
             </a:extLst>
           </p:cNvPr>
@@ -3141,7 +3195,7 @@
           <p:cNvPr id="5" name="Date Placeholder 4">
             <a:extLst>
               <a:ext uri="{FF2B5EF4-FFF2-40B4-BE49-F238E27FC236}">
-                <a16:creationId xmlns:a16="http://schemas.microsoft.com/office/drawing/2014/main" id="{6BB8D23B-232E-4077-9AB8-A68CBDE048D2}"/>
+                <a16:creationId xmlns="" xmlns:a16="http://schemas.microsoft.com/office/drawing/2014/main" id="{6BB8D23B-232E-4077-9AB8-A68CBDE048D2}"/>
               </a:ext>
             </a:extLst>
           </p:cNvPr>
@@ -3160,7 +3214,7 @@
             <a:fld id="{177E6806-CC6B-498A-9ADD-8522D25E232D}" type="datetimeFigureOut">
               <a:rPr lang="en-US" smtClean="0"/>
               <a:pPr/>
-              <a:t>11/17/2019</a:t>
+              <a:t>11/17/19</a:t>
             </a:fld>
             <a:endParaRPr lang="en-US"/>
           </a:p>
@@ -3171,7 +3225,7 @@
           <p:cNvPr id="6" name="Footer Placeholder 5">
             <a:extLst>
               <a:ext uri="{FF2B5EF4-FFF2-40B4-BE49-F238E27FC236}">
-                <a16:creationId xmlns:a16="http://schemas.microsoft.com/office/drawing/2014/main" id="{92599478-D08A-4EA7-89EB-6BD2A1DCED11}"/>
+                <a16:creationId xmlns="" xmlns:a16="http://schemas.microsoft.com/office/drawing/2014/main" id="{92599478-D08A-4EA7-89EB-6BD2A1DCED11}"/>
               </a:ext>
             </a:extLst>
           </p:cNvPr>
@@ -3196,7 +3250,7 @@
           <p:cNvPr id="7" name="Slide Number Placeholder 6">
             <a:extLst>
               <a:ext uri="{FF2B5EF4-FFF2-40B4-BE49-F238E27FC236}">
-                <a16:creationId xmlns:a16="http://schemas.microsoft.com/office/drawing/2014/main" id="{883AA24C-8F42-497C-9A9C-31C5E739CFFB}"/>
+                <a16:creationId xmlns="" xmlns:a16="http://schemas.microsoft.com/office/drawing/2014/main" id="{883AA24C-8F42-497C-9A9C-31C5E739CFFB}"/>
               </a:ext>
             </a:extLst>
           </p:cNvPr>
@@ -3256,7 +3310,7 @@
           <p:cNvPr id="2" name="Title 1">
             <a:extLst>
               <a:ext uri="{FF2B5EF4-FFF2-40B4-BE49-F238E27FC236}">
-                <a16:creationId xmlns:a16="http://schemas.microsoft.com/office/drawing/2014/main" id="{B1F71FF1-E782-42F0-9E8E-FE24009DFEBA}"/>
+                <a16:creationId xmlns="" xmlns:a16="http://schemas.microsoft.com/office/drawing/2014/main" id="{B1F71FF1-E782-42F0-9E8E-FE24009DFEBA}"/>
               </a:ext>
             </a:extLst>
           </p:cNvPr>
@@ -3289,7 +3343,7 @@
           <p:cNvPr id="3" name="Text Placeholder 2">
             <a:extLst>
               <a:ext uri="{FF2B5EF4-FFF2-40B4-BE49-F238E27FC236}">
-                <a16:creationId xmlns:a16="http://schemas.microsoft.com/office/drawing/2014/main" id="{CA7C4EEF-29CB-49CD-AC45-D01AF54FB46C}"/>
+                <a16:creationId xmlns="" xmlns:a16="http://schemas.microsoft.com/office/drawing/2014/main" id="{CA7C4EEF-29CB-49CD-AC45-D01AF54FB46C}"/>
               </a:ext>
             </a:extLst>
           </p:cNvPr>
@@ -3360,7 +3414,7 @@
           <p:cNvPr id="4" name="Content Placeholder 3">
             <a:extLst>
               <a:ext uri="{FF2B5EF4-FFF2-40B4-BE49-F238E27FC236}">
-                <a16:creationId xmlns:a16="http://schemas.microsoft.com/office/drawing/2014/main" id="{5DAE092A-A5DF-4E4D-AB55-3273161F7398}"/>
+                <a16:creationId xmlns="" xmlns:a16="http://schemas.microsoft.com/office/drawing/2014/main" id="{5DAE092A-A5DF-4E4D-AB55-3273161F7398}"/>
               </a:ext>
             </a:extLst>
           </p:cNvPr>
@@ -3422,7 +3476,7 @@
           <p:cNvPr id="5" name="Text Placeholder 4">
             <a:extLst>
               <a:ext uri="{FF2B5EF4-FFF2-40B4-BE49-F238E27FC236}">
-                <a16:creationId xmlns:a16="http://schemas.microsoft.com/office/drawing/2014/main" id="{9C65526E-7A40-4CFF-AAA0-BA31BFD2AE91}"/>
+                <a16:creationId xmlns="" xmlns:a16="http://schemas.microsoft.com/office/drawing/2014/main" id="{9C65526E-7A40-4CFF-AAA0-BA31BFD2AE91}"/>
               </a:ext>
             </a:extLst>
           </p:cNvPr>
@@ -3493,7 +3547,7 @@
           <p:cNvPr id="6" name="Content Placeholder 5">
             <a:extLst>
               <a:ext uri="{FF2B5EF4-FFF2-40B4-BE49-F238E27FC236}">
-                <a16:creationId xmlns:a16="http://schemas.microsoft.com/office/drawing/2014/main" id="{B63A7161-0583-43A5-8E71-858B05ADC277}"/>
+                <a16:creationId xmlns="" xmlns:a16="http://schemas.microsoft.com/office/drawing/2014/main" id="{B63A7161-0583-43A5-8E71-858B05ADC277}"/>
               </a:ext>
             </a:extLst>
           </p:cNvPr>
@@ -3555,7 +3609,7 @@
           <p:cNvPr id="7" name="Date Placeholder 6">
             <a:extLst>
               <a:ext uri="{FF2B5EF4-FFF2-40B4-BE49-F238E27FC236}">
-                <a16:creationId xmlns:a16="http://schemas.microsoft.com/office/drawing/2014/main" id="{4F55091F-9541-4B93-B6C0-9F77C1396BAD}"/>
+                <a16:creationId xmlns="" xmlns:a16="http://schemas.microsoft.com/office/drawing/2014/main" id="{4F55091F-9541-4B93-B6C0-9F77C1396BAD}"/>
               </a:ext>
             </a:extLst>
           </p:cNvPr>
@@ -3574,7 +3628,7 @@
             <a:fld id="{177E6806-CC6B-498A-9ADD-8522D25E232D}" type="datetimeFigureOut">
               <a:rPr lang="en-US" smtClean="0"/>
               <a:pPr/>
-              <a:t>11/17/2019</a:t>
+              <a:t>11/17/19</a:t>
             </a:fld>
             <a:endParaRPr lang="en-US"/>
           </a:p>
@@ -3585,7 +3639,7 @@
           <p:cNvPr id="8" name="Footer Placeholder 7">
             <a:extLst>
               <a:ext uri="{FF2B5EF4-FFF2-40B4-BE49-F238E27FC236}">
-                <a16:creationId xmlns:a16="http://schemas.microsoft.com/office/drawing/2014/main" id="{61F8F422-AD58-493D-98BE-2049F507ED99}"/>
+                <a16:creationId xmlns="" xmlns:a16="http://schemas.microsoft.com/office/drawing/2014/main" id="{61F8F422-AD58-493D-98BE-2049F507ED99}"/>
               </a:ext>
             </a:extLst>
           </p:cNvPr>
@@ -3610,7 +3664,7 @@
           <p:cNvPr id="9" name="Slide Number Placeholder 8">
             <a:extLst>
               <a:ext uri="{FF2B5EF4-FFF2-40B4-BE49-F238E27FC236}">
-                <a16:creationId xmlns:a16="http://schemas.microsoft.com/office/drawing/2014/main" id="{1F6EB6EB-0DF7-4B8A-A792-271AD58C307A}"/>
+                <a16:creationId xmlns="" xmlns:a16="http://schemas.microsoft.com/office/drawing/2014/main" id="{1F6EB6EB-0DF7-4B8A-A792-271AD58C307A}"/>
               </a:ext>
             </a:extLst>
           </p:cNvPr>
@@ -3670,7 +3724,7 @@
           <p:cNvPr id="2" name="Title 1">
             <a:extLst>
               <a:ext uri="{FF2B5EF4-FFF2-40B4-BE49-F238E27FC236}">
-                <a16:creationId xmlns:a16="http://schemas.microsoft.com/office/drawing/2014/main" id="{0E9C36F9-4217-4640-A81B-B4EDCF70A0C2}"/>
+                <a16:creationId xmlns="" xmlns:a16="http://schemas.microsoft.com/office/drawing/2014/main" id="{0E9C36F9-4217-4640-A81B-B4EDCF70A0C2}"/>
               </a:ext>
             </a:extLst>
           </p:cNvPr>
@@ -3698,7 +3752,7 @@
           <p:cNvPr id="3" name="Date Placeholder 2">
             <a:extLst>
               <a:ext uri="{FF2B5EF4-FFF2-40B4-BE49-F238E27FC236}">
-                <a16:creationId xmlns:a16="http://schemas.microsoft.com/office/drawing/2014/main" id="{D9020EC9-5BAE-4ABB-A11C-047F9A092C5C}"/>
+                <a16:creationId xmlns="" xmlns:a16="http://schemas.microsoft.com/office/drawing/2014/main" id="{D9020EC9-5BAE-4ABB-A11C-047F9A092C5C}"/>
               </a:ext>
             </a:extLst>
           </p:cNvPr>
@@ -3717,7 +3771,7 @@
             <a:fld id="{177E6806-CC6B-498A-9ADD-8522D25E232D}" type="datetimeFigureOut">
               <a:rPr lang="en-US" smtClean="0"/>
               <a:pPr/>
-              <a:t>11/17/2019</a:t>
+              <a:t>11/17/19</a:t>
             </a:fld>
             <a:endParaRPr lang="en-US"/>
           </a:p>
@@ -3728,7 +3782,7 @@
           <p:cNvPr id="4" name="Footer Placeholder 3">
             <a:extLst>
               <a:ext uri="{FF2B5EF4-FFF2-40B4-BE49-F238E27FC236}">
-                <a16:creationId xmlns:a16="http://schemas.microsoft.com/office/drawing/2014/main" id="{5A3C717D-123D-4E3B-BB1B-8893260CEFEF}"/>
+                <a16:creationId xmlns="" xmlns:a16="http://schemas.microsoft.com/office/drawing/2014/main" id="{5A3C717D-123D-4E3B-BB1B-8893260CEFEF}"/>
               </a:ext>
             </a:extLst>
           </p:cNvPr>
@@ -3753,7 +3807,7 @@
           <p:cNvPr id="5" name="Slide Number Placeholder 4">
             <a:extLst>
               <a:ext uri="{FF2B5EF4-FFF2-40B4-BE49-F238E27FC236}">
-                <a16:creationId xmlns:a16="http://schemas.microsoft.com/office/drawing/2014/main" id="{FCB7F034-337B-4CBD-A34C-437F743DA9CD}"/>
+                <a16:creationId xmlns="" xmlns:a16="http://schemas.microsoft.com/office/drawing/2014/main" id="{FCB7F034-337B-4CBD-A34C-437F743DA9CD}"/>
               </a:ext>
             </a:extLst>
           </p:cNvPr>
@@ -3813,7 +3867,7 @@
           <p:cNvPr id="2" name="Date Placeholder 1">
             <a:extLst>
               <a:ext uri="{FF2B5EF4-FFF2-40B4-BE49-F238E27FC236}">
-                <a16:creationId xmlns:a16="http://schemas.microsoft.com/office/drawing/2014/main" id="{D5D0673F-6B9D-41A2-8D96-EBEB0CFDFB19}"/>
+                <a16:creationId xmlns="" xmlns:a16="http://schemas.microsoft.com/office/drawing/2014/main" id="{D5D0673F-6B9D-41A2-8D96-EBEB0CFDFB19}"/>
               </a:ext>
             </a:extLst>
           </p:cNvPr>
@@ -3832,7 +3886,7 @@
             <a:fld id="{177E6806-CC6B-498A-9ADD-8522D25E232D}" type="datetimeFigureOut">
               <a:rPr lang="en-US" smtClean="0"/>
               <a:pPr/>
-              <a:t>11/17/2019</a:t>
+              <a:t>11/17/19</a:t>
             </a:fld>
             <a:endParaRPr lang="en-US"/>
           </a:p>
@@ -3843,7 +3897,7 @@
           <p:cNvPr id="3" name="Footer Placeholder 2">
             <a:extLst>
               <a:ext uri="{FF2B5EF4-FFF2-40B4-BE49-F238E27FC236}">
-                <a16:creationId xmlns:a16="http://schemas.microsoft.com/office/drawing/2014/main" id="{EB1B4D0D-C7DF-4D27-8761-6C035BA9E43E}"/>
+                <a16:creationId xmlns="" xmlns:a16="http://schemas.microsoft.com/office/drawing/2014/main" id="{EB1B4D0D-C7DF-4D27-8761-6C035BA9E43E}"/>
               </a:ext>
             </a:extLst>
           </p:cNvPr>
@@ -3868,7 +3922,7 @@
           <p:cNvPr id="4" name="Slide Number Placeholder 3">
             <a:extLst>
               <a:ext uri="{FF2B5EF4-FFF2-40B4-BE49-F238E27FC236}">
-                <a16:creationId xmlns:a16="http://schemas.microsoft.com/office/drawing/2014/main" id="{16B9C0D8-BAA0-4E3E-80A7-292885DAD1B7}"/>
+                <a16:creationId xmlns="" xmlns:a16="http://schemas.microsoft.com/office/drawing/2014/main" id="{16B9C0D8-BAA0-4E3E-80A7-292885DAD1B7}"/>
               </a:ext>
             </a:extLst>
           </p:cNvPr>
@@ -3928,7 +3982,7 @@
           <p:cNvPr id="2" name="Title 1">
             <a:extLst>
               <a:ext uri="{FF2B5EF4-FFF2-40B4-BE49-F238E27FC236}">
-                <a16:creationId xmlns:a16="http://schemas.microsoft.com/office/drawing/2014/main" id="{3FFBCB84-1189-409B-A372-090412BAD049}"/>
+                <a16:creationId xmlns="" xmlns:a16="http://schemas.microsoft.com/office/drawing/2014/main" id="{3FFBCB84-1189-409B-A372-090412BAD049}"/>
               </a:ext>
             </a:extLst>
           </p:cNvPr>
@@ -3965,7 +4019,7 @@
           <p:cNvPr id="3" name="Content Placeholder 2">
             <a:extLst>
               <a:ext uri="{FF2B5EF4-FFF2-40B4-BE49-F238E27FC236}">
-                <a16:creationId xmlns:a16="http://schemas.microsoft.com/office/drawing/2014/main" id="{7336E376-4370-4E92-9713-9D95EAE79ED6}"/>
+                <a16:creationId xmlns="" xmlns:a16="http://schemas.microsoft.com/office/drawing/2014/main" id="{7336E376-4370-4E92-9713-9D95EAE79ED6}"/>
               </a:ext>
             </a:extLst>
           </p:cNvPr>
@@ -4055,7 +4109,7 @@
           <p:cNvPr id="4" name="Text Placeholder 3">
             <a:extLst>
               <a:ext uri="{FF2B5EF4-FFF2-40B4-BE49-F238E27FC236}">
-                <a16:creationId xmlns:a16="http://schemas.microsoft.com/office/drawing/2014/main" id="{95AEE95D-41F8-4EBA-8052-5BBA00D1F4E7}"/>
+                <a16:creationId xmlns="" xmlns:a16="http://schemas.microsoft.com/office/drawing/2014/main" id="{95AEE95D-41F8-4EBA-8052-5BBA00D1F4E7}"/>
               </a:ext>
             </a:extLst>
           </p:cNvPr>
@@ -4126,7 +4180,7 @@
           <p:cNvPr id="5" name="Date Placeholder 4">
             <a:extLst>
               <a:ext uri="{FF2B5EF4-FFF2-40B4-BE49-F238E27FC236}">
-                <a16:creationId xmlns:a16="http://schemas.microsoft.com/office/drawing/2014/main" id="{901DE9C0-73D0-40DB-B85E-94A626B786D4}"/>
+                <a16:creationId xmlns="" xmlns:a16="http://schemas.microsoft.com/office/drawing/2014/main" id="{901DE9C0-73D0-40DB-B85E-94A626B786D4}"/>
               </a:ext>
             </a:extLst>
           </p:cNvPr>
@@ -4145,7 +4199,7 @@
             <a:fld id="{177E6806-CC6B-498A-9ADD-8522D25E232D}" type="datetimeFigureOut">
               <a:rPr lang="en-US" smtClean="0"/>
               <a:pPr/>
-              <a:t>11/17/2019</a:t>
+              <a:t>11/17/19</a:t>
             </a:fld>
             <a:endParaRPr lang="en-US"/>
           </a:p>
@@ -4156,7 +4210,7 @@
           <p:cNvPr id="6" name="Footer Placeholder 5">
             <a:extLst>
               <a:ext uri="{FF2B5EF4-FFF2-40B4-BE49-F238E27FC236}">
-                <a16:creationId xmlns:a16="http://schemas.microsoft.com/office/drawing/2014/main" id="{281E7426-6A83-4B3A-A3E3-F3EA10011389}"/>
+                <a16:creationId xmlns="" xmlns:a16="http://schemas.microsoft.com/office/drawing/2014/main" id="{281E7426-6A83-4B3A-A3E3-F3EA10011389}"/>
               </a:ext>
             </a:extLst>
           </p:cNvPr>
@@ -4181,7 +4235,7 @@
           <p:cNvPr id="7" name="Slide Number Placeholder 6">
             <a:extLst>
               <a:ext uri="{FF2B5EF4-FFF2-40B4-BE49-F238E27FC236}">
-                <a16:creationId xmlns:a16="http://schemas.microsoft.com/office/drawing/2014/main" id="{C99E020F-3642-4462-B8FE-4AEE5C406859}"/>
+                <a16:creationId xmlns="" xmlns:a16="http://schemas.microsoft.com/office/drawing/2014/main" id="{C99E020F-3642-4462-B8FE-4AEE5C406859}"/>
               </a:ext>
             </a:extLst>
           </p:cNvPr>
@@ -4241,7 +4295,7 @@
           <p:cNvPr id="2" name="Title 1">
             <a:extLst>
               <a:ext uri="{FF2B5EF4-FFF2-40B4-BE49-F238E27FC236}">
-                <a16:creationId xmlns:a16="http://schemas.microsoft.com/office/drawing/2014/main" id="{7BD154AA-0E2A-4BF6-BC21-2A44748D9D37}"/>
+                <a16:creationId xmlns="" xmlns:a16="http://schemas.microsoft.com/office/drawing/2014/main" id="{7BD154AA-0E2A-4BF6-BC21-2A44748D9D37}"/>
               </a:ext>
             </a:extLst>
           </p:cNvPr>
@@ -4278,7 +4332,7 @@
           <p:cNvPr id="3" name="Picture Placeholder 2">
             <a:extLst>
               <a:ext uri="{FF2B5EF4-FFF2-40B4-BE49-F238E27FC236}">
-                <a16:creationId xmlns:a16="http://schemas.microsoft.com/office/drawing/2014/main" id="{A64B5038-0450-4D3D-A90B-2F85F7565716}"/>
+                <a16:creationId xmlns="" xmlns:a16="http://schemas.microsoft.com/office/drawing/2014/main" id="{A64B5038-0450-4D3D-A90B-2F85F7565716}"/>
               </a:ext>
             </a:extLst>
           </p:cNvPr>
@@ -4345,7 +4399,7 @@
           <p:cNvPr id="4" name="Text Placeholder 3">
             <a:extLst>
               <a:ext uri="{FF2B5EF4-FFF2-40B4-BE49-F238E27FC236}">
-                <a16:creationId xmlns:a16="http://schemas.microsoft.com/office/drawing/2014/main" id="{2BDB941D-9222-435E-8305-4A8CB89E7BED}"/>
+                <a16:creationId xmlns="" xmlns:a16="http://schemas.microsoft.com/office/drawing/2014/main" id="{2BDB941D-9222-435E-8305-4A8CB89E7BED}"/>
               </a:ext>
             </a:extLst>
           </p:cNvPr>
@@ -4416,7 +4470,7 @@
           <p:cNvPr id="5" name="Date Placeholder 4">
             <a:extLst>
               <a:ext uri="{FF2B5EF4-FFF2-40B4-BE49-F238E27FC236}">
-                <a16:creationId xmlns:a16="http://schemas.microsoft.com/office/drawing/2014/main" id="{256BC66E-EA7F-4F7B-88BE-D273BEBBD2DC}"/>
+                <a16:creationId xmlns="" xmlns:a16="http://schemas.microsoft.com/office/drawing/2014/main" id="{256BC66E-EA7F-4F7B-88BE-D273BEBBD2DC}"/>
               </a:ext>
             </a:extLst>
           </p:cNvPr>
@@ -4435,7 +4489,7 @@
             <a:fld id="{177E6806-CC6B-498A-9ADD-8522D25E232D}" type="datetimeFigureOut">
               <a:rPr lang="en-US" smtClean="0"/>
               <a:pPr/>
-              <a:t>11/17/2019</a:t>
+              <a:t>11/17/19</a:t>
             </a:fld>
             <a:endParaRPr lang="en-US"/>
           </a:p>
@@ -4446,7 +4500,7 @@
           <p:cNvPr id="6" name="Footer Placeholder 5">
             <a:extLst>
               <a:ext uri="{FF2B5EF4-FFF2-40B4-BE49-F238E27FC236}">
-                <a16:creationId xmlns:a16="http://schemas.microsoft.com/office/drawing/2014/main" id="{89318CB3-0663-46C5-AC4E-3D2B94803B0C}"/>
+                <a16:creationId xmlns="" xmlns:a16="http://schemas.microsoft.com/office/drawing/2014/main" id="{89318CB3-0663-46C5-AC4E-3D2B94803B0C}"/>
               </a:ext>
             </a:extLst>
           </p:cNvPr>
@@ -4471,7 +4525,7 @@
           <p:cNvPr id="7" name="Slide Number Placeholder 6">
             <a:extLst>
               <a:ext uri="{FF2B5EF4-FFF2-40B4-BE49-F238E27FC236}">
-                <a16:creationId xmlns:a16="http://schemas.microsoft.com/office/drawing/2014/main" id="{8858CF0C-54D4-465B-89FF-955838C8077A}"/>
+                <a16:creationId xmlns="" xmlns:a16="http://schemas.microsoft.com/office/drawing/2014/main" id="{8858CF0C-54D4-465B-89FF-955838C8077A}"/>
               </a:ext>
             </a:extLst>
           </p:cNvPr>
@@ -4536,7 +4590,7 @@
           <p:cNvPr id="2" name="Title Placeholder 1">
             <a:extLst>
               <a:ext uri="{FF2B5EF4-FFF2-40B4-BE49-F238E27FC236}">
-                <a16:creationId xmlns:a16="http://schemas.microsoft.com/office/drawing/2014/main" id="{CC1684EB-0CB8-444F-9769-F142A3FE2EE8}"/>
+                <a16:creationId xmlns="" xmlns:a16="http://schemas.microsoft.com/office/drawing/2014/main" id="{CC1684EB-0CB8-444F-9769-F142A3FE2EE8}"/>
               </a:ext>
             </a:extLst>
           </p:cNvPr>
@@ -4574,7 +4628,7 @@
           <p:cNvPr id="3" name="Text Placeholder 2">
             <a:extLst>
               <a:ext uri="{FF2B5EF4-FFF2-40B4-BE49-F238E27FC236}">
-                <a16:creationId xmlns:a16="http://schemas.microsoft.com/office/drawing/2014/main" id="{1F7B1710-D254-433C-AB26-A86C70604A08}"/>
+                <a16:creationId xmlns="" xmlns:a16="http://schemas.microsoft.com/office/drawing/2014/main" id="{1F7B1710-D254-433C-AB26-A86C70604A08}"/>
               </a:ext>
             </a:extLst>
           </p:cNvPr>
@@ -4641,7 +4695,7 @@
           <p:cNvPr id="4" name="Date Placeholder 3">
             <a:extLst>
               <a:ext uri="{FF2B5EF4-FFF2-40B4-BE49-F238E27FC236}">
-                <a16:creationId xmlns:a16="http://schemas.microsoft.com/office/drawing/2014/main" id="{B0B7D5CB-6005-4016-8A05-A08F264BCB83}"/>
+                <a16:creationId xmlns="" xmlns:a16="http://schemas.microsoft.com/office/drawing/2014/main" id="{B0B7D5CB-6005-4016-8A05-A08F264BCB83}"/>
               </a:ext>
             </a:extLst>
           </p:cNvPr>
@@ -4678,7 +4732,7 @@
             <a:fld id="{177E6806-CC6B-498A-9ADD-8522D25E232D}" type="datetimeFigureOut">
               <a:rPr lang="en-US" smtClean="0"/>
               <a:pPr/>
-              <a:t>11/17/2019</a:t>
+              <a:t>11/17/19</a:t>
             </a:fld>
             <a:endParaRPr lang="en-US"/>
           </a:p>
@@ -4689,7 +4743,7 @@
           <p:cNvPr id="5" name="Footer Placeholder 4">
             <a:extLst>
               <a:ext uri="{FF2B5EF4-FFF2-40B4-BE49-F238E27FC236}">
-                <a16:creationId xmlns:a16="http://schemas.microsoft.com/office/drawing/2014/main" id="{EBDD3E0E-A0A7-47A7-AE78-DE6F07B8EB84}"/>
+                <a16:creationId xmlns="" xmlns:a16="http://schemas.microsoft.com/office/drawing/2014/main" id="{EBDD3E0E-A0A7-47A7-AE78-DE6F07B8EB84}"/>
               </a:ext>
             </a:extLst>
           </p:cNvPr>
@@ -4732,7 +4786,7 @@
           <p:cNvPr id="6" name="Slide Number Placeholder 5">
             <a:extLst>
               <a:ext uri="{FF2B5EF4-FFF2-40B4-BE49-F238E27FC236}">
-                <a16:creationId xmlns:a16="http://schemas.microsoft.com/office/drawing/2014/main" id="{ACDBEFFF-3143-4D5F-AC4D-15CCA180E59D}"/>
+                <a16:creationId xmlns="" xmlns:a16="http://schemas.microsoft.com/office/drawing/2014/main" id="{ACDBEFFF-3143-4D5F-AC4D-15CCA180E59D}"/>
               </a:ext>
             </a:extLst>
           </p:cNvPr>
@@ -5101,7 +5155,7 @@
           <p:cNvPr id="4" name="Title 1">
             <a:extLst>
               <a:ext uri="{FF2B5EF4-FFF2-40B4-BE49-F238E27FC236}">
-                <a16:creationId xmlns:a16="http://schemas.microsoft.com/office/drawing/2014/main" id="{7E4C7065-9053-439E-8FAC-B3F312009E29}"/>
+                <a16:creationId xmlns="" xmlns:a16="http://schemas.microsoft.com/office/drawing/2014/main" id="{7E4C7065-9053-439E-8FAC-B3F312009E29}"/>
               </a:ext>
             </a:extLst>
           </p:cNvPr>
@@ -5155,7 +5209,7 @@
           <p:cNvPr id="5" name="Subtitle 2">
             <a:extLst>
               <a:ext uri="{FF2B5EF4-FFF2-40B4-BE49-F238E27FC236}">
-                <a16:creationId xmlns:a16="http://schemas.microsoft.com/office/drawing/2014/main" id="{8B948D26-62F4-458D-960A-FD96A5CC0FCA}"/>
+                <a16:creationId xmlns="" xmlns:a16="http://schemas.microsoft.com/office/drawing/2014/main" id="{8B948D26-62F4-458D-960A-FD96A5CC0FCA}"/>
               </a:ext>
             </a:extLst>
           </p:cNvPr>
@@ -5398,7 +5452,7 @@
           <p:cNvPr id="6" name="TextBox 3">
             <a:extLst>
               <a:ext uri="{FF2B5EF4-FFF2-40B4-BE49-F238E27FC236}">
-                <a16:creationId xmlns:a16="http://schemas.microsoft.com/office/drawing/2014/main" id="{F9E51A6D-14F0-4C80-8A42-D5242AC31F14}"/>
+                <a16:creationId xmlns="" xmlns:a16="http://schemas.microsoft.com/office/drawing/2014/main" id="{F9E51A6D-14F0-4C80-8A42-D5242AC31F14}"/>
               </a:ext>
             </a:extLst>
           </p:cNvPr>
@@ -5535,7 +5589,7 @@
           <p:cNvPr id="9" name="TextBox 6">
             <a:extLst>
               <a:ext uri="{FF2B5EF4-FFF2-40B4-BE49-F238E27FC236}">
-                <a16:creationId xmlns:a16="http://schemas.microsoft.com/office/drawing/2014/main" id="{B976E0B5-438B-456D-95FF-0ED4CE212731}"/>
+                <a16:creationId xmlns="" xmlns:a16="http://schemas.microsoft.com/office/drawing/2014/main" id="{B976E0B5-438B-456D-95FF-0ED4CE212731}"/>
               </a:ext>
             </a:extLst>
           </p:cNvPr>
@@ -5704,7 +5758,7 @@
           <p:cNvPr id="2" name="Title 1">
             <a:extLst>
               <a:ext uri="{FF2B5EF4-FFF2-40B4-BE49-F238E27FC236}">
-                <a16:creationId xmlns:a16="http://schemas.microsoft.com/office/drawing/2014/main" id="{FB4CC34F-AB48-4150-B1EE-2D3A1EBA5063}"/>
+                <a16:creationId xmlns="" xmlns:a16="http://schemas.microsoft.com/office/drawing/2014/main" id="{CCC38707-2573-4AE3-90AE-961D4C37378D}"/>
               </a:ext>
             </a:extLst>
           </p:cNvPr>
@@ -5722,61 +5776,49 @@
           <a:p>
             <a:r>
               <a:rPr lang="en-US" b="1" dirty="0"/>
-              <a:t>Classification methods</a:t>
-            </a:r>
-          </a:p>
-        </p:txBody>
-      </p:sp>
-      <p:sp>
-        <p:nvSpPr>
-          <p:cNvPr id="3" name="Content Placeholder 2">
+              <a:t>Feature correlation </a:t>
+            </a:r>
+            <a:r>
+              <a:rPr lang="en-US" b="1" dirty="0" smtClean="0"/>
+              <a:t>matrix</a:t>
+            </a:r>
+            <a:endParaRPr lang="en-US" dirty="0"/>
+          </a:p>
+        </p:txBody>
+      </p:sp>
+      <p:pic>
+        <p:nvPicPr>
+          <p:cNvPr id="5" name="Picture 4"/>
+          <p:cNvPicPr>
+            <a:picLocks noChangeAspect="1"/>
+          </p:cNvPicPr>
+          <p:nvPr/>
+        </p:nvPicPr>
+        <p:blipFill rotWithShape="1">
+          <a:blip r:embed="rId3">
             <a:extLst>
-              <a:ext uri="{FF2B5EF4-FFF2-40B4-BE49-F238E27FC236}">
-                <a16:creationId xmlns:a16="http://schemas.microsoft.com/office/drawing/2014/main" id="{F2F3F7CF-4925-4D7C-95F0-D81BD5CEA879}"/>
+              <a:ext uri="{28A0092B-C50C-407E-A947-70E740481C1C}">
+                <a14:useLocalDpi xmlns:a14="http://schemas.microsoft.com/office/drawing/2010/main" val="0"/>
               </a:ext>
             </a:extLst>
-          </p:cNvPr>
-          <p:cNvSpPr>
-            <a:spLocks noGrp="1"/>
-          </p:cNvSpPr>
-          <p:nvPr>
-            <p:ph idx="1"/>
-          </p:nvPr>
-        </p:nvSpPr>
-        <p:spPr/>
-        <p:txBody>
-          <a:bodyPr/>
-          <a:lstStyle/>
-          <a:p>
-            <a:r>
-              <a:rPr lang="en-US" dirty="0"/>
-              <a:t>SVM</a:t>
-            </a:r>
-          </a:p>
-          <a:p>
-            <a:r>
-              <a:rPr lang="en-US" dirty="0"/>
-              <a:t>K-Nearest Neighbors</a:t>
-            </a:r>
-          </a:p>
-          <a:p>
-            <a:r>
-              <a:rPr lang="en-US" dirty="0"/>
-              <a:t>Naive Bayes</a:t>
-            </a:r>
-          </a:p>
-          <a:p>
-            <a:r>
-              <a:rPr lang="en-US" dirty="0"/>
-              <a:t>Decision Tree</a:t>
-            </a:r>
-          </a:p>
-        </p:txBody>
-      </p:sp>
+          </a:blip>
+          <a:srcRect t="1143"/>
+          <a:stretch/>
+        </p:blipFill>
+        <p:spPr>
+          <a:xfrm>
+            <a:off x="2534023" y="1319134"/>
+            <a:ext cx="6631091" cy="5538866"/>
+          </a:xfrm>
+          <a:prstGeom prst="rect">
+            <a:avLst/>
+          </a:prstGeom>
+        </p:spPr>
+      </p:pic>
     </p:spTree>
     <p:extLst>
       <p:ext uri="{BB962C8B-B14F-4D97-AF65-F5344CB8AC3E}">
-        <p14:creationId xmlns:p14="http://schemas.microsoft.com/office/powerpoint/2010/main" val="372936009"/>
+        <p14:creationId xmlns:p14="http://schemas.microsoft.com/office/powerpoint/2010/main" val="2872247765"/>
       </p:ext>
     </p:extLst>
   </p:cSld>
@@ -5808,7 +5850,111 @@
           <p:cNvPr id="2" name="Title 1">
             <a:extLst>
               <a:ext uri="{FF2B5EF4-FFF2-40B4-BE49-F238E27FC236}">
-                <a16:creationId xmlns:a16="http://schemas.microsoft.com/office/drawing/2014/main" id="{7FAFCCAF-85E0-4793-BC14-1BA9F112AFB5}"/>
+                <a16:creationId xmlns="" xmlns:a16="http://schemas.microsoft.com/office/drawing/2014/main" id="{FB4CC34F-AB48-4150-B1EE-2D3A1EBA5063}"/>
+              </a:ext>
+            </a:extLst>
+          </p:cNvPr>
+          <p:cNvSpPr>
+            <a:spLocks noGrp="1"/>
+          </p:cNvSpPr>
+          <p:nvPr>
+            <p:ph type="title"/>
+          </p:nvPr>
+        </p:nvSpPr>
+        <p:spPr/>
+        <p:txBody>
+          <a:bodyPr/>
+          <a:lstStyle/>
+          <a:p>
+            <a:r>
+              <a:rPr lang="en-US" b="1" dirty="0"/>
+              <a:t>Classification methods</a:t>
+            </a:r>
+          </a:p>
+        </p:txBody>
+      </p:sp>
+      <p:sp>
+        <p:nvSpPr>
+          <p:cNvPr id="3" name="Content Placeholder 2">
+            <a:extLst>
+              <a:ext uri="{FF2B5EF4-FFF2-40B4-BE49-F238E27FC236}">
+                <a16:creationId xmlns="" xmlns:a16="http://schemas.microsoft.com/office/drawing/2014/main" id="{F2F3F7CF-4925-4D7C-95F0-D81BD5CEA879}"/>
+              </a:ext>
+            </a:extLst>
+          </p:cNvPr>
+          <p:cNvSpPr>
+            <a:spLocks noGrp="1"/>
+          </p:cNvSpPr>
+          <p:nvPr>
+            <p:ph idx="1"/>
+          </p:nvPr>
+        </p:nvSpPr>
+        <p:spPr/>
+        <p:txBody>
+          <a:bodyPr/>
+          <a:lstStyle/>
+          <a:p>
+            <a:r>
+              <a:rPr lang="en-US" dirty="0"/>
+              <a:t>SVM</a:t>
+            </a:r>
+          </a:p>
+          <a:p>
+            <a:r>
+              <a:rPr lang="en-US" dirty="0"/>
+              <a:t>K-Nearest Neighbors</a:t>
+            </a:r>
+          </a:p>
+          <a:p>
+            <a:r>
+              <a:rPr lang="en-US" dirty="0"/>
+              <a:t>Naive Bayes</a:t>
+            </a:r>
+          </a:p>
+          <a:p>
+            <a:r>
+              <a:rPr lang="en-US" dirty="0"/>
+              <a:t>Decision Tree</a:t>
+            </a:r>
+          </a:p>
+        </p:txBody>
+      </p:sp>
+    </p:spTree>
+    <p:extLst>
+      <p:ext uri="{BB962C8B-B14F-4D97-AF65-F5344CB8AC3E}">
+        <p14:creationId xmlns:p14="http://schemas.microsoft.com/office/powerpoint/2010/main" val="372936009"/>
+      </p:ext>
+    </p:extLst>
+  </p:cSld>
+  <p:clrMapOvr>
+    <a:masterClrMapping/>
+  </p:clrMapOvr>
+</p:sld>
+</file>
+
+<file path=ppt/slides/slide12.xml><?xml version="1.0" encoding="utf-8"?>
+<p:sld xmlns:a="http://schemas.openxmlformats.org/drawingml/2006/main" xmlns:r="http://schemas.openxmlformats.org/officeDocument/2006/relationships" xmlns:p="http://schemas.openxmlformats.org/presentationml/2006/main">
+  <p:cSld>
+    <p:spTree>
+      <p:nvGrpSpPr>
+        <p:cNvPr id="1" name=""/>
+        <p:cNvGrpSpPr/>
+        <p:nvPr/>
+      </p:nvGrpSpPr>
+      <p:grpSpPr>
+        <a:xfrm>
+          <a:off x="0" y="0"/>
+          <a:ext cx="0" cy="0"/>
+          <a:chOff x="0" y="0"/>
+          <a:chExt cx="0" cy="0"/>
+        </a:xfrm>
+      </p:grpSpPr>
+      <p:sp>
+        <p:nvSpPr>
+          <p:cNvPr id="2" name="Title 1">
+            <a:extLst>
+              <a:ext uri="{FF2B5EF4-FFF2-40B4-BE49-F238E27FC236}">
+                <a16:creationId xmlns="" xmlns:a16="http://schemas.microsoft.com/office/drawing/2014/main" id="{7FAFCCAF-85E0-4793-BC14-1BA9F112AFB5}"/>
               </a:ext>
             </a:extLst>
           </p:cNvPr>
@@ -5841,7 +5987,7 @@
           <p:cNvPr id="9" name="Table 8">
             <a:extLst>
               <a:ext uri="{FF2B5EF4-FFF2-40B4-BE49-F238E27FC236}">
-                <a16:creationId xmlns:a16="http://schemas.microsoft.com/office/drawing/2014/main" id="{F3361100-D2FC-4CE8-80E8-A8C0BE531E2F}"/>
+                <a16:creationId xmlns="" xmlns:a16="http://schemas.microsoft.com/office/drawing/2014/main" id="{F3361100-D2FC-4CE8-80E8-A8C0BE531E2F}"/>
               </a:ext>
             </a:extLst>
           </p:cNvPr>
@@ -5868,14 +6014,14 @@
                 <a:gridCol w="2757055">
                   <a:extLst>
                     <a:ext uri="{9D8B030D-6E8A-4147-A177-3AD203B41FA5}">
-                      <a16:colId xmlns:a16="http://schemas.microsoft.com/office/drawing/2014/main" val="4136364936"/>
+                      <a16:colId xmlns="" xmlns:a16="http://schemas.microsoft.com/office/drawing/2014/main" val="4136364936"/>
                     </a:ext>
                   </a:extLst>
                 </a:gridCol>
                 <a:gridCol w="1551709">
                   <a:extLst>
                     <a:ext uri="{9D8B030D-6E8A-4147-A177-3AD203B41FA5}">
-                      <a16:colId xmlns:a16="http://schemas.microsoft.com/office/drawing/2014/main" val="3962416559"/>
+                      <a16:colId xmlns="" xmlns:a16="http://schemas.microsoft.com/office/drawing/2014/main" val="3962416559"/>
                     </a:ext>
                   </a:extLst>
                 </a:gridCol>
@@ -6023,7 +6169,7 @@
                 </a:tc>
                 <a:extLst>
                   <a:ext uri="{0D108BD9-81ED-4DB2-BD59-A6C34878D82A}">
-                    <a16:rowId xmlns:a16="http://schemas.microsoft.com/office/drawing/2014/main" val="253634774"/>
+                    <a16:rowId xmlns="" xmlns:a16="http://schemas.microsoft.com/office/drawing/2014/main" val="253634774"/>
                   </a:ext>
                 </a:extLst>
               </a:tr>
@@ -6160,7 +6306,7 @@
                 </a:tc>
                 <a:extLst>
                   <a:ext uri="{0D108BD9-81ED-4DB2-BD59-A6C34878D82A}">
-                    <a16:rowId xmlns:a16="http://schemas.microsoft.com/office/drawing/2014/main" val="1260823875"/>
+                    <a16:rowId xmlns="" xmlns:a16="http://schemas.microsoft.com/office/drawing/2014/main" val="1260823875"/>
                   </a:ext>
                 </a:extLst>
               </a:tr>
@@ -6297,7 +6443,7 @@
                 </a:tc>
                 <a:extLst>
                   <a:ext uri="{0D108BD9-81ED-4DB2-BD59-A6C34878D82A}">
-                    <a16:rowId xmlns:a16="http://schemas.microsoft.com/office/drawing/2014/main" val="1383525387"/>
+                    <a16:rowId xmlns="" xmlns:a16="http://schemas.microsoft.com/office/drawing/2014/main" val="1383525387"/>
                   </a:ext>
                 </a:extLst>
               </a:tr>
@@ -6434,7 +6580,7 @@
                 </a:tc>
                 <a:extLst>
                   <a:ext uri="{0D108BD9-81ED-4DB2-BD59-A6C34878D82A}">
-                    <a16:rowId xmlns:a16="http://schemas.microsoft.com/office/drawing/2014/main" val="802050039"/>
+                    <a16:rowId xmlns="" xmlns:a16="http://schemas.microsoft.com/office/drawing/2014/main" val="802050039"/>
                   </a:ext>
                 </a:extLst>
               </a:tr>
@@ -6571,7 +6717,7 @@
                 </a:tc>
                 <a:extLst>
                   <a:ext uri="{0D108BD9-81ED-4DB2-BD59-A6C34878D82A}">
-                    <a16:rowId xmlns:a16="http://schemas.microsoft.com/office/drawing/2014/main" val="1262826881"/>
+                    <a16:rowId xmlns="" xmlns:a16="http://schemas.microsoft.com/office/drawing/2014/main" val="1262826881"/>
                   </a:ext>
                 </a:extLst>
               </a:tr>
@@ -6711,7 +6857,7 @@
                 </a:tc>
                 <a:extLst>
                   <a:ext uri="{0D108BD9-81ED-4DB2-BD59-A6C34878D82A}">
-                    <a16:rowId xmlns:a16="http://schemas.microsoft.com/office/drawing/2014/main" val="2393056217"/>
+                    <a16:rowId xmlns="" xmlns:a16="http://schemas.microsoft.com/office/drawing/2014/main" val="2393056217"/>
                   </a:ext>
                 </a:extLst>
               </a:tr>
@@ -6848,7 +6994,7 @@
                 </a:tc>
                 <a:extLst>
                   <a:ext uri="{0D108BD9-81ED-4DB2-BD59-A6C34878D82A}">
-                    <a16:rowId xmlns:a16="http://schemas.microsoft.com/office/drawing/2014/main" val="2943836085"/>
+                    <a16:rowId xmlns="" xmlns:a16="http://schemas.microsoft.com/office/drawing/2014/main" val="2943836085"/>
                   </a:ext>
                 </a:extLst>
               </a:tr>
@@ -6985,7 +7131,7 @@
                 </a:tc>
                 <a:extLst>
                   <a:ext uri="{0D108BD9-81ED-4DB2-BD59-A6C34878D82A}">
-                    <a16:rowId xmlns:a16="http://schemas.microsoft.com/office/drawing/2014/main" val="2605425791"/>
+                    <a16:rowId xmlns="" xmlns:a16="http://schemas.microsoft.com/office/drawing/2014/main" val="2605425791"/>
                   </a:ext>
                 </a:extLst>
               </a:tr>
@@ -7125,7 +7271,7 @@
                 </a:tc>
                 <a:extLst>
                   <a:ext uri="{0D108BD9-81ED-4DB2-BD59-A6C34878D82A}">
-                    <a16:rowId xmlns:a16="http://schemas.microsoft.com/office/drawing/2014/main" val="2448526215"/>
+                    <a16:rowId xmlns="" xmlns:a16="http://schemas.microsoft.com/office/drawing/2014/main" val="2448526215"/>
                   </a:ext>
                 </a:extLst>
               </a:tr>
@@ -7265,7 +7411,7 @@
                 </a:tc>
                 <a:extLst>
                   <a:ext uri="{0D108BD9-81ED-4DB2-BD59-A6C34878D82A}">
-                    <a16:rowId xmlns:a16="http://schemas.microsoft.com/office/drawing/2014/main" val="2139935751"/>
+                    <a16:rowId xmlns="" xmlns:a16="http://schemas.microsoft.com/office/drawing/2014/main" val="2139935751"/>
                   </a:ext>
                 </a:extLst>
               </a:tr>
@@ -7405,7 +7551,7 @@
                 </a:tc>
                 <a:extLst>
                   <a:ext uri="{0D108BD9-81ED-4DB2-BD59-A6C34878D82A}">
-                    <a16:rowId xmlns:a16="http://schemas.microsoft.com/office/drawing/2014/main" val="1868532617"/>
+                    <a16:rowId xmlns="" xmlns:a16="http://schemas.microsoft.com/office/drawing/2014/main" val="1868532617"/>
                   </a:ext>
                 </a:extLst>
               </a:tr>
@@ -7545,7 +7691,7 @@
                 </a:tc>
                 <a:extLst>
                   <a:ext uri="{0D108BD9-81ED-4DB2-BD59-A6C34878D82A}">
-                    <a16:rowId xmlns:a16="http://schemas.microsoft.com/office/drawing/2014/main" val="3434249434"/>
+                    <a16:rowId xmlns="" xmlns:a16="http://schemas.microsoft.com/office/drawing/2014/main" val="3434249434"/>
                   </a:ext>
                 </a:extLst>
               </a:tr>
@@ -7685,7 +7831,7 @@
                 </a:tc>
                 <a:extLst>
                   <a:ext uri="{0D108BD9-81ED-4DB2-BD59-A6C34878D82A}">
-                    <a16:rowId xmlns:a16="http://schemas.microsoft.com/office/drawing/2014/main" val="3058925131"/>
+                    <a16:rowId xmlns="" xmlns:a16="http://schemas.microsoft.com/office/drawing/2014/main" val="3058925131"/>
                   </a:ext>
                 </a:extLst>
               </a:tr>
@@ -7830,7 +7976,7 @@
                 </a:tc>
                 <a:extLst>
                   <a:ext uri="{0D108BD9-81ED-4DB2-BD59-A6C34878D82A}">
-                    <a16:rowId xmlns:a16="http://schemas.microsoft.com/office/drawing/2014/main" val="99529181"/>
+                    <a16:rowId xmlns="" xmlns:a16="http://schemas.microsoft.com/office/drawing/2014/main" val="99529181"/>
                   </a:ext>
                 </a:extLst>
               </a:tr>
@@ -7838,14 +7984,14 @@
           </a:graphicData>
         </a:graphic>
       </p:graphicFrame>
-      <mc:AlternateContent xmlns:mc="http://schemas.openxmlformats.org/markup-compatibility/2006">
-        <mc:Choice xmlns:a14="http://schemas.microsoft.com/office/drawing/2010/main" Requires="a14">
+      <mc:AlternateContent xmlns:mc="http://schemas.openxmlformats.org/markup-compatibility/2006" xmlns:a14="http://schemas.microsoft.com/office/drawing/2010/main">
+        <mc:Choice Requires="a14">
           <p:sp>
             <p:nvSpPr>
               <p:cNvPr id="11" name="Rectangle 10">
                 <a:extLst>
                   <a:ext uri="{FF2B5EF4-FFF2-40B4-BE49-F238E27FC236}">
-                    <a16:creationId xmlns:a16="http://schemas.microsoft.com/office/drawing/2014/main" id="{88C80FDC-9B9D-40F4-A79B-9A7681595EA5}"/>
+                    <a16:creationId xmlns="" xmlns:a16="http://schemas.microsoft.com/office/drawing/2014/main" id="{88C80FDC-9B9D-40F4-A79B-9A7681595EA5}"/>
                   </a:ext>
                 </a:extLst>
               </p:cNvPr>
@@ -7878,7 +8024,7 @@
                       <m:sSubPr>
                         <m:ctrlPr>
                           <a:rPr lang="en-US" sz="2000" i="1" smtClean="0">
-                            <a:latin typeface="Cambria Math" panose="02040503050406030204" pitchFamily="18" charset="0"/>
+                            <a:latin typeface="Cambria Math" charset="0"/>
                             <a:ea typeface="Times New Roman" panose="02020603050405020304" pitchFamily="18" charset="0"/>
                           </a:rPr>
                         </m:ctrlPr>
@@ -7913,7 +8059,7 @@
                       <m:fPr>
                         <m:ctrlPr>
                           <a:rPr lang="en-US" sz="2000" i="1">
-                            <a:latin typeface="Cambria Math" panose="02040503050406030204" pitchFamily="18" charset="0"/>
+                            <a:latin typeface="Cambria Math" charset="0"/>
                             <a:ea typeface="Times New Roman" panose="02020603050405020304" pitchFamily="18" charset="0"/>
                           </a:rPr>
                         </m:ctrlPr>
@@ -7926,7 +8072,7 @@
                             <m:supHide m:val="on"/>
                             <m:ctrlPr>
                               <a:rPr lang="en-US" sz="2000" i="1">
-                                <a:latin typeface="Cambria Math" panose="02040503050406030204" pitchFamily="18" charset="0"/>
+                                <a:latin typeface="Cambria Math" charset="0"/>
                                 <a:ea typeface="Times New Roman" panose="02020603050405020304" pitchFamily="18" charset="0"/>
                               </a:rPr>
                             </m:ctrlPr>
@@ -7967,7 +8113,7 @@
                               <m:sSubPr>
                                 <m:ctrlPr>
                                   <a:rPr lang="en-US" sz="2000" i="1">
-                                    <a:latin typeface="Cambria Math" panose="02040503050406030204" pitchFamily="18" charset="0"/>
+                                    <a:latin typeface="Cambria Math" charset="0"/>
                                     <a:ea typeface="Times New Roman" panose="02020603050405020304" pitchFamily="18" charset="0"/>
                                   </a:rPr>
                                 </m:ctrlPr>
@@ -8002,7 +8148,7 @@
                             <m:supHide m:val="on"/>
                             <m:ctrlPr>
                               <a:rPr lang="en-US" sz="2000" i="1">
-                                <a:latin typeface="Cambria Math" panose="02040503050406030204" pitchFamily="18" charset="0"/>
+                                <a:latin typeface="Cambria Math" charset="0"/>
                                 <a:ea typeface="Times New Roman" panose="02020603050405020304" pitchFamily="18" charset="0"/>
                               </a:rPr>
                             </m:ctrlPr>
@@ -8043,7 +8189,7 @@
                               <m:sSubPr>
                                 <m:ctrlPr>
                                   <a:rPr lang="en-US" sz="2000" i="1">
-                                    <a:latin typeface="Cambria Math" panose="02040503050406030204" pitchFamily="18" charset="0"/>
+                                    <a:latin typeface="Cambria Math" charset="0"/>
                                     <a:ea typeface="Times New Roman" panose="02020603050405020304" pitchFamily="18" charset="0"/>
                                   </a:rPr>
                                 </m:ctrlPr>
@@ -8087,7 +8233,7 @@
                           <m:sSubPr>
                             <m:ctrlPr>
                               <a:rPr lang="en-US" sz="2000" i="1">
-                                <a:latin typeface="Cambria Math" panose="02040503050406030204" pitchFamily="18" charset="0"/>
+                                <a:latin typeface="Cambria Math" charset="0"/>
                                 <a:ea typeface="Times New Roman" panose="02020603050405020304" pitchFamily="18" charset="0"/>
                               </a:rPr>
                             </m:ctrlPr>
@@ -8141,7 +8287,7 @@
             </p:txBody>
           </p:sp>
         </mc:Choice>
-        <mc:Fallback>
+        <mc:Fallback xmlns="">
           <p:sp>
             <p:nvSpPr>
               <p:cNvPr id="11" name="Rectangle 10">
@@ -8186,8 +8332,8 @@
           </p:sp>
         </mc:Fallback>
       </mc:AlternateContent>
-      <mc:AlternateContent xmlns:mc="http://schemas.openxmlformats.org/markup-compatibility/2006">
-        <mc:Choice xmlns:a14="http://schemas.microsoft.com/office/drawing/2010/main" Requires="a14">
+      <mc:AlternateContent xmlns:mc="http://schemas.openxmlformats.org/markup-compatibility/2006" xmlns:a14="http://schemas.microsoft.com/office/drawing/2010/main">
+        <mc:Choice Requires="a14">
           <p:sp>
             <p:nvSpPr>
               <p:cNvPr id="4" name="Rectangle 3"/>
@@ -8220,7 +8366,7 @@
                       <m:sSubPr>
                         <m:ctrlPr>
                           <a:rPr lang="en-US" sz="2000" i="1">
-                            <a:latin typeface="Cambria Math" panose="02040503050406030204" pitchFamily="18" charset="0"/>
+                            <a:latin typeface="Cambria Math" charset="0"/>
                             <a:ea typeface="Times New Roman" panose="02020603050405020304" pitchFamily="18" charset="0"/>
                           </a:rPr>
                         </m:ctrlPr>
@@ -8255,7 +8401,7 @@
                       <m:fPr>
                         <m:ctrlPr>
                           <a:rPr lang="en-US" sz="2000" i="1">
-                            <a:latin typeface="Cambria Math" panose="02040503050406030204" pitchFamily="18" charset="0"/>
+                            <a:latin typeface="Cambria Math" charset="0"/>
                             <a:ea typeface="Times New Roman" panose="02020603050405020304" pitchFamily="18" charset="0"/>
                           </a:rPr>
                         </m:ctrlPr>
@@ -8268,7 +8414,7 @@
                             <m:supHide m:val="on"/>
                             <m:ctrlPr>
                               <a:rPr lang="en-US" sz="2000" i="1">
-                                <a:latin typeface="Cambria Math" panose="02040503050406030204" pitchFamily="18" charset="0"/>
+                                <a:latin typeface="Cambria Math" charset="0"/>
                                 <a:ea typeface="Times New Roman" panose="02020603050405020304" pitchFamily="18" charset="0"/>
                               </a:rPr>
                             </m:ctrlPr>
@@ -8309,7 +8455,7 @@
                               <m:sSubPr>
                                 <m:ctrlPr>
                                   <a:rPr lang="en-US" sz="2000" i="1">
-                                    <a:latin typeface="Cambria Math" panose="02040503050406030204" pitchFamily="18" charset="0"/>
+                                    <a:latin typeface="Cambria Math" charset="0"/>
                                     <a:ea typeface="Times New Roman" panose="02020603050405020304" pitchFamily="18" charset="0"/>
                                   </a:rPr>
                                 </m:ctrlPr>
@@ -8344,7 +8490,7 @@
                             <m:supHide m:val="on"/>
                             <m:ctrlPr>
                               <a:rPr lang="en-US" sz="2000" i="1">
-                                <a:latin typeface="Cambria Math" panose="02040503050406030204" pitchFamily="18" charset="0"/>
+                                <a:latin typeface="Cambria Math" charset="0"/>
                                 <a:ea typeface="Times New Roman" panose="02020603050405020304" pitchFamily="18" charset="0"/>
                               </a:rPr>
                             </m:ctrlPr>
@@ -8385,7 +8531,7 @@
                               <m:sSubPr>
                                 <m:ctrlPr>
                                   <a:rPr lang="en-US" sz="2000" i="1">
-                                    <a:latin typeface="Cambria Math" panose="02040503050406030204" pitchFamily="18" charset="0"/>
+                                    <a:latin typeface="Cambria Math" charset="0"/>
                                     <a:ea typeface="Times New Roman" panose="02020603050405020304" pitchFamily="18" charset="0"/>
                                   </a:rPr>
                                 </m:ctrlPr>
@@ -8429,7 +8575,7 @@
                           <m:sSubPr>
                             <m:ctrlPr>
                               <a:rPr lang="en-US" sz="2000" i="1">
-                                <a:latin typeface="Cambria Math" panose="02040503050406030204" pitchFamily="18" charset="0"/>
+                                <a:latin typeface="Cambria Math" charset="0"/>
                                 <a:ea typeface="Times New Roman" panose="02020603050405020304" pitchFamily="18" charset="0"/>
                               </a:rPr>
                             </m:ctrlPr>
@@ -8499,7 +8645,7 @@
             </p:txBody>
           </p:sp>
         </mc:Choice>
-        <mc:Fallback>
+        <mc:Fallback xmlns="">
           <p:sp>
             <p:nvSpPr>
               <p:cNvPr id="4" name="Rectangle 3"/>
@@ -8538,8 +8684,8 @@
           </p:sp>
         </mc:Fallback>
       </mc:AlternateContent>
-      <mc:AlternateContent xmlns:mc="http://schemas.openxmlformats.org/markup-compatibility/2006">
-        <mc:Choice xmlns:a14="http://schemas.microsoft.com/office/drawing/2010/main" Requires="a14">
+      <mc:AlternateContent xmlns:mc="http://schemas.openxmlformats.org/markup-compatibility/2006" xmlns:a14="http://schemas.microsoft.com/office/drawing/2010/main">
+        <mc:Choice Requires="a14">
           <p:sp>
             <p:nvSpPr>
               <p:cNvPr id="5" name="Rectangle 4"/>
@@ -8589,7 +8735,7 @@
                       <m:sSubPr>
                         <m:ctrlPr>
                           <a:rPr lang="en-US" sz="2000" i="1">
-                            <a:latin typeface="Cambria Math" panose="02040503050406030204" pitchFamily="18" charset="0"/>
+                            <a:latin typeface="Cambria Math" charset="0"/>
                             <a:ea typeface="Times New Roman" panose="02020603050405020304" pitchFamily="18" charset="0"/>
                           </a:rPr>
                         </m:ctrlPr>
@@ -8624,7 +8770,7 @@
                       <m:fPr>
                         <m:ctrlPr>
                           <a:rPr lang="en-US" sz="2000" i="1">
-                            <a:latin typeface="Cambria Math" panose="02040503050406030204" pitchFamily="18" charset="0"/>
+                            <a:latin typeface="Cambria Math" charset="0"/>
                             <a:ea typeface="Times New Roman" panose="02020603050405020304" pitchFamily="18" charset="0"/>
                           </a:rPr>
                         </m:ctrlPr>
@@ -8641,7 +8787,7 @@
                           <m:sSubPr>
                             <m:ctrlPr>
                               <a:rPr lang="en-US" sz="2000" i="1">
-                                <a:latin typeface="Cambria Math" panose="02040503050406030204" pitchFamily="18" charset="0"/>
+                                <a:latin typeface="Cambria Math" charset="0"/>
                                 <a:ea typeface="Times New Roman" panose="02020603050405020304" pitchFamily="18" charset="0"/>
                               </a:rPr>
                             </m:ctrlPr>
@@ -8669,7 +8815,7 @@
                           <m:sSubPr>
                             <m:ctrlPr>
                               <a:rPr lang="en-US" sz="2000" i="1">
-                                <a:latin typeface="Cambria Math" panose="02040503050406030204" pitchFamily="18" charset="0"/>
+                                <a:latin typeface="Cambria Math" charset="0"/>
                                 <a:ea typeface="Times New Roman" panose="02020603050405020304" pitchFamily="18" charset="0"/>
                               </a:rPr>
                             </m:ctrlPr>
@@ -8699,7 +8845,7 @@
                           <m:sSubPr>
                             <m:ctrlPr>
                               <a:rPr lang="en-US" sz="2000" i="1">
-                                <a:latin typeface="Cambria Math" panose="02040503050406030204" pitchFamily="18" charset="0"/>
+                                <a:latin typeface="Cambria Math" charset="0"/>
                                 <a:ea typeface="Times New Roman" panose="02020603050405020304" pitchFamily="18" charset="0"/>
                               </a:rPr>
                             </m:ctrlPr>
@@ -8734,7 +8880,7 @@
                           <m:sSubPr>
                             <m:ctrlPr>
                               <a:rPr lang="en-US" sz="2000" i="1">
-                                <a:latin typeface="Cambria Math" panose="02040503050406030204" pitchFamily="18" charset="0"/>
+                                <a:latin typeface="Cambria Math" charset="0"/>
                                 <a:ea typeface="Times New Roman" panose="02020603050405020304" pitchFamily="18" charset="0"/>
                               </a:rPr>
                             </m:ctrlPr>
@@ -8773,7 +8919,7 @@
             </p:txBody>
           </p:sp>
         </mc:Choice>
-        <mc:Fallback>
+        <mc:Fallback xmlns="">
           <p:sp>
             <p:nvSpPr>
               <p:cNvPr id="5" name="Rectangle 4"/>
@@ -8825,7 +8971,7 @@
 </p:sld>
 </file>
 
-<file path=ppt/slides/slide12.xml><?xml version="1.0" encoding="utf-8"?>
+<file path=ppt/slides/slide13.xml><?xml version="1.0" encoding="utf-8"?>
 <p:sld xmlns:a="http://schemas.openxmlformats.org/drawingml/2006/main" xmlns:r="http://schemas.openxmlformats.org/officeDocument/2006/relationships" xmlns:p="http://schemas.openxmlformats.org/presentationml/2006/main">
   <p:cSld>
     <p:spTree>
@@ -8847,7 +8993,7 @@
           <p:cNvPr id="2" name="Title 1">
             <a:extLst>
               <a:ext uri="{FF2B5EF4-FFF2-40B4-BE49-F238E27FC236}">
-                <a16:creationId xmlns:a16="http://schemas.microsoft.com/office/drawing/2014/main" id="{D0F82475-9B7E-45A8-9A45-E0C2E2791608}"/>
+                <a16:creationId xmlns="" xmlns:a16="http://schemas.microsoft.com/office/drawing/2014/main" id="{D0F82475-9B7E-45A8-9A45-E0C2E2791608}"/>
               </a:ext>
             </a:extLst>
           </p:cNvPr>
@@ -8875,7 +9021,7 @@
           <p:cNvPr id="5" name="Table 4">
             <a:extLst>
               <a:ext uri="{FF2B5EF4-FFF2-40B4-BE49-F238E27FC236}">
-                <a16:creationId xmlns:a16="http://schemas.microsoft.com/office/drawing/2014/main" id="{0575E406-495F-47BF-8674-5C2F23227401}"/>
+                <a16:creationId xmlns="" xmlns:a16="http://schemas.microsoft.com/office/drawing/2014/main" id="{0575E406-495F-47BF-8674-5C2F23227401}"/>
               </a:ext>
             </a:extLst>
           </p:cNvPr>
@@ -8885,33 +9031,33 @@
           <p:nvPr>
             <p:extLst>
               <p:ext uri="{D42A27DB-BD31-4B8C-83A1-F6EECF244321}">
-                <p14:modId xmlns:p14="http://schemas.microsoft.com/office/powerpoint/2010/main" val="3767782818"/>
+                <p14:modId xmlns:p14="http://schemas.microsoft.com/office/powerpoint/2010/main" val="1166778208"/>
               </p:ext>
             </p:extLst>
           </p:nvPr>
         </p:nvGraphicFramePr>
         <p:xfrm>
-          <a:off x="1684215" y="1820985"/>
-          <a:ext cx="8823569" cy="3923323"/>
+          <a:off x="2293918" y="1965364"/>
+          <a:ext cx="7604164" cy="3923323"/>
         </p:xfrm>
         <a:graphic>
           <a:graphicData uri="http://schemas.openxmlformats.org/drawingml/2006/table">
             <a:tbl>
               <a:tblPr>
-                <a:tableStyleId>{5C22544A-7EE6-4342-B048-85BDC9FD1C3A}</a:tableStyleId>
+                <a:tableStyleId>{5940675A-B579-460E-94D1-54222C63F5DA}</a:tableStyleId>
               </a:tblPr>
               <a:tblGrid>
-                <a:gridCol w="3999232">
+                <a:gridCol w="2198370">
                   <a:extLst>
                     <a:ext uri="{9D8B030D-6E8A-4147-A177-3AD203B41FA5}">
-                      <a16:colId xmlns:a16="http://schemas.microsoft.com/office/drawing/2014/main" val="1301186544"/>
+                      <a16:colId xmlns="" xmlns:a16="http://schemas.microsoft.com/office/drawing/2014/main" val="1301186544"/>
                     </a:ext>
                   </a:extLst>
                 </a:gridCol>
-                <a:gridCol w="4824337">
+                <a:gridCol w="5405794">
                   <a:extLst>
                     <a:ext uri="{9D8B030D-6E8A-4147-A177-3AD203B41FA5}">
-                      <a16:colId xmlns:a16="http://schemas.microsoft.com/office/drawing/2014/main" val="2915870967"/>
+                      <a16:colId xmlns="" xmlns:a16="http://schemas.microsoft.com/office/drawing/2014/main" val="2915870967"/>
                     </a:ext>
                   </a:extLst>
                 </a:gridCol>
@@ -8940,55 +9086,21 @@
                         <a:defRPr/>
                       </a:pPr>
                       <a:r>
-                        <a:rPr lang="en-US" sz="2000" b="1" i="0" u="none" strike="noStrike" dirty="0">
-                          <a:solidFill>
-                            <a:srgbClr val="000000"/>
-                          </a:solidFill>
+                        <a:rPr lang="en-US" sz="2000" u="none" strike="noStrike" dirty="0">
                           <a:effectLst/>
-                          <a:latin typeface="Calibri" panose="020F0502020204030204" pitchFamily="34" charset="0"/>
                         </a:rPr>
                         <a:t>Method</a:t>
                       </a:r>
+                      <a:endParaRPr lang="en-US" sz="2000" b="1" i="0" u="none" strike="noStrike" dirty="0">
+                        <a:solidFill>
+                          <a:srgbClr val="000000"/>
+                        </a:solidFill>
+                        <a:effectLst/>
+                        <a:latin typeface="Calibri" panose="020F0502020204030204" pitchFamily="34" charset="0"/>
+                      </a:endParaRPr>
                     </a:p>
                   </a:txBody>
-                  <a:tcPr anchor="ctr">
-                    <a:lnL w="12700" cap="flat" cmpd="sng" algn="ctr">
-                      <a:solidFill>
-                        <a:schemeClr val="tx1"/>
-                      </a:solidFill>
-                      <a:prstDash val="solid"/>
-                      <a:round/>
-                      <a:headEnd type="none" w="med" len="med"/>
-                      <a:tailEnd type="none" w="med" len="med"/>
-                    </a:lnL>
-                    <a:lnR w="12700" cap="flat" cmpd="sng" algn="ctr">
-                      <a:solidFill>
-                        <a:schemeClr val="tx1"/>
-                      </a:solidFill>
-                      <a:prstDash val="solid"/>
-                      <a:round/>
-                      <a:headEnd type="none" w="med" len="med"/>
-                      <a:tailEnd type="none" w="med" len="med"/>
-                    </a:lnR>
-                    <a:lnT w="12700" cap="flat" cmpd="sng" algn="ctr">
-                      <a:solidFill>
-                        <a:schemeClr val="tx1"/>
-                      </a:solidFill>
-                      <a:prstDash val="solid"/>
-                      <a:round/>
-                      <a:headEnd type="none" w="med" len="med"/>
-                      <a:tailEnd type="none" w="med" len="med"/>
-                    </a:lnT>
-                    <a:lnB w="12700" cap="flat" cmpd="sng" algn="ctr">
-                      <a:solidFill>
-                        <a:schemeClr val="tx1"/>
-                      </a:solidFill>
-                      <a:prstDash val="solid"/>
-                      <a:round/>
-                      <a:headEnd type="none" w="med" len="med"/>
-                      <a:tailEnd type="none" w="med" len="med"/>
-                    </a:lnB>
-                  </a:tcPr>
+                  <a:tcPr anchor="ctr"/>
                 </a:tc>
                 <a:tc>
                   <a:txBody>
@@ -9013,59 +9125,25 @@
                         <a:defRPr/>
                       </a:pPr>
                       <a:r>
-                        <a:rPr lang="en-US" sz="2000" b="1" i="0" u="none" strike="noStrike" dirty="0">
-                          <a:solidFill>
-                            <a:srgbClr val="000000"/>
-                          </a:solidFill>
+                        <a:rPr lang="en-US" sz="2000" u="none" strike="noStrike" dirty="0">
                           <a:effectLst/>
-                          <a:latin typeface="Calibri" panose="020F0502020204030204" pitchFamily="34" charset="0"/>
                         </a:rPr>
                         <a:t>Micro-averaged F-score</a:t>
                       </a:r>
+                      <a:endParaRPr lang="en-US" sz="2000" b="1" i="0" u="none" strike="noStrike" dirty="0">
+                        <a:solidFill>
+                          <a:srgbClr val="000000"/>
+                        </a:solidFill>
+                        <a:effectLst/>
+                        <a:latin typeface="Calibri" panose="020F0502020204030204" pitchFamily="34" charset="0"/>
+                      </a:endParaRPr>
                     </a:p>
                   </a:txBody>
-                  <a:tcPr anchor="ctr">
-                    <a:lnL w="12700" cap="flat" cmpd="sng" algn="ctr">
-                      <a:solidFill>
-                        <a:schemeClr val="tx1"/>
-                      </a:solidFill>
-                      <a:prstDash val="solid"/>
-                      <a:round/>
-                      <a:headEnd type="none" w="med" len="med"/>
-                      <a:tailEnd type="none" w="med" len="med"/>
-                    </a:lnL>
-                    <a:lnR w="12700" cap="flat" cmpd="sng" algn="ctr">
-                      <a:solidFill>
-                        <a:schemeClr val="tx1"/>
-                      </a:solidFill>
-                      <a:prstDash val="solid"/>
-                      <a:round/>
-                      <a:headEnd type="none" w="med" len="med"/>
-                      <a:tailEnd type="none" w="med" len="med"/>
-                    </a:lnR>
-                    <a:lnT w="12700" cap="flat" cmpd="sng" algn="ctr">
-                      <a:solidFill>
-                        <a:schemeClr val="tx1"/>
-                      </a:solidFill>
-                      <a:prstDash val="solid"/>
-                      <a:round/>
-                      <a:headEnd type="none" w="med" len="med"/>
-                      <a:tailEnd type="none" w="med" len="med"/>
-                    </a:lnT>
-                    <a:lnB w="12700" cap="flat" cmpd="sng" algn="ctr">
-                      <a:solidFill>
-                        <a:schemeClr val="tx1"/>
-                      </a:solidFill>
-                      <a:prstDash val="solid"/>
-                      <a:round/>
-                      <a:headEnd type="none" w="med" len="med"/>
-                      <a:tailEnd type="none" w="med" len="med"/>
-                    </a:lnB>
-                  </a:tcPr>
+                  <a:tcPr anchor="ctr"/>
                 </a:tc>
                 <a:extLst>
                   <a:ext uri="{0D108BD9-81ED-4DB2-BD59-A6C34878D82A}">
-                    <a16:rowId xmlns:a16="http://schemas.microsoft.com/office/drawing/2014/main" val="3170020359"/>
+                    <a16:rowId xmlns="" xmlns:a16="http://schemas.microsoft.com/office/drawing/2014/main" val="3170020359"/>
                   </a:ext>
                 </a:extLst>
               </a:tr>
@@ -9093,14 +9171,8 @@
                         <a:defRPr/>
                       </a:pPr>
                       <a:r>
-                        <a:rPr lang="en-US" sz="1800" kern="1200" dirty="0" err="1">
-                          <a:solidFill>
-                            <a:schemeClr val="dk1"/>
-                          </a:solidFill>
+                        <a:rPr lang="en-US" sz="2000" kern="1200" dirty="0" err="1">
                           <a:effectLst/>
-                          <a:latin typeface="+mn-lt"/>
-                          <a:ea typeface="+mn-ea"/>
-                          <a:cs typeface="+mn-cs"/>
                         </a:rPr>
                         <a:t>naiveBayes</a:t>
                       </a:r>
@@ -9113,44 +9185,7 @@
                       </a:endParaRPr>
                     </a:p>
                   </a:txBody>
-                  <a:tcPr anchor="ctr">
-                    <a:lnL w="12700" cap="flat" cmpd="sng" algn="ctr">
-                      <a:solidFill>
-                        <a:schemeClr val="tx1"/>
-                      </a:solidFill>
-                      <a:prstDash val="solid"/>
-                      <a:round/>
-                      <a:headEnd type="none" w="med" len="med"/>
-                      <a:tailEnd type="none" w="med" len="med"/>
-                    </a:lnL>
-                    <a:lnR w="12700" cap="flat" cmpd="sng" algn="ctr">
-                      <a:solidFill>
-                        <a:schemeClr val="tx1"/>
-                      </a:solidFill>
-                      <a:prstDash val="solid"/>
-                      <a:round/>
-                      <a:headEnd type="none" w="med" len="med"/>
-                      <a:tailEnd type="none" w="med" len="med"/>
-                    </a:lnR>
-                    <a:lnT w="12700" cap="flat" cmpd="sng" algn="ctr">
-                      <a:solidFill>
-                        <a:schemeClr val="tx1"/>
-                      </a:solidFill>
-                      <a:prstDash val="solid"/>
-                      <a:round/>
-                      <a:headEnd type="none" w="med" len="med"/>
-                      <a:tailEnd type="none" w="med" len="med"/>
-                    </a:lnT>
-                    <a:lnB w="12700" cap="flat" cmpd="sng" algn="ctr">
-                      <a:solidFill>
-                        <a:schemeClr val="tx1"/>
-                      </a:solidFill>
-                      <a:prstDash val="solid"/>
-                      <a:round/>
-                      <a:headEnd type="none" w="med" len="med"/>
-                      <a:tailEnd type="none" w="med" len="med"/>
-                    </a:lnB>
-                  </a:tcPr>
+                  <a:tcPr anchor="ctr"/>
                 </a:tc>
                 <a:tc>
                   <a:txBody>
@@ -9189,48 +9224,11 @@
                       </a:endParaRPr>
                     </a:p>
                   </a:txBody>
-                  <a:tcPr anchor="ctr">
-                    <a:lnL w="12700" cap="flat" cmpd="sng" algn="ctr">
-                      <a:solidFill>
-                        <a:schemeClr val="tx1"/>
-                      </a:solidFill>
-                      <a:prstDash val="solid"/>
-                      <a:round/>
-                      <a:headEnd type="none" w="med" len="med"/>
-                      <a:tailEnd type="none" w="med" len="med"/>
-                    </a:lnL>
-                    <a:lnR w="12700" cap="flat" cmpd="sng" algn="ctr">
-                      <a:solidFill>
-                        <a:schemeClr val="tx1"/>
-                      </a:solidFill>
-                      <a:prstDash val="solid"/>
-                      <a:round/>
-                      <a:headEnd type="none" w="med" len="med"/>
-                      <a:tailEnd type="none" w="med" len="med"/>
-                    </a:lnR>
-                    <a:lnT w="12700" cap="flat" cmpd="sng" algn="ctr">
-                      <a:solidFill>
-                        <a:schemeClr val="tx1"/>
-                      </a:solidFill>
-                      <a:prstDash val="solid"/>
-                      <a:round/>
-                      <a:headEnd type="none" w="med" len="med"/>
-                      <a:tailEnd type="none" w="med" len="med"/>
-                    </a:lnT>
-                    <a:lnB w="12700" cap="flat" cmpd="sng" algn="ctr">
-                      <a:solidFill>
-                        <a:schemeClr val="tx1"/>
-                      </a:solidFill>
-                      <a:prstDash val="solid"/>
-                      <a:round/>
-                      <a:headEnd type="none" w="med" len="med"/>
-                      <a:tailEnd type="none" w="med" len="med"/>
-                    </a:lnB>
-                  </a:tcPr>
+                  <a:tcPr anchor="ctr"/>
                 </a:tc>
                 <a:extLst>
                   <a:ext uri="{0D108BD9-81ED-4DB2-BD59-A6C34878D82A}">
-                    <a16:rowId xmlns:a16="http://schemas.microsoft.com/office/drawing/2014/main" val="1789036120"/>
+                    <a16:rowId xmlns="" xmlns:a16="http://schemas.microsoft.com/office/drawing/2014/main" val="1789036120"/>
                   </a:ext>
                 </a:extLst>
               </a:tr>
@@ -9242,14 +9240,8 @@
                     <a:p>
                       <a:pPr algn="ctr" fontAlgn="b"/>
                       <a:r>
-                        <a:rPr lang="en-US" sz="1800" kern="1200" dirty="0" err="1">
-                          <a:solidFill>
-                            <a:schemeClr val="dk1"/>
-                          </a:solidFill>
+                        <a:rPr lang="en-US" sz="2000" kern="1200" dirty="0" err="1">
                           <a:effectLst/>
-                          <a:latin typeface="+mn-lt"/>
-                          <a:ea typeface="+mn-ea"/>
-                          <a:cs typeface="+mn-cs"/>
                         </a:rPr>
                         <a:t>kNN</a:t>
                       </a:r>
@@ -9262,44 +9254,7 @@
                       </a:endParaRPr>
                     </a:p>
                   </a:txBody>
-                  <a:tcPr marL="9525" marR="9525" marT="9525" marB="0" anchor="ctr">
-                    <a:lnL w="12700" cap="flat" cmpd="sng" algn="ctr">
-                      <a:solidFill>
-                        <a:schemeClr val="tx1"/>
-                      </a:solidFill>
-                      <a:prstDash val="solid"/>
-                      <a:round/>
-                      <a:headEnd type="none" w="med" len="med"/>
-                      <a:tailEnd type="none" w="med" len="med"/>
-                    </a:lnL>
-                    <a:lnR w="12700" cap="flat" cmpd="sng" algn="ctr">
-                      <a:solidFill>
-                        <a:schemeClr val="tx1"/>
-                      </a:solidFill>
-                      <a:prstDash val="solid"/>
-                      <a:round/>
-                      <a:headEnd type="none" w="med" len="med"/>
-                      <a:tailEnd type="none" w="med" len="med"/>
-                    </a:lnR>
-                    <a:lnT w="12700" cap="flat" cmpd="sng" algn="ctr">
-                      <a:solidFill>
-                        <a:schemeClr val="tx1"/>
-                      </a:solidFill>
-                      <a:prstDash val="solid"/>
-                      <a:round/>
-                      <a:headEnd type="none" w="med" len="med"/>
-                      <a:tailEnd type="none" w="med" len="med"/>
-                    </a:lnT>
-                    <a:lnB w="12700" cap="flat" cmpd="sng" algn="ctr">
-                      <a:solidFill>
-                        <a:schemeClr val="tx1"/>
-                      </a:solidFill>
-                      <a:prstDash val="solid"/>
-                      <a:round/>
-                      <a:headEnd type="none" w="med" len="med"/>
-                      <a:tailEnd type="none" w="med" len="med"/>
-                    </a:lnB>
-                  </a:tcPr>
+                  <a:tcPr marL="9525" marR="9525" marT="9525" marB="0" anchor="ctr"/>
                 </a:tc>
                 <a:tc>
                   <a:txBody>
@@ -9328,48 +9283,11 @@
                       </a:endParaRPr>
                     </a:p>
                   </a:txBody>
-                  <a:tcPr marL="9525" marR="9525" marT="9525" marB="0" anchor="ctr">
-                    <a:lnL w="12700" cap="flat" cmpd="sng" algn="ctr">
-                      <a:solidFill>
-                        <a:schemeClr val="tx1"/>
-                      </a:solidFill>
-                      <a:prstDash val="solid"/>
-                      <a:round/>
-                      <a:headEnd type="none" w="med" len="med"/>
-                      <a:tailEnd type="none" w="med" len="med"/>
-                    </a:lnL>
-                    <a:lnR w="12700" cap="flat" cmpd="sng" algn="ctr">
-                      <a:solidFill>
-                        <a:schemeClr val="tx1"/>
-                      </a:solidFill>
-                      <a:prstDash val="solid"/>
-                      <a:round/>
-                      <a:headEnd type="none" w="med" len="med"/>
-                      <a:tailEnd type="none" w="med" len="med"/>
-                    </a:lnR>
-                    <a:lnT w="12700" cap="flat" cmpd="sng" algn="ctr">
-                      <a:solidFill>
-                        <a:schemeClr val="tx1"/>
-                      </a:solidFill>
-                      <a:prstDash val="solid"/>
-                      <a:round/>
-                      <a:headEnd type="none" w="med" len="med"/>
-                      <a:tailEnd type="none" w="med" len="med"/>
-                    </a:lnT>
-                    <a:lnB w="12700" cap="flat" cmpd="sng" algn="ctr">
-                      <a:solidFill>
-                        <a:schemeClr val="tx1"/>
-                      </a:solidFill>
-                      <a:prstDash val="solid"/>
-                      <a:round/>
-                      <a:headEnd type="none" w="med" len="med"/>
-                      <a:tailEnd type="none" w="med" len="med"/>
-                    </a:lnB>
-                  </a:tcPr>
+                  <a:tcPr marL="9525" marR="9525" marT="9525" marB="0" anchor="ctr"/>
                 </a:tc>
                 <a:extLst>
                   <a:ext uri="{0D108BD9-81ED-4DB2-BD59-A6C34878D82A}">
-                    <a16:rowId xmlns:a16="http://schemas.microsoft.com/office/drawing/2014/main" val="2778997295"/>
+                    <a16:rowId xmlns="" xmlns:a16="http://schemas.microsoft.com/office/drawing/2014/main" val="2778997295"/>
                   </a:ext>
                 </a:extLst>
               </a:tr>
@@ -9395,44 +9313,7 @@
                       </a:endParaRPr>
                     </a:p>
                   </a:txBody>
-                  <a:tcPr marL="9525" marR="9525" marT="9525" marB="0" anchor="ctr">
-                    <a:lnL w="12700" cap="flat" cmpd="sng" algn="ctr">
-                      <a:solidFill>
-                        <a:schemeClr val="tx1"/>
-                      </a:solidFill>
-                      <a:prstDash val="solid"/>
-                      <a:round/>
-                      <a:headEnd type="none" w="med" len="med"/>
-                      <a:tailEnd type="none" w="med" len="med"/>
-                    </a:lnL>
-                    <a:lnR w="12700" cap="flat" cmpd="sng" algn="ctr">
-                      <a:solidFill>
-                        <a:schemeClr val="tx1"/>
-                      </a:solidFill>
-                      <a:prstDash val="solid"/>
-                      <a:round/>
-                      <a:headEnd type="none" w="med" len="med"/>
-                      <a:tailEnd type="none" w="med" len="med"/>
-                    </a:lnR>
-                    <a:lnT w="12700" cap="flat" cmpd="sng" algn="ctr">
-                      <a:solidFill>
-                        <a:schemeClr val="tx1"/>
-                      </a:solidFill>
-                      <a:prstDash val="solid"/>
-                      <a:round/>
-                      <a:headEnd type="none" w="med" len="med"/>
-                      <a:tailEnd type="none" w="med" len="med"/>
-                    </a:lnT>
-                    <a:lnB w="12700" cap="flat" cmpd="sng" algn="ctr">
-                      <a:solidFill>
-                        <a:schemeClr val="tx1"/>
-                      </a:solidFill>
-                      <a:prstDash val="solid"/>
-                      <a:round/>
-                      <a:headEnd type="none" w="med" len="med"/>
-                      <a:tailEnd type="none" w="med" len="med"/>
-                    </a:lnB>
-                  </a:tcPr>
+                  <a:tcPr marL="9525" marR="9525" marT="9525" marB="0" anchor="ctr"/>
                 </a:tc>
                 <a:tc>
                   <a:txBody>
@@ -9461,48 +9342,11 @@
                       </a:endParaRPr>
                     </a:p>
                   </a:txBody>
-                  <a:tcPr marL="9525" marR="9525" marT="9525" marB="0" anchor="ctr">
-                    <a:lnL w="12700" cap="flat" cmpd="sng" algn="ctr">
-                      <a:solidFill>
-                        <a:schemeClr val="tx1"/>
-                      </a:solidFill>
-                      <a:prstDash val="solid"/>
-                      <a:round/>
-                      <a:headEnd type="none" w="med" len="med"/>
-                      <a:tailEnd type="none" w="med" len="med"/>
-                    </a:lnL>
-                    <a:lnR w="12700" cap="flat" cmpd="sng" algn="ctr">
-                      <a:solidFill>
-                        <a:schemeClr val="tx1"/>
-                      </a:solidFill>
-                      <a:prstDash val="solid"/>
-                      <a:round/>
-                      <a:headEnd type="none" w="med" len="med"/>
-                      <a:tailEnd type="none" w="med" len="med"/>
-                    </a:lnR>
-                    <a:lnT w="12700" cap="flat" cmpd="sng" algn="ctr">
-                      <a:solidFill>
-                        <a:schemeClr val="tx1"/>
-                      </a:solidFill>
-                      <a:prstDash val="solid"/>
-                      <a:round/>
-                      <a:headEnd type="none" w="med" len="med"/>
-                      <a:tailEnd type="none" w="med" len="med"/>
-                    </a:lnT>
-                    <a:lnB w="12700" cap="flat" cmpd="sng" algn="ctr">
-                      <a:solidFill>
-                        <a:schemeClr val="tx1"/>
-                      </a:solidFill>
-                      <a:prstDash val="solid"/>
-                      <a:round/>
-                      <a:headEnd type="none" w="med" len="med"/>
-                      <a:tailEnd type="none" w="med" len="med"/>
-                    </a:lnB>
-                  </a:tcPr>
+                  <a:tcPr marL="9525" marR="9525" marT="9525" marB="0" anchor="ctr"/>
                 </a:tc>
                 <a:extLst>
                   <a:ext uri="{0D108BD9-81ED-4DB2-BD59-A6C34878D82A}">
-                    <a16:rowId xmlns:a16="http://schemas.microsoft.com/office/drawing/2014/main" val="378496545"/>
+                    <a16:rowId xmlns="" xmlns:a16="http://schemas.microsoft.com/office/drawing/2014/main" val="378496545"/>
                   </a:ext>
                 </a:extLst>
               </a:tr>
@@ -9514,49 +9358,13 @@
                     <a:p>
                       <a:pPr algn="ctr"/>
                       <a:r>
-                        <a:rPr lang="en-US" sz="2000" b="1" dirty="0"/>
+                        <a:rPr lang="en-US" sz="2000" dirty="0"/>
                         <a:t>SVM</a:t>
                       </a:r>
+                      <a:endParaRPr lang="en-US" sz="2000" b="1" dirty="0"/>
                     </a:p>
                   </a:txBody>
-                  <a:tcPr anchor="ctr">
-                    <a:lnL w="12700" cap="flat" cmpd="sng" algn="ctr">
-                      <a:solidFill>
-                        <a:schemeClr val="tx1"/>
-                      </a:solidFill>
-                      <a:prstDash val="solid"/>
-                      <a:round/>
-                      <a:headEnd type="none" w="med" len="med"/>
-                      <a:tailEnd type="none" w="med" len="med"/>
-                    </a:lnL>
-                    <a:lnR w="12700" cap="flat" cmpd="sng" algn="ctr">
-                      <a:solidFill>
-                        <a:schemeClr val="tx1"/>
-                      </a:solidFill>
-                      <a:prstDash val="solid"/>
-                      <a:round/>
-                      <a:headEnd type="none" w="med" len="med"/>
-                      <a:tailEnd type="none" w="med" len="med"/>
-                    </a:lnR>
-                    <a:lnT w="12700" cap="flat" cmpd="sng" algn="ctr">
-                      <a:solidFill>
-                        <a:schemeClr val="tx1"/>
-                      </a:solidFill>
-                      <a:prstDash val="solid"/>
-                      <a:round/>
-                      <a:headEnd type="none" w="med" len="med"/>
-                      <a:tailEnd type="none" w="med" len="med"/>
-                    </a:lnT>
-                    <a:lnB w="12700" cap="flat" cmpd="sng" algn="ctr">
-                      <a:solidFill>
-                        <a:schemeClr val="tx1"/>
-                      </a:solidFill>
-                      <a:prstDash val="solid"/>
-                      <a:round/>
-                      <a:headEnd type="none" w="med" len="med"/>
-                      <a:tailEnd type="none" w="med" len="med"/>
-                    </a:lnB>
-                  </a:tcPr>
+                  <a:tcPr anchor="ctr"/>
                 </a:tc>
                 <a:tc>
                   <a:txBody>
@@ -9565,53 +9373,17 @@
                     <a:p>
                       <a:pPr algn="ctr"/>
                       <a:r>
-                        <a:rPr lang="en-US" sz="2000" b="1" dirty="0"/>
+                        <a:rPr lang="en-US" sz="2000" dirty="0"/>
                         <a:t>0.88</a:t>
                       </a:r>
+                      <a:endParaRPr lang="en-US" sz="2000" b="1" dirty="0"/>
                     </a:p>
                   </a:txBody>
-                  <a:tcPr anchor="ctr">
-                    <a:lnL w="12700" cap="flat" cmpd="sng" algn="ctr">
-                      <a:solidFill>
-                        <a:schemeClr val="tx1"/>
-                      </a:solidFill>
-                      <a:prstDash val="solid"/>
-                      <a:round/>
-                      <a:headEnd type="none" w="med" len="med"/>
-                      <a:tailEnd type="none" w="med" len="med"/>
-                    </a:lnL>
-                    <a:lnR w="12700" cap="flat" cmpd="sng" algn="ctr">
-                      <a:solidFill>
-                        <a:schemeClr val="tx1"/>
-                      </a:solidFill>
-                      <a:prstDash val="solid"/>
-                      <a:round/>
-                      <a:headEnd type="none" w="med" len="med"/>
-                      <a:tailEnd type="none" w="med" len="med"/>
-                    </a:lnR>
-                    <a:lnT w="12700" cap="flat" cmpd="sng" algn="ctr">
-                      <a:solidFill>
-                        <a:schemeClr val="tx1"/>
-                      </a:solidFill>
-                      <a:prstDash val="solid"/>
-                      <a:round/>
-                      <a:headEnd type="none" w="med" len="med"/>
-                      <a:tailEnd type="none" w="med" len="med"/>
-                    </a:lnT>
-                    <a:lnB w="12700" cap="flat" cmpd="sng" algn="ctr">
-                      <a:solidFill>
-                        <a:schemeClr val="tx1"/>
-                      </a:solidFill>
-                      <a:prstDash val="solid"/>
-                      <a:round/>
-                      <a:headEnd type="none" w="med" len="med"/>
-                      <a:tailEnd type="none" w="med" len="med"/>
-                    </a:lnB>
-                  </a:tcPr>
+                  <a:tcPr anchor="ctr"/>
                 </a:tc>
                 <a:extLst>
                   <a:ext uri="{0D108BD9-81ED-4DB2-BD59-A6C34878D82A}">
-                    <a16:rowId xmlns:a16="http://schemas.microsoft.com/office/drawing/2014/main" val="1871567688"/>
+                    <a16:rowId xmlns="" xmlns:a16="http://schemas.microsoft.com/office/drawing/2014/main" val="1871567688"/>
                   </a:ext>
                 </a:extLst>
               </a:tr>
@@ -9632,7 +9404,7 @@
 </p:sld>
 </file>
 
-<file path=ppt/slides/slide13.xml><?xml version="1.0" encoding="utf-8"?>
+<file path=ppt/slides/slide14.xml><?xml version="1.0" encoding="utf-8"?>
 <p:sld xmlns:a="http://schemas.openxmlformats.org/drawingml/2006/main" xmlns:r="http://schemas.openxmlformats.org/officeDocument/2006/relationships" xmlns:p="http://schemas.openxmlformats.org/presentationml/2006/main">
   <p:cSld>
     <p:spTree>
@@ -9654,7 +9426,7 @@
           <p:cNvPr id="2" name="Title 1">
             <a:extLst>
               <a:ext uri="{FF2B5EF4-FFF2-40B4-BE49-F238E27FC236}">
-                <a16:creationId xmlns:a16="http://schemas.microsoft.com/office/drawing/2014/main" id="{28C66FFE-A8EC-4EA3-BB83-4C0121472BFE}"/>
+                <a16:creationId xmlns="" xmlns:a16="http://schemas.microsoft.com/office/drawing/2014/main" id="{28C66FFE-A8EC-4EA3-BB83-4C0121472BFE}"/>
               </a:ext>
             </a:extLst>
           </p:cNvPr>
@@ -9682,7 +9454,7 @@
           <p:cNvPr id="3" name="Content Placeholder 2">
             <a:extLst>
               <a:ext uri="{FF2B5EF4-FFF2-40B4-BE49-F238E27FC236}">
-                <a16:creationId xmlns:a16="http://schemas.microsoft.com/office/drawing/2014/main" id="{932917B2-9D44-4309-A682-EF57BF4CFDC1}"/>
+                <a16:creationId xmlns="" xmlns:a16="http://schemas.microsoft.com/office/drawing/2014/main" id="{932917B2-9D44-4309-A682-EF57BF4CFDC1}"/>
               </a:ext>
             </a:extLst>
           </p:cNvPr>
@@ -9760,7 +9532,7 @@
           <p:cNvPr id="2" name="Title 1">
             <a:extLst>
               <a:ext uri="{FF2B5EF4-FFF2-40B4-BE49-F238E27FC236}">
-                <a16:creationId xmlns:a16="http://schemas.microsoft.com/office/drawing/2014/main" id="{4674C270-4EB3-4A56-A039-706833423356}"/>
+                <a16:creationId xmlns="" xmlns:a16="http://schemas.microsoft.com/office/drawing/2014/main" id="{4674C270-4EB3-4A56-A039-706833423356}"/>
               </a:ext>
             </a:extLst>
           </p:cNvPr>
@@ -9789,7 +9561,7 @@
           <p:cNvPr id="4" name="Picture 3">
             <a:extLst>
               <a:ext uri="{FF2B5EF4-FFF2-40B4-BE49-F238E27FC236}">
-                <a16:creationId xmlns:a16="http://schemas.microsoft.com/office/drawing/2014/main" id="{F633F335-E72E-433D-A588-55DD46ECFD28}"/>
+                <a16:creationId xmlns="" xmlns:a16="http://schemas.microsoft.com/office/drawing/2014/main" id="{F633F335-E72E-433D-A588-55DD46ECFD28}"/>
               </a:ext>
             </a:extLst>
           </p:cNvPr>
@@ -9849,7 +9621,7 @@
           <p:cNvPr id="2" name="Title 1">
             <a:extLst>
               <a:ext uri="{FF2B5EF4-FFF2-40B4-BE49-F238E27FC236}">
-                <a16:creationId xmlns:a16="http://schemas.microsoft.com/office/drawing/2014/main" id="{0DF95023-A5B0-4296-A016-CD04FCC23BB0}"/>
+                <a16:creationId xmlns="" xmlns:a16="http://schemas.microsoft.com/office/drawing/2014/main" id="{0DF95023-A5B0-4296-A016-CD04FCC23BB0}"/>
               </a:ext>
             </a:extLst>
           </p:cNvPr>
@@ -9877,7 +9649,7 @@
           <p:cNvPr id="3" name="Content Placeholder 2">
             <a:extLst>
               <a:ext uri="{FF2B5EF4-FFF2-40B4-BE49-F238E27FC236}">
-                <a16:creationId xmlns:a16="http://schemas.microsoft.com/office/drawing/2014/main" id="{A75511B4-9504-4927-916C-41C771E33C51}"/>
+                <a16:creationId xmlns="" xmlns:a16="http://schemas.microsoft.com/office/drawing/2014/main" id="{A75511B4-9504-4927-916C-41C771E33C51}"/>
               </a:ext>
             </a:extLst>
           </p:cNvPr>
@@ -9990,7 +9762,7 @@
           <p:cNvPr id="2" name="Title 1">
             <a:extLst>
               <a:ext uri="{FF2B5EF4-FFF2-40B4-BE49-F238E27FC236}">
-                <a16:creationId xmlns:a16="http://schemas.microsoft.com/office/drawing/2014/main" id="{240412D5-708D-4601-9A7A-B089F93CAB9D}"/>
+                <a16:creationId xmlns="" xmlns:a16="http://schemas.microsoft.com/office/drawing/2014/main" id="{240412D5-708D-4601-9A7A-B089F93CAB9D}"/>
               </a:ext>
             </a:extLst>
           </p:cNvPr>
@@ -10018,7 +9790,7 @@
           <p:cNvPr id="1026" name="Picture 5">
             <a:extLst>
               <a:ext uri="{FF2B5EF4-FFF2-40B4-BE49-F238E27FC236}">
-                <a16:creationId xmlns:a16="http://schemas.microsoft.com/office/drawing/2014/main" id="{4AB5D89D-D842-4C1E-9FBB-91265A88B59A}"/>
+                <a16:creationId xmlns="" xmlns:a16="http://schemas.microsoft.com/office/drawing/2014/main" id="{4AB5D89D-D842-4C1E-9FBB-91265A88B59A}"/>
               </a:ext>
             </a:extLst>
           </p:cNvPr>
@@ -10108,7 +9880,7 @@
           <p:cNvPr id="2" name="Title 1">
             <a:extLst>
               <a:ext uri="{FF2B5EF4-FFF2-40B4-BE49-F238E27FC236}">
-                <a16:creationId xmlns:a16="http://schemas.microsoft.com/office/drawing/2014/main" id="{6751B0A7-A918-42B4-9391-D0BA47887F82}"/>
+                <a16:creationId xmlns="" xmlns:a16="http://schemas.microsoft.com/office/drawing/2014/main" id="{6751B0A7-A918-42B4-9391-D0BA47887F82}"/>
               </a:ext>
             </a:extLst>
           </p:cNvPr>
@@ -10136,7 +9908,7 @@
           <p:cNvPr id="4" name="Picture 3">
             <a:extLst>
               <a:ext uri="{FF2B5EF4-FFF2-40B4-BE49-F238E27FC236}">
-                <a16:creationId xmlns:a16="http://schemas.microsoft.com/office/drawing/2014/main" id="{6DEB7C80-B314-41A7-8426-87539BA42C91}"/>
+                <a16:creationId xmlns="" xmlns:a16="http://schemas.microsoft.com/office/drawing/2014/main" id="{6DEB7C80-B314-41A7-8426-87539BA42C91}"/>
               </a:ext>
             </a:extLst>
           </p:cNvPr>
@@ -10205,7 +9977,7 @@
           <p:cNvPr id="2" name="Title 1">
             <a:extLst>
               <a:ext uri="{FF2B5EF4-FFF2-40B4-BE49-F238E27FC236}">
-                <a16:creationId xmlns:a16="http://schemas.microsoft.com/office/drawing/2014/main" id="{8AD17CEE-9884-4B83-8669-41D248BF4EAC}"/>
+                <a16:creationId xmlns="" xmlns:a16="http://schemas.microsoft.com/office/drawing/2014/main" id="{8AD17CEE-9884-4B83-8669-41D248BF4EAC}"/>
               </a:ext>
             </a:extLst>
           </p:cNvPr>
@@ -10234,7 +10006,7 @@
           <p:cNvPr id="4" name="Picture 3">
             <a:extLst>
               <a:ext uri="{FF2B5EF4-FFF2-40B4-BE49-F238E27FC236}">
-                <a16:creationId xmlns:a16="http://schemas.microsoft.com/office/drawing/2014/main" id="{D069C22B-EB37-4DB9-A628-A450654215C3}"/>
+                <a16:creationId xmlns="" xmlns:a16="http://schemas.microsoft.com/office/drawing/2014/main" id="{D069C22B-EB37-4DB9-A628-A450654215C3}"/>
               </a:ext>
             </a:extLst>
           </p:cNvPr>
@@ -10273,7 +10045,7 @@
           <p:cNvPr id="3" name="Oval 2">
             <a:extLst>
               <a:ext uri="{FF2B5EF4-FFF2-40B4-BE49-F238E27FC236}">
-                <a16:creationId xmlns:a16="http://schemas.microsoft.com/office/drawing/2014/main" id="{F3082474-1D85-4A2C-83C9-B405E48AB791}"/>
+                <a16:creationId xmlns="" xmlns:a16="http://schemas.microsoft.com/office/drawing/2014/main" id="{F3082474-1D85-4A2C-83C9-B405E48AB791}"/>
               </a:ext>
             </a:extLst>
           </p:cNvPr>
@@ -10325,7 +10097,7 @@
           <p:cNvPr id="5" name="Oval 4">
             <a:extLst>
               <a:ext uri="{FF2B5EF4-FFF2-40B4-BE49-F238E27FC236}">
-                <a16:creationId xmlns:a16="http://schemas.microsoft.com/office/drawing/2014/main" id="{376D87A0-E68F-46BC-AEF8-49098BD2EEEB}"/>
+                <a16:creationId xmlns="" xmlns:a16="http://schemas.microsoft.com/office/drawing/2014/main" id="{376D87A0-E68F-46BC-AEF8-49098BD2EEEB}"/>
               </a:ext>
             </a:extLst>
           </p:cNvPr>
@@ -10407,7 +10179,7 @@
           <p:cNvPr id="2" name="Title 1">
             <a:extLst>
               <a:ext uri="{FF2B5EF4-FFF2-40B4-BE49-F238E27FC236}">
-                <a16:creationId xmlns:a16="http://schemas.microsoft.com/office/drawing/2014/main" id="{B3367AE1-693E-49F4-BC77-3B2A9CF898DA}"/>
+                <a16:creationId xmlns="" xmlns:a16="http://schemas.microsoft.com/office/drawing/2014/main" id="{B3367AE1-693E-49F4-BC77-3B2A9CF898DA}"/>
               </a:ext>
             </a:extLst>
           </p:cNvPr>
@@ -10435,7 +10207,7 @@
           <p:cNvPr id="8" name="Picture 7">
             <a:extLst>
               <a:ext uri="{FF2B5EF4-FFF2-40B4-BE49-F238E27FC236}">
-                <a16:creationId xmlns:a16="http://schemas.microsoft.com/office/drawing/2014/main" id="{A9DEC665-C8F2-447B-B3C8-8D5FB5662C3E}"/>
+                <a16:creationId xmlns="" xmlns:a16="http://schemas.microsoft.com/office/drawing/2014/main" id="{A9DEC665-C8F2-447B-B3C8-8D5FB5662C3E}"/>
               </a:ext>
             </a:extLst>
           </p:cNvPr>
@@ -10504,7 +10276,7 @@
           <p:cNvPr id="2" name="Title 1">
             <a:extLst>
               <a:ext uri="{FF2B5EF4-FFF2-40B4-BE49-F238E27FC236}">
-                <a16:creationId xmlns:a16="http://schemas.microsoft.com/office/drawing/2014/main" id="{A3591ABB-D2B4-4DCB-BF82-B6E4374061F5}"/>
+                <a16:creationId xmlns="" xmlns:a16="http://schemas.microsoft.com/office/drawing/2014/main" id="{A3591ABB-D2B4-4DCB-BF82-B6E4374061F5}"/>
               </a:ext>
             </a:extLst>
           </p:cNvPr>
@@ -10532,7 +10304,7 @@
           <p:cNvPr id="4" name="Content Placeholder 2">
             <a:extLst>
               <a:ext uri="{FF2B5EF4-FFF2-40B4-BE49-F238E27FC236}">
-                <a16:creationId xmlns:a16="http://schemas.microsoft.com/office/drawing/2014/main" id="{76829438-1011-4950-86BE-6A8D5C2D23F1}"/>
+                <a16:creationId xmlns="" xmlns:a16="http://schemas.microsoft.com/office/drawing/2014/main" id="{76829438-1011-4950-86BE-6A8D5C2D23F1}"/>
               </a:ext>
             </a:extLst>
           </p:cNvPr>
@@ -10545,7 +10317,7 @@
         </p:nvSpPr>
         <p:spPr>
           <a:xfrm>
-            <a:off x="920085" y="1447672"/>
+            <a:off x="920085" y="1759011"/>
             <a:ext cx="10515600" cy="4351338"/>
           </a:xfrm>
         </p:spPr>
@@ -10611,7 +10383,7 @@
           <p:cNvPr id="1026" name="Picture 2">
             <a:extLst>
               <a:ext uri="{FF2B5EF4-FFF2-40B4-BE49-F238E27FC236}">
-                <a16:creationId xmlns:a16="http://schemas.microsoft.com/office/drawing/2014/main" id="{565C42AA-EACF-4F36-8C47-CEDDF9F2BF7D}"/>
+                <a16:creationId xmlns="" xmlns:a16="http://schemas.microsoft.com/office/drawing/2014/main" id="{565C42AA-EACF-4F36-8C47-CEDDF9F2BF7D}"/>
               </a:ext>
             </a:extLst>
           </p:cNvPr>
@@ -10635,8 +10407,8 @@
         </p:blipFill>
         <p:spPr bwMode="auto">
           <a:xfrm>
-            <a:off x="4331876" y="4092575"/>
-            <a:ext cx="2486025" cy="2400300"/>
+            <a:off x="8393873" y="1975579"/>
+            <a:ext cx="3041812" cy="2936922"/>
           </a:xfrm>
           <a:prstGeom prst="rect">
             <a:avLst/>
@@ -10658,7 +10430,7 @@
           <p:cNvPr id="1028" name="Picture 4">
             <a:extLst>
               <a:ext uri="{FF2B5EF4-FFF2-40B4-BE49-F238E27FC236}">
-                <a16:creationId xmlns:a16="http://schemas.microsoft.com/office/drawing/2014/main" id="{A3654E21-A0DB-4923-B73F-D90ACA490888}"/>
+                <a16:creationId xmlns="" xmlns:a16="http://schemas.microsoft.com/office/drawing/2014/main" id="{A3654E21-A0DB-4923-B73F-D90ACA490888}"/>
               </a:ext>
             </a:extLst>
           </p:cNvPr>
@@ -10682,8 +10454,8 @@
         </p:blipFill>
         <p:spPr bwMode="auto">
           <a:xfrm>
-            <a:off x="920085" y="4092575"/>
-            <a:ext cx="2486025" cy="2400300"/>
+            <a:off x="4629128" y="1975579"/>
+            <a:ext cx="3041812" cy="2936922"/>
           </a:xfrm>
           <a:prstGeom prst="rect">
             <a:avLst/>
@@ -10705,7 +10477,7 @@
           <p:cNvPr id="3" name="Arrow: Right 2">
             <a:extLst>
               <a:ext uri="{FF2B5EF4-FFF2-40B4-BE49-F238E27FC236}">
-                <a16:creationId xmlns:a16="http://schemas.microsoft.com/office/drawing/2014/main" id="{96D9127D-8B11-4B74-8E51-C503BB2BF0E1}"/>
+                <a16:creationId xmlns="" xmlns:a16="http://schemas.microsoft.com/office/drawing/2014/main" id="{96D9127D-8B11-4B74-8E51-C503BB2BF0E1}"/>
               </a:ext>
             </a:extLst>
           </p:cNvPr>
@@ -10714,7 +10486,7 @@
         </p:nvSpPr>
         <p:spPr>
           <a:xfrm>
-            <a:off x="3569110" y="5062281"/>
+            <a:off x="7812123" y="3222814"/>
             <a:ext cx="609600" cy="442452"/>
           </a:xfrm>
           <a:prstGeom prst="rightArrow">
@@ -10777,68 +10549,60 @@
       </p:grpSpPr>
       <p:sp>
         <p:nvSpPr>
-          <p:cNvPr id="2" name="Title 1">
+          <p:cNvPr id="2" name="Title 1"/>
+          <p:cNvSpPr>
+            <a:spLocks noGrp="1"/>
+          </p:cNvSpPr>
+          <p:nvPr>
+            <p:ph type="title"/>
+          </p:nvPr>
+        </p:nvSpPr>
+        <p:spPr/>
+        <p:txBody>
+          <a:bodyPr/>
+          <a:lstStyle/>
+          <a:p>
+            <a:r>
+              <a:rPr lang="en-US" b="1" dirty="0" smtClean="0"/>
+              <a:t>Shape features</a:t>
+            </a:r>
+            <a:endParaRPr lang="en-US" b="1" dirty="0"/>
+          </a:p>
+        </p:txBody>
+      </p:sp>
+      <p:pic>
+        <p:nvPicPr>
+          <p:cNvPr id="4" name="Content Placeholder 3"/>
+          <p:cNvPicPr>
+            <a:picLocks noGrp="1" noChangeAspect="1"/>
+          </p:cNvPicPr>
+          <p:nvPr>
+            <p:ph idx="1"/>
+          </p:nvPr>
+        </p:nvPicPr>
+        <p:blipFill>
+          <a:blip r:embed="rId2">
             <a:extLst>
-              <a:ext uri="{FF2B5EF4-FFF2-40B4-BE49-F238E27FC236}">
-                <a16:creationId xmlns:a16="http://schemas.microsoft.com/office/drawing/2014/main" id="{CCC38707-2573-4AE3-90AE-961D4C37378D}"/>
+              <a:ext uri="{28A0092B-C50C-407E-A947-70E740481C1C}">
+                <a14:useLocalDpi xmlns:a14="http://schemas.microsoft.com/office/drawing/2010/main" val="0"/>
               </a:ext>
             </a:extLst>
-          </p:cNvPr>
-          <p:cNvSpPr>
-            <a:spLocks noGrp="1"/>
-          </p:cNvSpPr>
-          <p:nvPr>
-            <p:ph type="title"/>
-          </p:nvPr>
-        </p:nvSpPr>
-        <p:spPr/>
-        <p:txBody>
-          <a:bodyPr/>
-          <a:lstStyle/>
-          <a:p>
-            <a:r>
-              <a:rPr lang="en-US" b="1" dirty="0"/>
-              <a:t>Feature correlation matrix </a:t>
-            </a:r>
-            <a:r>
-              <a:rPr lang="en-US" dirty="0"/>
-              <a:t>?</a:t>
-            </a:r>
-          </a:p>
-        </p:txBody>
-      </p:sp>
-      <p:pic>
-        <p:nvPicPr>
-          <p:cNvPr id="4" name="Picture 3">
-            <a:extLst>
-              <a:ext uri="{FF2B5EF4-FFF2-40B4-BE49-F238E27FC236}">
-                <a16:creationId xmlns:a16="http://schemas.microsoft.com/office/drawing/2014/main" id="{8E7140DD-614E-4DDB-AC12-C0D6F6007E40}"/>
-              </a:ext>
-            </a:extLst>
-          </p:cNvPr>
-          <p:cNvPicPr/>
-          <p:nvPr/>
-        </p:nvPicPr>
-        <p:blipFill>
-          <a:blip r:embed="rId3"/>
+          </a:blip>
           <a:stretch>
             <a:fillRect/>
           </a:stretch>
         </p:blipFill>
         <p:spPr>
           <a:xfrm>
-            <a:off x="914400" y="1931437"/>
-            <a:ext cx="10851501" cy="4561438"/>
+            <a:off x="2321500" y="1293234"/>
+            <a:ext cx="7548999" cy="4852928"/>
           </a:xfrm>
-          <a:prstGeom prst="rect">
-            <a:avLst/>
-          </a:prstGeom>
         </p:spPr>
       </p:pic>
     </p:spTree>
     <p:extLst>
       <p:ext uri="{BB962C8B-B14F-4D97-AF65-F5344CB8AC3E}">
-        <p14:creationId xmlns:p14="http://schemas.microsoft.com/office/powerpoint/2010/main" val="2872247765"/>
+        <p14:creationId xmlns:p14="http://schemas.microsoft.com/office/powerpoint/2010/main" val="863502779"/>
       </p:ext>
     </p:extLst>
   </p:cSld>

</xml_diff>